<commit_message>
v3, modify all slides beside 26-33
</commit_message>
<xml_diff>
--- a/Final presentation 3.pptx
+++ b/Final presentation 3.pptx
@@ -1622,7 +1622,7 @@
       </p:grpSpPr>
       <p:sp>
         <p:nvSpPr>
-          <p:cNvPr id="2" name="Slide Image Placeholder 1"/>
+          <p:cNvPr id="2" name="מציין מיקום של תמונת שקופית 1"/>
           <p:cNvSpPr>
             <a:spLocks noGrp="1" noRot="1" noChangeAspect="1"/>
           </p:cNvSpPr>
@@ -1634,7 +1634,7 @@
       </p:sp>
       <p:sp>
         <p:nvSpPr>
-          <p:cNvPr id="3" name="Notes Placeholder 2"/>
+          <p:cNvPr id="3" name="מציין מיקום של הערות 2"/>
           <p:cNvSpPr>
             <a:spLocks noGrp="1"/>
           </p:cNvSpPr>
@@ -1647,7 +1647,79 @@
           <a:bodyPr/>
           <a:lstStyle/>
           <a:p>
-            <a:pPr>
+            <a:pPr marL="342900" marR="0" lvl="0" indent="-342900">
+              <a:lnSpc>
+                <a:spcPct val="107000"/>
+              </a:lnSpc>
+              <a:spcBef>
+                <a:spcPts val="0"/>
+              </a:spcBef>
+              <a:spcAft>
+                <a:spcPts val="0"/>
+              </a:spcAft>
+              <a:buFont typeface="Symbol" panose="05050102010706020507" pitchFamily="18" charset="2"/>
+              <a:buChar char=""/>
+            </a:pPr>
+            <a:r>
+              <a:rPr lang="en-US" sz="1200" dirty="0">
+                <a:effectLst/>
+                <a:latin typeface="Calibri" panose="020F0502020204030204" pitchFamily="34" charset="0"/>
+                <a:ea typeface="Calibri" panose="020F0502020204030204" pitchFamily="34" charset="0"/>
+                <a:cs typeface="Arial" panose="020B0604020202020204" pitchFamily="34" charset="0"/>
+              </a:rPr>
+              <a:t>Code Coverage (which lines of code are executed)</a:t>
+            </a:r>
+          </a:p>
+          <a:p>
+            <a:pPr marL="342900" marR="0" lvl="0" indent="-342900">
+              <a:lnSpc>
+                <a:spcPct val="107000"/>
+              </a:lnSpc>
+              <a:spcBef>
+                <a:spcPts val="0"/>
+              </a:spcBef>
+              <a:spcAft>
+                <a:spcPts val="0"/>
+              </a:spcAft>
+              <a:buFont typeface="Symbol" panose="05050102010706020507" pitchFamily="18" charset="2"/>
+              <a:buChar char=""/>
+            </a:pPr>
+            <a:r>
+              <a:rPr lang="en-US" sz="1200" dirty="0">
+                <a:effectLst/>
+                <a:latin typeface="Calibri" panose="020F0502020204030204" pitchFamily="34" charset="0"/>
+                <a:ea typeface="Calibri" panose="020F0502020204030204" pitchFamily="34" charset="0"/>
+                <a:cs typeface="Arial" panose="020B0604020202020204" pitchFamily="34" charset="0"/>
+              </a:rPr>
+              <a:t>Condition Coverage (whether all branches of conditions have been exercised.)</a:t>
+            </a:r>
+          </a:p>
+          <a:p>
+            <a:pPr marL="342900" marR="0" lvl="0" indent="-342900">
+              <a:lnSpc>
+                <a:spcPct val="107000"/>
+              </a:lnSpc>
+              <a:spcBef>
+                <a:spcPts val="0"/>
+              </a:spcBef>
+              <a:spcAft>
+                <a:spcPts val="0"/>
+              </a:spcAft>
+              <a:buFont typeface="Symbol" panose="05050102010706020507" pitchFamily="18" charset="2"/>
+              <a:buChar char=""/>
+            </a:pPr>
+            <a:r>
+              <a:rPr lang="en-US" sz="1200" dirty="0">
+                <a:effectLst/>
+                <a:latin typeface="Calibri" panose="020F0502020204030204" pitchFamily="34" charset="0"/>
+                <a:ea typeface="Calibri" panose="020F0502020204030204" pitchFamily="34" charset="0"/>
+                <a:cs typeface="Arial" panose="020B0604020202020204" pitchFamily="34" charset="0"/>
+              </a:rPr>
+              <a:t>Functional coverage (how much design functionality has been exercised/covered by the testbench or verification environment)</a:t>
+            </a:r>
+          </a:p>
+          <a:p>
+            <a:pPr marL="342900" marR="0" lvl="0" indent="-342900">
               <a:lnSpc>
                 <a:spcPct val="107000"/>
               </a:lnSpc>
@@ -1657,85 +1729,27 @@
               <a:spcAft>
                 <a:spcPts val="800"/>
               </a:spcAft>
+              <a:buFont typeface="Symbol" panose="05050102010706020507" pitchFamily="18" charset="2"/>
+              <a:buChar char=""/>
             </a:pPr>
             <a:r>
-              <a:rPr lang="en-US" dirty="0">
-                <a:effectLst/>
-                <a:latin typeface="Calibri" panose="020F0502020204030204" pitchFamily="34" charset="0"/>
-                <a:ea typeface="Calibri" panose="020F0502020204030204" pitchFamily="34" charset="0"/>
-                <a:cs typeface="Arial" panose="020B0604020202020204" pitchFamily="34" charset="0"/>
-              </a:rPr>
-              <a:t>In order to check the functional coverage of the test line, the following cover groups were defined:</a:t>
-            </a:r>
-          </a:p>
-          <a:p>
-            <a:pPr lvl="1">
-              <a:lnSpc>
-                <a:spcPct val="107000"/>
-              </a:lnSpc>
-              <a:spcBef>
-                <a:spcPts val="0"/>
-              </a:spcBef>
-            </a:pPr>
-            <a:r>
-              <a:rPr lang="en-US" sz="2000" dirty="0">
-                <a:effectLst/>
-                <a:latin typeface="Calibri" panose="020F0502020204030204" pitchFamily="34" charset="0"/>
-                <a:ea typeface="Calibri" panose="020F0502020204030204" pitchFamily="34" charset="0"/>
-                <a:cs typeface="Arial" panose="020B0604020202020204" pitchFamily="34" charset="0"/>
-              </a:rPr>
-              <a:t>NUM_POINTS - This cover group samples the number of data points randomly generated for each test, to verify that all values  of this variable are uniformly distributed between 8 and 512.</a:t>
-            </a:r>
-          </a:p>
-          <a:p>
-            <a:pPr lvl="1">
-              <a:lnSpc>
-                <a:spcPct val="107000"/>
-              </a:lnSpc>
-              <a:spcBef>
-                <a:spcPts val="0"/>
-              </a:spcBef>
-            </a:pPr>
-            <a:r>
-              <a:rPr lang="en-US" sz="2000" dirty="0">
-                <a:effectLst/>
-                <a:latin typeface="Calibri" panose="020F0502020204030204" pitchFamily="34" charset="0"/>
-                <a:ea typeface="Calibri" panose="020F0502020204030204" pitchFamily="34" charset="0"/>
-                <a:cs typeface="Arial" panose="020B0604020202020204" pitchFamily="34" charset="0"/>
-              </a:rPr>
-              <a:t>DATA_VALUE - This cover group samples the values of each one of the seven coordinates of all data points randomly generated for each test, to verify that all values  of this variable are uniformly distributed between all the possible values.</a:t>
-            </a:r>
-          </a:p>
-          <a:p>
-            <a:pPr lvl="1">
-              <a:lnSpc>
-                <a:spcPct val="107000"/>
-              </a:lnSpc>
-              <a:spcBef>
-                <a:spcPts val="0"/>
-              </a:spcBef>
-              <a:spcAft>
-                <a:spcPts val="800"/>
-              </a:spcAft>
-            </a:pPr>
-            <a:r>
-              <a:rPr lang="en-US" sz="2000" dirty="0">
-                <a:effectLst/>
-                <a:latin typeface="Calibri" panose="020F0502020204030204" pitchFamily="34" charset="0"/>
-                <a:ea typeface="Calibri" panose="020F0502020204030204" pitchFamily="34" charset="0"/>
-                <a:cs typeface="Arial" panose="020B0604020202020204" pitchFamily="34" charset="0"/>
-              </a:rPr>
-              <a:t>CENTX_VALUE - This cover group samples the value of each one of the seven coordinates of centroid X, randomly generated at each test, to verify that all values of this variable are uniformly distributed between all the possible values.</a:t>
-            </a:r>
-          </a:p>
-          <a:p>
-            <a:endParaRPr lang="en-US" dirty="0"/>
+              <a:rPr lang="en-US" sz="1200" dirty="0">
+                <a:effectLst/>
+                <a:latin typeface="Calibri" panose="020F0502020204030204" pitchFamily="34" charset="0"/>
+                <a:ea typeface="Calibri" panose="020F0502020204030204" pitchFamily="34" charset="0"/>
+                <a:cs typeface="Arial" panose="020B0604020202020204" pitchFamily="34" charset="0"/>
+              </a:rPr>
+              <a:t>FSM Coverage (which states and possible state transitions are exercised)</a:t>
+            </a:r>
+          </a:p>
+          <a:p>
+            <a:endParaRPr lang="he-IL" dirty="0"/>
           </a:p>
         </p:txBody>
       </p:sp>
       <p:sp>
         <p:nvSpPr>
-          <p:cNvPr id="4" name="Slide Number Placeholder 3"/>
+          <p:cNvPr id="4" name="מציין מיקום של מספר שקופית 3"/>
           <p:cNvSpPr>
             <a:spLocks noGrp="1"/>
           </p:cNvSpPr>
@@ -1750,7 +1764,7 @@
           <a:p>
             <a:fld id="{509FA207-E8FD-4363-95A6-907EB6A63BD8}" type="slidenum">
               <a:rPr lang="en-US" smtClean="0"/>
-              <a:t>38</a:t>
+              <a:t>34</a:t>
             </a:fld>
             <a:endParaRPr lang="en-US"/>
           </a:p>
@@ -1759,7 +1773,7 @@
     </p:spTree>
     <p:extLst>
       <p:ext uri="{BB962C8B-B14F-4D97-AF65-F5344CB8AC3E}">
-        <p14:creationId xmlns:p14="http://schemas.microsoft.com/office/powerpoint/2010/main" val="2917502182"/>
+        <p14:creationId xmlns:p14="http://schemas.microsoft.com/office/powerpoint/2010/main" val="425144926"/>
       </p:ext>
     </p:extLst>
   </p:cSld>
@@ -1770,6 +1784,197 @@
 </file>
 
 <file path=ppt/notesSlides/notesSlide16.xml><?xml version="1.0" encoding="utf-8"?>
+<p:notes xmlns:a="http://schemas.openxmlformats.org/drawingml/2006/main" xmlns:r="http://schemas.openxmlformats.org/officeDocument/2006/relationships" xmlns:p="http://schemas.openxmlformats.org/presentationml/2006/main">
+  <p:cSld>
+    <p:spTree>
+      <p:nvGrpSpPr>
+        <p:cNvPr id="1" name=""/>
+        <p:cNvGrpSpPr/>
+        <p:nvPr/>
+      </p:nvGrpSpPr>
+      <p:grpSpPr>
+        <a:xfrm>
+          <a:off x="0" y="0"/>
+          <a:ext cx="0" cy="0"/>
+          <a:chOff x="0" y="0"/>
+          <a:chExt cx="0" cy="0"/>
+        </a:xfrm>
+      </p:grpSpPr>
+      <p:sp>
+        <p:nvSpPr>
+          <p:cNvPr id="2" name="מציין מיקום של תמונת שקופית 1"/>
+          <p:cNvSpPr>
+            <a:spLocks noGrp="1" noRot="1" noChangeAspect="1"/>
+          </p:cNvSpPr>
+          <p:nvPr>
+            <p:ph type="sldImg"/>
+          </p:nvPr>
+        </p:nvSpPr>
+        <p:spPr/>
+      </p:sp>
+      <p:sp>
+        <p:nvSpPr>
+          <p:cNvPr id="3" name="מציין מיקום של הערות 2"/>
+          <p:cNvSpPr>
+            <a:spLocks noGrp="1"/>
+          </p:cNvSpPr>
+          <p:nvPr>
+            <p:ph type="body" idx="1"/>
+          </p:nvPr>
+        </p:nvSpPr>
+        <p:spPr/>
+        <p:txBody>
+          <a:bodyPr/>
+          <a:lstStyle/>
+          <a:p>
+            <a:pPr marL="0" marR="0" lvl="0" indent="0" algn="l" defTabSz="914400" rtl="0" eaLnBrk="1" fontAlgn="auto" latinLnBrk="0" hangingPunct="1">
+              <a:lnSpc>
+                <a:spcPct val="100000"/>
+              </a:lnSpc>
+              <a:spcBef>
+                <a:spcPts val="0"/>
+              </a:spcBef>
+              <a:spcAft>
+                <a:spcPts val="0"/>
+              </a:spcAft>
+              <a:buClrTx/>
+              <a:buSzTx/>
+              <a:buFontTx/>
+              <a:buNone/>
+              <a:tabLst/>
+              <a:defRPr/>
+            </a:pPr>
+            <a:r>
+              <a:rPr lang="en-US" sz="1200" dirty="0"/>
+              <a:t>It is the most “random” test line(every input for the DUT is randomly generated) and it has the biggest number of tests.</a:t>
+            </a:r>
+          </a:p>
+          <a:p>
+            <a:endParaRPr lang="he-IL" dirty="0"/>
+          </a:p>
+        </p:txBody>
+      </p:sp>
+      <p:sp>
+        <p:nvSpPr>
+          <p:cNvPr id="4" name="מציין מיקום של מספר שקופית 3"/>
+          <p:cNvSpPr>
+            <a:spLocks noGrp="1"/>
+          </p:cNvSpPr>
+          <p:nvPr>
+            <p:ph type="sldNum" sz="quarter" idx="5"/>
+          </p:nvPr>
+        </p:nvSpPr>
+        <p:spPr/>
+        <p:txBody>
+          <a:bodyPr/>
+          <a:lstStyle/>
+          <a:p>
+            <a:fld id="{509FA207-E8FD-4363-95A6-907EB6A63BD8}" type="slidenum">
+              <a:rPr lang="en-US" smtClean="0"/>
+              <a:t>35</a:t>
+            </a:fld>
+            <a:endParaRPr lang="en-US"/>
+          </a:p>
+        </p:txBody>
+      </p:sp>
+    </p:spTree>
+    <p:extLst>
+      <p:ext uri="{BB962C8B-B14F-4D97-AF65-F5344CB8AC3E}">
+        <p14:creationId xmlns:p14="http://schemas.microsoft.com/office/powerpoint/2010/main" val="3655229497"/>
+      </p:ext>
+    </p:extLst>
+  </p:cSld>
+  <p:clrMapOvr>
+    <a:masterClrMapping/>
+  </p:clrMapOvr>
+</p:notes>
+</file>
+
+<file path=ppt/notesSlides/notesSlide17.xml><?xml version="1.0" encoding="utf-8"?>
+<p:notes xmlns:a="http://schemas.openxmlformats.org/drawingml/2006/main" xmlns:r="http://schemas.openxmlformats.org/officeDocument/2006/relationships" xmlns:p="http://schemas.openxmlformats.org/presentationml/2006/main">
+  <p:cSld>
+    <p:spTree>
+      <p:nvGrpSpPr>
+        <p:cNvPr id="1" name=""/>
+        <p:cNvGrpSpPr/>
+        <p:nvPr/>
+      </p:nvGrpSpPr>
+      <p:grpSpPr>
+        <a:xfrm>
+          <a:off x="0" y="0"/>
+          <a:ext cx="0" cy="0"/>
+          <a:chOff x="0" y="0"/>
+          <a:chExt cx="0" cy="0"/>
+        </a:xfrm>
+      </p:grpSpPr>
+      <p:sp>
+        <p:nvSpPr>
+          <p:cNvPr id="2" name="מציין מיקום של תמונת שקופית 1"/>
+          <p:cNvSpPr>
+            <a:spLocks noGrp="1" noRot="1" noChangeAspect="1"/>
+          </p:cNvSpPr>
+          <p:nvPr>
+            <p:ph type="sldImg"/>
+          </p:nvPr>
+        </p:nvSpPr>
+        <p:spPr/>
+      </p:sp>
+      <p:sp>
+        <p:nvSpPr>
+          <p:cNvPr id="3" name="מציין מיקום של הערות 2"/>
+          <p:cNvSpPr>
+            <a:spLocks noGrp="1"/>
+          </p:cNvSpPr>
+          <p:nvPr>
+            <p:ph type="body" idx="1"/>
+          </p:nvPr>
+        </p:nvSpPr>
+        <p:spPr/>
+        <p:txBody>
+          <a:bodyPr/>
+          <a:lstStyle/>
+          <a:p>
+            <a:endParaRPr lang="he-IL" dirty="0"/>
+          </a:p>
+        </p:txBody>
+      </p:sp>
+      <p:sp>
+        <p:nvSpPr>
+          <p:cNvPr id="4" name="מציין מיקום של מספר שקופית 3"/>
+          <p:cNvSpPr>
+            <a:spLocks noGrp="1"/>
+          </p:cNvSpPr>
+          <p:nvPr>
+            <p:ph type="sldNum" sz="quarter" idx="5"/>
+          </p:nvPr>
+        </p:nvSpPr>
+        <p:spPr/>
+        <p:txBody>
+          <a:bodyPr/>
+          <a:lstStyle/>
+          <a:p>
+            <a:fld id="{509FA207-E8FD-4363-95A6-907EB6A63BD8}" type="slidenum">
+              <a:rPr lang="en-US" smtClean="0"/>
+              <a:t>37</a:t>
+            </a:fld>
+            <a:endParaRPr lang="en-US"/>
+          </a:p>
+        </p:txBody>
+      </p:sp>
+    </p:spTree>
+    <p:extLst>
+      <p:ext uri="{BB962C8B-B14F-4D97-AF65-F5344CB8AC3E}">
+        <p14:creationId xmlns:p14="http://schemas.microsoft.com/office/powerpoint/2010/main" val="2503242467"/>
+      </p:ext>
+    </p:extLst>
+  </p:cSld>
+  <p:clrMapOvr>
+    <a:masterClrMapping/>
+  </p:clrMapOvr>
+</p:notes>
+</file>
+
+<file path=ppt/notesSlides/notesSlide18.xml><?xml version="1.0" encoding="utf-8"?>
 <p:notes xmlns:a="http://schemas.openxmlformats.org/drawingml/2006/main" xmlns:r="http://schemas.openxmlformats.org/officeDocument/2006/relationships" xmlns:p="http://schemas.openxmlformats.org/presentationml/2006/main">
   <p:cSld>
     <p:spTree>
@@ -1813,103 +2018,7 @@
           <a:bodyPr/>
           <a:lstStyle/>
           <a:p>
-            <a:pPr marL="342900" marR="0" lvl="0" indent="-342900" rtl="0">
-              <a:lnSpc>
-                <a:spcPct val="107000"/>
-              </a:lnSpc>
-              <a:spcBef>
-                <a:spcPts val="0"/>
-              </a:spcBef>
-              <a:spcAft>
-                <a:spcPts val="0"/>
-              </a:spcAft>
-              <a:buFont typeface="Symbol" panose="05050102010706020507" pitchFamily="18" charset="2"/>
-              <a:buChar char=""/>
-            </a:pPr>
-            <a:r>
-              <a:rPr lang="en-US" sz="1200" dirty="0">
-                <a:effectLst/>
-                <a:latin typeface="Calibri" panose="020F0502020204030204" pitchFamily="34" charset="0"/>
-                <a:ea typeface="Calibri" panose="020F0502020204030204" pitchFamily="34" charset="0"/>
-                <a:cs typeface="Arial" panose="020B0604020202020204" pitchFamily="34" charset="0"/>
-              </a:rPr>
-              <a:t>The tests results indicate that are still bugs in the DUT, which we were not able to find and fix. If the DUT was a commercial IP, we would advise the company to do a thorough debugging process.</a:t>
-            </a:r>
-          </a:p>
-          <a:p>
-            <a:pPr marL="342900" marR="0" lvl="0" indent="-342900">
-              <a:lnSpc>
-                <a:spcPct val="107000"/>
-              </a:lnSpc>
-              <a:spcBef>
-                <a:spcPts val="0"/>
-              </a:spcBef>
-              <a:spcAft>
-                <a:spcPts val="0"/>
-              </a:spcAft>
-              <a:buFont typeface="Symbol" panose="05050102010706020507" pitchFamily="18" charset="2"/>
-              <a:buChar char=""/>
-            </a:pPr>
-            <a:r>
-              <a:rPr lang="en-US" sz="1200" dirty="0">
-                <a:effectLst/>
-                <a:latin typeface="Calibri" panose="020F0502020204030204" pitchFamily="34" charset="0"/>
-                <a:ea typeface="Calibri" panose="020F0502020204030204" pitchFamily="34" charset="0"/>
-                <a:cs typeface="Arial" panose="020B0604020202020204" pitchFamily="34" charset="0"/>
-              </a:rPr>
-              <a:t>The high fail rate in test line 8 indicates that there is an overflow bug when trying to fill the RAMs.</a:t>
-            </a:r>
-          </a:p>
-          <a:p>
-            <a:pPr marL="342900" marR="0" lvl="0" indent="-342900">
-              <a:lnSpc>
-                <a:spcPct val="107000"/>
-              </a:lnSpc>
-              <a:spcBef>
-                <a:spcPts val="0"/>
-              </a:spcBef>
-              <a:spcAft>
-                <a:spcPts val="0"/>
-              </a:spcAft>
-              <a:buFont typeface="Symbol" panose="05050102010706020507" pitchFamily="18" charset="2"/>
-              <a:buChar char=""/>
-            </a:pPr>
-            <a:r>
-              <a:rPr lang="en-US" sz="1200" dirty="0">
-                <a:effectLst/>
-                <a:latin typeface="Calibri" panose="020F0502020204030204" pitchFamily="34" charset="0"/>
-                <a:ea typeface="Calibri" panose="020F0502020204030204" pitchFamily="34" charset="0"/>
-                <a:cs typeface="Arial" panose="020B0604020202020204" pitchFamily="34" charset="0"/>
-              </a:rPr>
-              <a:t>Test line 3 and 4 indicate that as the number of data points increases so does the number of fails.  This could be related to bugs such as overflow, wrong classification of close points, and/or wrong calculations.</a:t>
-            </a:r>
-          </a:p>
-          <a:p>
-            <a:pPr marL="342900" marR="0" lvl="0" indent="-342900">
-              <a:lnSpc>
-                <a:spcPct val="107000"/>
-              </a:lnSpc>
-              <a:spcBef>
-                <a:spcPts val="0"/>
-              </a:spcBef>
-              <a:spcAft>
-                <a:spcPts val="0"/>
-              </a:spcAft>
-              <a:buFont typeface="Symbol" panose="05050102010706020507" pitchFamily="18" charset="2"/>
-              <a:buChar char=""/>
-            </a:pPr>
-            <a:r>
-              <a:rPr lang="en-US" sz="1200" dirty="0">
-                <a:effectLst/>
-                <a:latin typeface="Calibri" panose="020F0502020204030204" pitchFamily="34" charset="0"/>
-                <a:ea typeface="Calibri" panose="020F0502020204030204" pitchFamily="34" charset="0"/>
-                <a:cs typeface="Arial" panose="020B0604020202020204" pitchFamily="34" charset="0"/>
-              </a:rPr>
-              <a:t>Even though many test benches were run on the DUT in its design phase, many tests have failed. This emphasizes the need for an efficient verification environment, as UVM, parallel to the design process.</a:t>
-            </a:r>
-          </a:p>
-          <a:p>
-            <a:pPr marL="342900" marR="0" lvl="0" indent="-342900">
+            <a:pPr>
               <a:lnSpc>
                 <a:spcPct val="107000"/>
               </a:lnSpc>
@@ -1919,38 +2028,75 @@
               <a:spcAft>
                 <a:spcPts val="800"/>
               </a:spcAft>
-              <a:buFont typeface="Symbol" panose="05050102010706020507" pitchFamily="18" charset="2"/>
-              <a:buChar char=""/>
             </a:pPr>
             <a:r>
-              <a:rPr lang="en-US" sz="1200" dirty="0">
-                <a:effectLst/>
-                <a:latin typeface="Calibri" panose="020F0502020204030204" pitchFamily="34" charset="0"/>
-                <a:ea typeface="Calibri" panose="020F0502020204030204" pitchFamily="34" charset="0"/>
-                <a:cs typeface="Arial" panose="020B0604020202020204" pitchFamily="34" charset="0"/>
-              </a:rPr>
-              <a:t>UVM is</a:t>
-            </a:r>
-            <a:r>
-              <a:rPr lang="en-US" sz="1200" dirty="0">
-                <a:solidFill>
-                  <a:srgbClr val="FF0000"/>
-                </a:solidFill>
-                <a:effectLst/>
-                <a:latin typeface="Calibri" panose="020F0502020204030204" pitchFamily="34" charset="0"/>
-                <a:ea typeface="Calibri" panose="020F0502020204030204" pitchFamily="34" charset="0"/>
-                <a:cs typeface="Arial" panose="020B0604020202020204" pitchFamily="34" charset="0"/>
-              </a:rPr>
-              <a:t> </a:t>
-            </a:r>
-            <a:r>
-              <a:rPr lang="en-US" sz="1200" dirty="0">
-                <a:effectLst/>
-                <a:latin typeface="Calibri" panose="020F0502020204030204" pitchFamily="34" charset="0"/>
-                <a:ea typeface="Calibri" panose="020F0502020204030204" pitchFamily="34" charset="0"/>
-                <a:cs typeface="Arial" panose="020B0604020202020204" pitchFamily="34" charset="0"/>
-              </a:rPr>
-              <a:t>an effective tool. It is intuitive, with high level coding and easy to reuse, making the verification process simpler and faster.</a:t>
+              <a:rPr lang="en-US" dirty="0">
+                <a:effectLst/>
+                <a:latin typeface="Calibri" panose="020F0502020204030204" pitchFamily="34" charset="0"/>
+                <a:ea typeface="Calibri" panose="020F0502020204030204" pitchFamily="34" charset="0"/>
+                <a:cs typeface="Arial" panose="020B0604020202020204" pitchFamily="34" charset="0"/>
+              </a:rPr>
+              <a:t>In order to check the functional coverage of the test line, the following cover groups were defined:</a:t>
+            </a:r>
+          </a:p>
+          <a:p>
+            <a:pPr lvl="1">
+              <a:lnSpc>
+                <a:spcPct val="107000"/>
+              </a:lnSpc>
+              <a:spcBef>
+                <a:spcPts val="0"/>
+              </a:spcBef>
+            </a:pPr>
+            <a:r>
+              <a:rPr lang="en-US" sz="2000" dirty="0">
+                <a:effectLst/>
+                <a:latin typeface="Calibri" panose="020F0502020204030204" pitchFamily="34" charset="0"/>
+                <a:ea typeface="Calibri" panose="020F0502020204030204" pitchFamily="34" charset="0"/>
+                <a:cs typeface="Arial" panose="020B0604020202020204" pitchFamily="34" charset="0"/>
+              </a:rPr>
+              <a:t>NUM_POINTS - This cover group samples the number of data points randomly generated for each test, to verify that all values  of this variable are uniformly distributed between 8 and 512.</a:t>
+            </a:r>
+          </a:p>
+          <a:p>
+            <a:pPr lvl="1">
+              <a:lnSpc>
+                <a:spcPct val="107000"/>
+              </a:lnSpc>
+              <a:spcBef>
+                <a:spcPts val="0"/>
+              </a:spcBef>
+            </a:pPr>
+            <a:r>
+              <a:rPr lang="en-US" sz="2000" dirty="0">
+                <a:effectLst/>
+                <a:latin typeface="Calibri" panose="020F0502020204030204" pitchFamily="34" charset="0"/>
+                <a:ea typeface="Calibri" panose="020F0502020204030204" pitchFamily="34" charset="0"/>
+                <a:cs typeface="Arial" panose="020B0604020202020204" pitchFamily="34" charset="0"/>
+              </a:rPr>
+              <a:t>DATA_VALUE - This cover group samples the values of each one of the seven coordinates of all data points randomly generated for each test, to verify that all values  of this variable are uniformly distributed between all the possible values.</a:t>
+            </a:r>
+          </a:p>
+          <a:p>
+            <a:pPr lvl="1">
+              <a:lnSpc>
+                <a:spcPct val="107000"/>
+              </a:lnSpc>
+              <a:spcBef>
+                <a:spcPts val="0"/>
+              </a:spcBef>
+              <a:spcAft>
+                <a:spcPts val="800"/>
+              </a:spcAft>
+            </a:pPr>
+            <a:r>
+              <a:rPr lang="en-US" sz="2000" dirty="0">
+                <a:effectLst/>
+                <a:latin typeface="Calibri" panose="020F0502020204030204" pitchFamily="34" charset="0"/>
+                <a:ea typeface="Calibri" panose="020F0502020204030204" pitchFamily="34" charset="0"/>
+                <a:cs typeface="Arial" panose="020B0604020202020204" pitchFamily="34" charset="0"/>
+              </a:rPr>
+              <a:t>CENTX_VALUE - This cover group samples the value of each one of the seven coordinates of centroid X, randomly generated at each test, to verify that all values of this variable are uniformly distributed between all the possible values.</a:t>
             </a:r>
           </a:p>
           <a:p>
@@ -1975,7 +2121,7 @@
           <a:p>
             <a:fld id="{509FA207-E8FD-4363-95A6-907EB6A63BD8}" type="slidenum">
               <a:rPr lang="en-US" smtClean="0"/>
-              <a:t>45</a:t>
+              <a:t>38</a:t>
             </a:fld>
             <a:endParaRPr lang="en-US"/>
           </a:p>
@@ -1984,7 +2130,91 @@
     </p:spTree>
     <p:extLst>
       <p:ext uri="{BB962C8B-B14F-4D97-AF65-F5344CB8AC3E}">
-        <p14:creationId xmlns:p14="http://schemas.microsoft.com/office/powerpoint/2010/main" val="1839181625"/>
+        <p14:creationId xmlns:p14="http://schemas.microsoft.com/office/powerpoint/2010/main" val="2917502182"/>
+      </p:ext>
+    </p:extLst>
+  </p:cSld>
+  <p:clrMapOvr>
+    <a:masterClrMapping/>
+  </p:clrMapOvr>
+</p:notes>
+</file>
+
+<file path=ppt/notesSlides/notesSlide19.xml><?xml version="1.0" encoding="utf-8"?>
+<p:notes xmlns:a="http://schemas.openxmlformats.org/drawingml/2006/main" xmlns:r="http://schemas.openxmlformats.org/officeDocument/2006/relationships" xmlns:p="http://schemas.openxmlformats.org/presentationml/2006/main">
+  <p:cSld>
+    <p:spTree>
+      <p:nvGrpSpPr>
+        <p:cNvPr id="1" name=""/>
+        <p:cNvGrpSpPr/>
+        <p:nvPr/>
+      </p:nvGrpSpPr>
+      <p:grpSpPr>
+        <a:xfrm>
+          <a:off x="0" y="0"/>
+          <a:ext cx="0" cy="0"/>
+          <a:chOff x="0" y="0"/>
+          <a:chExt cx="0" cy="0"/>
+        </a:xfrm>
+      </p:grpSpPr>
+      <p:sp>
+        <p:nvSpPr>
+          <p:cNvPr id="2" name="מציין מיקום של תמונת שקופית 1"/>
+          <p:cNvSpPr>
+            <a:spLocks noGrp="1" noRot="1" noChangeAspect="1"/>
+          </p:cNvSpPr>
+          <p:nvPr>
+            <p:ph type="sldImg"/>
+          </p:nvPr>
+        </p:nvSpPr>
+        <p:spPr/>
+      </p:sp>
+      <p:sp>
+        <p:nvSpPr>
+          <p:cNvPr id="3" name="מציין מיקום של הערות 2"/>
+          <p:cNvSpPr>
+            <a:spLocks noGrp="1"/>
+          </p:cNvSpPr>
+          <p:nvPr>
+            <p:ph type="body" idx="1"/>
+          </p:nvPr>
+        </p:nvSpPr>
+        <p:spPr/>
+        <p:txBody>
+          <a:bodyPr/>
+          <a:lstStyle/>
+          <a:p>
+            <a:endParaRPr lang="he-IL" dirty="0"/>
+          </a:p>
+        </p:txBody>
+      </p:sp>
+      <p:sp>
+        <p:nvSpPr>
+          <p:cNvPr id="4" name="מציין מיקום של מספר שקופית 3"/>
+          <p:cNvSpPr>
+            <a:spLocks noGrp="1"/>
+          </p:cNvSpPr>
+          <p:nvPr>
+            <p:ph type="sldNum" sz="quarter" idx="5"/>
+          </p:nvPr>
+        </p:nvSpPr>
+        <p:spPr/>
+        <p:txBody>
+          <a:bodyPr/>
+          <a:lstStyle/>
+          <a:p>
+            <a:fld id="{509FA207-E8FD-4363-95A6-907EB6A63BD8}" type="slidenum">
+              <a:rPr lang="en-US" smtClean="0"/>
+              <a:t>44</a:t>
+            </a:fld>
+            <a:endParaRPr lang="en-US"/>
+          </a:p>
+        </p:txBody>
+      </p:sp>
+    </p:spTree>
+    <p:extLst>
+      <p:ext uri="{BB962C8B-B14F-4D97-AF65-F5344CB8AC3E}">
+        <p14:creationId xmlns:p14="http://schemas.microsoft.com/office/powerpoint/2010/main" val="3170983272"/>
       </p:ext>
     </p:extLst>
   </p:cSld>
@@ -2306,6 +2536,231 @@
     <p:extLst>
       <p:ext uri="{BB962C8B-B14F-4D97-AF65-F5344CB8AC3E}">
         <p14:creationId xmlns:p14="http://schemas.microsoft.com/office/powerpoint/2010/main" val="2098685868"/>
+      </p:ext>
+    </p:extLst>
+  </p:cSld>
+  <p:clrMapOvr>
+    <a:masterClrMapping/>
+  </p:clrMapOvr>
+</p:notes>
+</file>
+
+<file path=ppt/notesSlides/notesSlide20.xml><?xml version="1.0" encoding="utf-8"?>
+<p:notes xmlns:a="http://schemas.openxmlformats.org/drawingml/2006/main" xmlns:r="http://schemas.openxmlformats.org/officeDocument/2006/relationships" xmlns:p="http://schemas.openxmlformats.org/presentationml/2006/main">
+  <p:cSld>
+    <p:spTree>
+      <p:nvGrpSpPr>
+        <p:cNvPr id="1" name=""/>
+        <p:cNvGrpSpPr/>
+        <p:nvPr/>
+      </p:nvGrpSpPr>
+      <p:grpSpPr>
+        <a:xfrm>
+          <a:off x="0" y="0"/>
+          <a:ext cx="0" cy="0"/>
+          <a:chOff x="0" y="0"/>
+          <a:chExt cx="0" cy="0"/>
+        </a:xfrm>
+      </p:grpSpPr>
+      <p:sp>
+        <p:nvSpPr>
+          <p:cNvPr id="2" name="Slide Image Placeholder 1"/>
+          <p:cNvSpPr>
+            <a:spLocks noGrp="1" noRot="1" noChangeAspect="1"/>
+          </p:cNvSpPr>
+          <p:nvPr>
+            <p:ph type="sldImg"/>
+          </p:nvPr>
+        </p:nvSpPr>
+        <p:spPr/>
+      </p:sp>
+      <p:sp>
+        <p:nvSpPr>
+          <p:cNvPr id="3" name="Notes Placeholder 2"/>
+          <p:cNvSpPr>
+            <a:spLocks noGrp="1"/>
+          </p:cNvSpPr>
+          <p:nvPr>
+            <p:ph type="body" idx="1"/>
+          </p:nvPr>
+        </p:nvSpPr>
+        <p:spPr/>
+        <p:txBody>
+          <a:bodyPr/>
+          <a:lstStyle/>
+          <a:p>
+            <a:pPr marL="342900" marR="0" lvl="0" indent="-342900" rtl="0">
+              <a:lnSpc>
+                <a:spcPct val="107000"/>
+              </a:lnSpc>
+              <a:spcBef>
+                <a:spcPts val="0"/>
+              </a:spcBef>
+              <a:spcAft>
+                <a:spcPts val="0"/>
+              </a:spcAft>
+              <a:buFont typeface="Symbol" panose="05050102010706020507" pitchFamily="18" charset="2"/>
+              <a:buChar char=""/>
+            </a:pPr>
+            <a:r>
+              <a:rPr lang="en-US" sz="1200" dirty="0">
+                <a:effectLst/>
+                <a:latin typeface="Calibri" panose="020F0502020204030204" pitchFamily="34" charset="0"/>
+                <a:ea typeface="Calibri" panose="020F0502020204030204" pitchFamily="34" charset="0"/>
+                <a:cs typeface="Arial" panose="020B0604020202020204" pitchFamily="34" charset="0"/>
+              </a:rPr>
+              <a:t>The tests results indicate that are still bugs in the DUT, which we were not able to find and fix. If the DUT was a commercial IP, we would advise the company to do a thorough debugging process.</a:t>
+            </a:r>
+          </a:p>
+          <a:p>
+            <a:pPr marL="342900" marR="0" lvl="0" indent="-342900">
+              <a:lnSpc>
+                <a:spcPct val="107000"/>
+              </a:lnSpc>
+              <a:spcBef>
+                <a:spcPts val="0"/>
+              </a:spcBef>
+              <a:spcAft>
+                <a:spcPts val="0"/>
+              </a:spcAft>
+              <a:buFont typeface="Symbol" panose="05050102010706020507" pitchFamily="18" charset="2"/>
+              <a:buChar char=""/>
+            </a:pPr>
+            <a:r>
+              <a:rPr lang="en-US" sz="1200" dirty="0">
+                <a:effectLst/>
+                <a:latin typeface="Calibri" panose="020F0502020204030204" pitchFamily="34" charset="0"/>
+                <a:ea typeface="Calibri" panose="020F0502020204030204" pitchFamily="34" charset="0"/>
+                <a:cs typeface="Arial" panose="020B0604020202020204" pitchFamily="34" charset="0"/>
+              </a:rPr>
+              <a:t>The high fail rate in test line 8 indicates that there is an overflow bug when trying to fill the RAMs.</a:t>
+            </a:r>
+          </a:p>
+          <a:p>
+            <a:pPr marL="342900" marR="0" lvl="0" indent="-342900">
+              <a:lnSpc>
+                <a:spcPct val="107000"/>
+              </a:lnSpc>
+              <a:spcBef>
+                <a:spcPts val="0"/>
+              </a:spcBef>
+              <a:spcAft>
+                <a:spcPts val="0"/>
+              </a:spcAft>
+              <a:buFont typeface="Symbol" panose="05050102010706020507" pitchFamily="18" charset="2"/>
+              <a:buChar char=""/>
+            </a:pPr>
+            <a:r>
+              <a:rPr lang="en-US" sz="1200" dirty="0">
+                <a:effectLst/>
+                <a:latin typeface="Calibri" panose="020F0502020204030204" pitchFamily="34" charset="0"/>
+                <a:ea typeface="Calibri" panose="020F0502020204030204" pitchFamily="34" charset="0"/>
+                <a:cs typeface="Arial" panose="020B0604020202020204" pitchFamily="34" charset="0"/>
+              </a:rPr>
+              <a:t>Test line 3 and 4 indicate that as the number of data points increases so does the number of fails.  This could be related to bugs such as overflow, wrong classification of close points, and/or wrong calculations.</a:t>
+            </a:r>
+          </a:p>
+          <a:p>
+            <a:pPr marL="342900" marR="0" lvl="0" indent="-342900">
+              <a:lnSpc>
+                <a:spcPct val="107000"/>
+              </a:lnSpc>
+              <a:spcBef>
+                <a:spcPts val="0"/>
+              </a:spcBef>
+              <a:spcAft>
+                <a:spcPts val="0"/>
+              </a:spcAft>
+              <a:buFont typeface="Symbol" panose="05050102010706020507" pitchFamily="18" charset="2"/>
+              <a:buChar char=""/>
+            </a:pPr>
+            <a:r>
+              <a:rPr lang="en-US" sz="1200" dirty="0">
+                <a:effectLst/>
+                <a:latin typeface="Calibri" panose="020F0502020204030204" pitchFamily="34" charset="0"/>
+                <a:ea typeface="Calibri" panose="020F0502020204030204" pitchFamily="34" charset="0"/>
+                <a:cs typeface="Arial" panose="020B0604020202020204" pitchFamily="34" charset="0"/>
+              </a:rPr>
+              <a:t>Even though many test benches were run on the DUT in its design phase, many tests have failed. This emphasizes the need for an efficient verification environment, as UVM, parallel to the design process.</a:t>
+            </a:r>
+          </a:p>
+          <a:p>
+            <a:pPr marL="342900" marR="0" lvl="0" indent="-342900">
+              <a:lnSpc>
+                <a:spcPct val="107000"/>
+              </a:lnSpc>
+              <a:spcBef>
+                <a:spcPts val="0"/>
+              </a:spcBef>
+              <a:spcAft>
+                <a:spcPts val="800"/>
+              </a:spcAft>
+              <a:buFont typeface="Symbol" panose="05050102010706020507" pitchFamily="18" charset="2"/>
+              <a:buChar char=""/>
+            </a:pPr>
+            <a:r>
+              <a:rPr lang="en-US" sz="1200" dirty="0">
+                <a:effectLst/>
+                <a:latin typeface="Calibri" panose="020F0502020204030204" pitchFamily="34" charset="0"/>
+                <a:ea typeface="Calibri" panose="020F0502020204030204" pitchFamily="34" charset="0"/>
+                <a:cs typeface="Arial" panose="020B0604020202020204" pitchFamily="34" charset="0"/>
+              </a:rPr>
+              <a:t>UVM is</a:t>
+            </a:r>
+            <a:r>
+              <a:rPr lang="en-US" sz="1200" dirty="0">
+                <a:solidFill>
+                  <a:srgbClr val="FF0000"/>
+                </a:solidFill>
+                <a:effectLst/>
+                <a:latin typeface="Calibri" panose="020F0502020204030204" pitchFamily="34" charset="0"/>
+                <a:ea typeface="Calibri" panose="020F0502020204030204" pitchFamily="34" charset="0"/>
+                <a:cs typeface="Arial" panose="020B0604020202020204" pitchFamily="34" charset="0"/>
+              </a:rPr>
+              <a:t> </a:t>
+            </a:r>
+            <a:r>
+              <a:rPr lang="en-US" sz="1200" dirty="0">
+                <a:effectLst/>
+                <a:latin typeface="Calibri" panose="020F0502020204030204" pitchFamily="34" charset="0"/>
+                <a:ea typeface="Calibri" panose="020F0502020204030204" pitchFamily="34" charset="0"/>
+                <a:cs typeface="Arial" panose="020B0604020202020204" pitchFamily="34" charset="0"/>
+              </a:rPr>
+              <a:t>an effective tool. It is intuitive, with high level coding and easy to reuse, making the verification process simpler and faster.</a:t>
+            </a:r>
+          </a:p>
+          <a:p>
+            <a:endParaRPr lang="en-US" dirty="0"/>
+          </a:p>
+        </p:txBody>
+      </p:sp>
+      <p:sp>
+        <p:nvSpPr>
+          <p:cNvPr id="4" name="Slide Number Placeholder 3"/>
+          <p:cNvSpPr>
+            <a:spLocks noGrp="1"/>
+          </p:cNvSpPr>
+          <p:nvPr>
+            <p:ph type="sldNum" sz="quarter" idx="5"/>
+          </p:nvPr>
+        </p:nvSpPr>
+        <p:spPr/>
+        <p:txBody>
+          <a:bodyPr/>
+          <a:lstStyle/>
+          <a:p>
+            <a:fld id="{509FA207-E8FD-4363-95A6-907EB6A63BD8}" type="slidenum">
+              <a:rPr lang="en-US" smtClean="0"/>
+              <a:t>45</a:t>
+            </a:fld>
+            <a:endParaRPr lang="en-US"/>
+          </a:p>
+        </p:txBody>
+      </p:sp>
+    </p:spTree>
+    <p:extLst>
+      <p:ext uri="{BB962C8B-B14F-4D97-AF65-F5344CB8AC3E}">
+        <p14:creationId xmlns:p14="http://schemas.microsoft.com/office/powerpoint/2010/main" val="1839181625"/>
       </p:ext>
     </p:extLst>
   </p:cSld>
@@ -9003,8 +9458,8 @@
           </a:p>
         </p:txBody>
       </p:sp>
-      <mc:AlternateContent xmlns:mc="http://schemas.openxmlformats.org/markup-compatibility/2006">
-        <mc:Choice xmlns:a14="http://schemas.microsoft.com/office/drawing/2010/main" Requires="a14">
+      <mc:AlternateContent xmlns:mc="http://schemas.openxmlformats.org/markup-compatibility/2006" xmlns:a14="http://schemas.microsoft.com/office/drawing/2010/main">
+        <mc:Choice Requires="a14">
           <p:sp>
             <p:nvSpPr>
               <p:cNvPr id="3" name="Content Placeholder 2">
@@ -9625,7 +10080,7 @@
             </p:txBody>
           </p:sp>
         </mc:Choice>
-        <mc:Fallback>
+        <mc:Fallback xmlns="">
           <p:sp>
             <p:nvSpPr>
               <p:cNvPr id="3" name="Content Placeholder 2">
@@ -12248,7 +12703,7 @@
           <a:p>
             <a:r>
               <a:rPr lang="en-US" dirty="0"/>
-              <a:t>Implemented Environment – Reference Model</a:t>
+              <a:t>Reference Model (1/2)</a:t>
             </a:r>
           </a:p>
         </p:txBody>
@@ -12269,16 +12724,21 @@
             <p:ph idx="1"/>
           </p:nvPr>
         </p:nvSpPr>
-        <p:spPr/>
+        <p:spPr>
+          <a:xfrm>
+            <a:off x="838200" y="2027756"/>
+            <a:ext cx="10515600" cy="4351338"/>
+          </a:xfrm>
+        </p:spPr>
         <p:txBody>
           <a:bodyPr>
-            <a:normAutofit/>
+            <a:normAutofit fontScale="92500" lnSpcReduction="20000"/>
           </a:bodyPr>
           <a:lstStyle/>
           <a:p>
             <a:r>
               <a:rPr lang="en-US" sz="2200" dirty="0"/>
-              <a:t>The Reference Model used to check the DUT results was written using </a:t>
+              <a:t>The Reference Model was written using </a:t>
             </a:r>
             <a:r>
               <a:rPr lang="en-US" sz="2200" dirty="0" err="1"/>
@@ -12286,7 +12746,16 @@
             </a:r>
             <a:r>
               <a:rPr lang="en-US" sz="2200" dirty="0"/>
-              <a:t>. It is </a:t>
+              <a:t>.</a:t>
+            </a:r>
+          </a:p>
+          <a:p>
+            <a:endParaRPr lang="en-US" sz="2200" dirty="0"/>
+          </a:p>
+          <a:p>
+            <a:r>
+              <a:rPr lang="en-US" sz="2200" dirty="0"/>
+              <a:t>A </a:t>
             </a:r>
             <a:r>
               <a:rPr lang="en-US" sz="2200" dirty="0" err="1"/>
@@ -12302,33 +12771,23 @@
             </a:r>
             <a:r>
               <a:rPr lang="en-US" sz="2200" dirty="0"/>
-              <a:t>. This functions implements the K Means algorithm in software. </a:t>
-            </a:r>
-          </a:p>
-          <a:p>
-            <a:pPr>
-              <a:lnSpc>
-                <a:spcPct val="107000"/>
-              </a:lnSpc>
-              <a:spcBef>
-                <a:spcPts val="0"/>
-              </a:spcBef>
-              <a:spcAft>
-                <a:spcPts val="800"/>
-              </a:spcAft>
+              <a:t>, performs the K Means algorithm.</a:t>
+            </a:r>
+          </a:p>
+          <a:p>
+            <a:pPr marL="457200" lvl="1" indent="0">
+              <a:buNone/>
             </a:pPr>
             <a:r>
-              <a:rPr lang="en-US" sz="2200" dirty="0"/>
-              <a:t>The </a:t>
-            </a:r>
-            <a:r>
-              <a:rPr lang="en-US" sz="2200" dirty="0" err="1"/>
-              <a:t>RefModel.m</a:t>
-            </a:r>
-            <a:r>
-              <a:rPr lang="en-US" sz="2200" dirty="0"/>
-              <a:t> function receives five input parameters:</a:t>
-            </a:r>
+              <a:rPr lang="en-US" sz="1800" dirty="0"/>
+              <a:t>The function receives five input parameters, all received with corresponding of DUT numeric representation model:</a:t>
+            </a:r>
+          </a:p>
+          <a:p>
+            <a:pPr marL="457200" lvl="1" indent="0">
+              <a:buNone/>
+            </a:pPr>
+            <a:endParaRPr lang="en-US" sz="1800" dirty="0"/>
           </a:p>
           <a:p>
             <a:pPr lvl="1">
@@ -12340,9 +12799,38 @@
               </a:spcBef>
             </a:pPr>
             <a:r>
-              <a:rPr lang="en-US" sz="2200" dirty="0"/>
-              <a:t>Point input matrix with 512 rows and 7 columns, where each row represent a point in the DUT numeric representation model</a:t>
-            </a:r>
+              <a:rPr lang="en-US" sz="1800" b="1" dirty="0"/>
+              <a:t>Data Points </a:t>
+            </a:r>
+            <a:r>
+              <a:rPr lang="en-US" sz="1800" dirty="0"/>
+              <a:t>matrix with 512 rows and 7 columns.</a:t>
+            </a:r>
+          </a:p>
+          <a:p>
+            <a:pPr lvl="2">
+              <a:lnSpc>
+                <a:spcPct val="107000"/>
+              </a:lnSpc>
+              <a:spcBef>
+                <a:spcPts val="0"/>
+              </a:spcBef>
+            </a:pPr>
+            <a:r>
+              <a:rPr lang="en-US" sz="1400" dirty="0"/>
+              <a:t>Each row represent a point in the data set.</a:t>
+            </a:r>
+          </a:p>
+          <a:p>
+            <a:pPr lvl="2">
+              <a:lnSpc>
+                <a:spcPct val="107000"/>
+              </a:lnSpc>
+              <a:spcBef>
+                <a:spcPts val="0"/>
+              </a:spcBef>
+            </a:pPr>
+            <a:endParaRPr lang="en-US" sz="1400" dirty="0"/>
           </a:p>
           <a:p>
             <a:pPr lvl="1">
@@ -12354,9 +12842,38 @@
               </a:spcBef>
             </a:pPr>
             <a:r>
-              <a:rPr lang="en-US" sz="2200" dirty="0"/>
-              <a:t>Initial centroid matrix with 8 rows and 7 columns, where each row represents an initial centroid value in the DUT numeric representation model.</a:t>
-            </a:r>
+              <a:rPr lang="en-US" sz="1800" b="1" dirty="0"/>
+              <a:t>Initial centroids </a:t>
+            </a:r>
+            <a:r>
+              <a:rPr lang="en-US" sz="1800" dirty="0"/>
+              <a:t>matrix with 8 rows and 7 columns.</a:t>
+            </a:r>
+          </a:p>
+          <a:p>
+            <a:pPr lvl="2">
+              <a:lnSpc>
+                <a:spcPct val="107000"/>
+              </a:lnSpc>
+              <a:spcBef>
+                <a:spcPts val="0"/>
+              </a:spcBef>
+            </a:pPr>
+            <a:r>
+              <a:rPr lang="en-US" sz="1400" dirty="0"/>
+              <a:t>Each row represents an initial centroid value.</a:t>
+            </a:r>
+          </a:p>
+          <a:p>
+            <a:pPr lvl="2">
+              <a:lnSpc>
+                <a:spcPct val="107000"/>
+              </a:lnSpc>
+              <a:spcBef>
+                <a:spcPts val="0"/>
+              </a:spcBef>
+            </a:pPr>
+            <a:endParaRPr lang="en-US" sz="1400" dirty="0"/>
           </a:p>
           <a:p>
             <a:pPr lvl="1">
@@ -12368,8 +12885,12 @@
               </a:spcBef>
             </a:pPr>
             <a:r>
-              <a:rPr lang="en-US" sz="2200" dirty="0"/>
-              <a:t>Input threshold value in the DUT numeric representation model</a:t>
+              <a:rPr lang="en-US" sz="1800" b="1" dirty="0"/>
+              <a:t>Threshold</a:t>
+            </a:r>
+            <a:r>
+              <a:rPr lang="en-US" sz="1800" dirty="0"/>
+              <a:t> value.</a:t>
             </a:r>
           </a:p>
           <a:p>
@@ -12381,10 +12902,32 @@
                 <a:spcPts val="0"/>
               </a:spcBef>
             </a:pPr>
-            <a:r>
-              <a:rPr lang="en-US" sz="2200" dirty="0"/>
-              <a:t>First point index</a:t>
-            </a:r>
+            <a:endParaRPr lang="en-US" sz="1800" dirty="0"/>
+          </a:p>
+          <a:p>
+            <a:pPr lvl="1">
+              <a:lnSpc>
+                <a:spcPct val="107000"/>
+              </a:lnSpc>
+              <a:spcBef>
+                <a:spcPts val="0"/>
+              </a:spcBef>
+            </a:pPr>
+            <a:r>
+              <a:rPr lang="en-US" sz="1800" dirty="0"/>
+              <a:t>First point index of RAM.</a:t>
+            </a:r>
+          </a:p>
+          <a:p>
+            <a:pPr lvl="1">
+              <a:lnSpc>
+                <a:spcPct val="107000"/>
+              </a:lnSpc>
+              <a:spcBef>
+                <a:spcPts val="0"/>
+              </a:spcBef>
+            </a:pPr>
+            <a:endParaRPr lang="en-US" sz="1800" dirty="0"/>
           </a:p>
           <a:p>
             <a:pPr lvl="1">
@@ -12399,8 +12942,8 @@
               </a:spcAft>
             </a:pPr>
             <a:r>
-              <a:rPr lang="en-US" sz="2200" dirty="0"/>
-              <a:t>Last point index</a:t>
+              <a:rPr lang="en-US" sz="1800" dirty="0"/>
+              <a:t>Last point index of RAM.</a:t>
             </a:r>
           </a:p>
           <a:p>
@@ -12466,7 +13009,7 @@
           <a:p>
             <a:r>
               <a:rPr lang="en-US" dirty="0"/>
-              <a:t>Implemented Environment – Reference Model</a:t>
+              <a:t>Reference Model (2/2)</a:t>
             </a:r>
           </a:p>
         </p:txBody>
@@ -12495,11 +13038,11 @@
         </p:spPr>
         <p:txBody>
           <a:bodyPr>
-            <a:normAutofit fontScale="92500"/>
+            <a:normAutofit fontScale="85000" lnSpcReduction="10000"/>
           </a:bodyPr>
           <a:lstStyle/>
           <a:p>
-            <a:pPr marL="0" marR="0">
+            <a:pPr>
               <a:lnSpc>
                 <a:spcPct val="107000"/>
               </a:lnSpc>
@@ -12517,11 +13060,11 @@
                 <a:ea typeface="Calibri" panose="020F0502020204030204" pitchFamily="34" charset="0"/>
                 <a:cs typeface="Arial" panose="020B0604020202020204" pitchFamily="34" charset="0"/>
               </a:rPr>
-              <a:t>These parameters are used in the following way: the Reference model function reads the points values from the “First point index” till the “Last point index” into another matrix, named point matrix , which will be used to run the algorithm. </a:t>
-            </a:r>
-          </a:p>
-          <a:p>
-            <a:pPr marL="0" marR="0">
+              <a:t>The parameters are used in the following way: </a:t>
+            </a:r>
+          </a:p>
+          <a:p>
+            <a:pPr lvl="1">
               <a:lnSpc>
                 <a:spcPct val="107000"/>
               </a:lnSpc>
@@ -12533,38 +13076,69 @@
               </a:spcAft>
             </a:pPr>
             <a:r>
-              <a:rPr lang="en-US" sz="2400" dirty="0">
-                <a:effectLst/>
-                <a:latin typeface="Calibri" panose="020F0502020204030204" pitchFamily="34" charset="0"/>
-                <a:ea typeface="Calibri" panose="020F0502020204030204" pitchFamily="34" charset="0"/>
-                <a:cs typeface="Arial" panose="020B0604020202020204" pitchFamily="34" charset="0"/>
-              </a:rPr>
-              <a:t>Then the function interactively executes the algorithm</a:t>
-            </a:r>
-            <a:r>
-              <a:rPr lang="en-US" sz="2400" dirty="0">
-                <a:solidFill>
-                  <a:srgbClr val="FF0000"/>
-                </a:solidFill>
-                <a:effectLst/>
-                <a:latin typeface="Calibri" panose="020F0502020204030204" pitchFamily="34" charset="0"/>
-                <a:ea typeface="Calibri" panose="020F0502020204030204" pitchFamily="34" charset="0"/>
-                <a:cs typeface="Arial" panose="020B0604020202020204" pitchFamily="34" charset="0"/>
-              </a:rPr>
-              <a:t> </a:t>
-            </a:r>
-            <a:r>
-              <a:rPr lang="en-US" sz="2400" dirty="0">
-                <a:effectLst/>
-                <a:latin typeface="Calibri" panose="020F0502020204030204" pitchFamily="34" charset="0"/>
-                <a:ea typeface="Calibri" panose="020F0502020204030204" pitchFamily="34" charset="0"/>
-                <a:cs typeface="Arial" panose="020B0604020202020204" pitchFamily="34" charset="0"/>
-              </a:rPr>
-              <a:t>using the point matrix, the “input centroid matrix” and the “input threshold”. </a:t>
-            </a:r>
-          </a:p>
-          <a:p>
-            <a:pPr marL="0">
+              <a:rPr lang="en-US" sz="2000" dirty="0">
+                <a:effectLst/>
+                <a:latin typeface="Calibri" panose="020F0502020204030204" pitchFamily="34" charset="0"/>
+                <a:ea typeface="Calibri" panose="020F0502020204030204" pitchFamily="34" charset="0"/>
+                <a:cs typeface="Arial" panose="020B0604020202020204" pitchFamily="34" charset="0"/>
+              </a:rPr>
+              <a:t>The function </a:t>
+            </a:r>
+            <a:r>
+              <a:rPr lang="en-US" sz="2000" b="1" dirty="0">
+                <a:effectLst/>
+                <a:latin typeface="Calibri" panose="020F0502020204030204" pitchFamily="34" charset="0"/>
+                <a:ea typeface="Calibri" panose="020F0502020204030204" pitchFamily="34" charset="0"/>
+                <a:cs typeface="Arial" panose="020B0604020202020204" pitchFamily="34" charset="0"/>
+              </a:rPr>
+              <a:t>reads</a:t>
+            </a:r>
+            <a:r>
+              <a:rPr lang="en-US" sz="2000" dirty="0">
+                <a:effectLst/>
+                <a:latin typeface="Calibri" panose="020F0502020204030204" pitchFamily="34" charset="0"/>
+                <a:ea typeface="Calibri" panose="020F0502020204030204" pitchFamily="34" charset="0"/>
+                <a:cs typeface="Arial" panose="020B0604020202020204" pitchFamily="34" charset="0"/>
+              </a:rPr>
+              <a:t> the points values from the “First point index” till the “Last point index” </a:t>
+            </a:r>
+            <a:r>
+              <a:rPr lang="en-US" sz="2000" dirty="0">
+                <a:latin typeface="Calibri" panose="020F0502020204030204" pitchFamily="34" charset="0"/>
+                <a:ea typeface="Calibri" panose="020F0502020204030204" pitchFamily="34" charset="0"/>
+                <a:cs typeface="Arial" panose="020B0604020202020204" pitchFamily="34" charset="0"/>
+              </a:rPr>
+              <a:t>into</a:t>
+            </a:r>
+            <a:r>
+              <a:rPr lang="en-US" sz="2000" dirty="0">
+                <a:effectLst/>
+                <a:latin typeface="Calibri" panose="020F0502020204030204" pitchFamily="34" charset="0"/>
+                <a:ea typeface="Calibri" panose="020F0502020204030204" pitchFamily="34" charset="0"/>
+                <a:cs typeface="Arial" panose="020B0604020202020204" pitchFamily="34" charset="0"/>
+              </a:rPr>
+              <a:t> another matrix, named </a:t>
+            </a:r>
+            <a:r>
+              <a:rPr lang="en-US" sz="2000" b="1" dirty="0">
+                <a:effectLst/>
+                <a:latin typeface="Calibri" panose="020F0502020204030204" pitchFamily="34" charset="0"/>
+                <a:ea typeface="Calibri" panose="020F0502020204030204" pitchFamily="34" charset="0"/>
+                <a:cs typeface="Arial" panose="020B0604020202020204" pitchFamily="34" charset="0"/>
+              </a:rPr>
+              <a:t>point matrix</a:t>
+            </a:r>
+            <a:r>
+              <a:rPr lang="en-US" sz="2000" b="1" dirty="0">
+                <a:latin typeface="Calibri" panose="020F0502020204030204" pitchFamily="34" charset="0"/>
+                <a:ea typeface="Calibri" panose="020F0502020204030204" pitchFamily="34" charset="0"/>
+                <a:cs typeface="Arial" panose="020B0604020202020204" pitchFamily="34" charset="0"/>
+              </a:rPr>
+              <a:t>.</a:t>
+            </a:r>
+          </a:p>
+          <a:p>
+            <a:pPr lvl="1">
               <a:lnSpc>
                 <a:spcPct val="107000"/>
               </a:lnSpc>
@@ -12577,6 +13151,179 @@
             </a:pPr>
             <a:r>
               <a:rPr lang="en-US" sz="2400" dirty="0">
+                <a:effectLst/>
+                <a:latin typeface="Calibri" panose="020F0502020204030204" pitchFamily="34" charset="0"/>
+                <a:ea typeface="Calibri" panose="020F0502020204030204" pitchFamily="34" charset="0"/>
+                <a:cs typeface="Arial" panose="020B0604020202020204" pitchFamily="34" charset="0"/>
+              </a:rPr>
+              <a:t>Then, the function </a:t>
+            </a:r>
+            <a:r>
+              <a:rPr lang="en-US" sz="2400" b="1" dirty="0">
+                <a:effectLst/>
+                <a:latin typeface="Calibri" panose="020F0502020204030204" pitchFamily="34" charset="0"/>
+                <a:ea typeface="Calibri" panose="020F0502020204030204" pitchFamily="34" charset="0"/>
+                <a:cs typeface="Arial" panose="020B0604020202020204" pitchFamily="34" charset="0"/>
+              </a:rPr>
+              <a:t>interactively</a:t>
+            </a:r>
+            <a:r>
+              <a:rPr lang="en-US" sz="2400" dirty="0">
+                <a:effectLst/>
+                <a:latin typeface="Calibri" panose="020F0502020204030204" pitchFamily="34" charset="0"/>
+                <a:ea typeface="Calibri" panose="020F0502020204030204" pitchFamily="34" charset="0"/>
+                <a:cs typeface="Arial" panose="020B0604020202020204" pitchFamily="34" charset="0"/>
+              </a:rPr>
+              <a:t> </a:t>
+            </a:r>
+            <a:r>
+              <a:rPr lang="en-US" sz="2400" b="1" dirty="0">
+                <a:effectLst/>
+                <a:latin typeface="Calibri" panose="020F0502020204030204" pitchFamily="34" charset="0"/>
+                <a:ea typeface="Calibri" panose="020F0502020204030204" pitchFamily="34" charset="0"/>
+                <a:cs typeface="Arial" panose="020B0604020202020204" pitchFamily="34" charset="0"/>
+              </a:rPr>
+              <a:t>executes</a:t>
+            </a:r>
+            <a:r>
+              <a:rPr lang="en-US" sz="2400" dirty="0">
+                <a:effectLst/>
+                <a:latin typeface="Calibri" panose="020F0502020204030204" pitchFamily="34" charset="0"/>
+                <a:ea typeface="Calibri" panose="020F0502020204030204" pitchFamily="34" charset="0"/>
+                <a:cs typeface="Arial" panose="020B0604020202020204" pitchFamily="34" charset="0"/>
+              </a:rPr>
+              <a:t> the algorithm</a:t>
+            </a:r>
+            <a:r>
+              <a:rPr lang="en-US" sz="2400" dirty="0">
+                <a:solidFill>
+                  <a:srgbClr val="FF0000"/>
+                </a:solidFill>
+                <a:effectLst/>
+                <a:latin typeface="Calibri" panose="020F0502020204030204" pitchFamily="34" charset="0"/>
+                <a:ea typeface="Calibri" panose="020F0502020204030204" pitchFamily="34" charset="0"/>
+                <a:cs typeface="Arial" panose="020B0604020202020204" pitchFamily="34" charset="0"/>
+              </a:rPr>
+              <a:t> </a:t>
+            </a:r>
+            <a:r>
+              <a:rPr lang="en-US" sz="2400" b="1" dirty="0">
+                <a:effectLst/>
+                <a:latin typeface="Calibri" panose="020F0502020204030204" pitchFamily="34" charset="0"/>
+                <a:ea typeface="Calibri" panose="020F0502020204030204" pitchFamily="34" charset="0"/>
+                <a:cs typeface="Arial" panose="020B0604020202020204" pitchFamily="34" charset="0"/>
+              </a:rPr>
+              <a:t>using</a:t>
+            </a:r>
+            <a:r>
+              <a:rPr lang="en-US" sz="2400" dirty="0">
+                <a:effectLst/>
+                <a:latin typeface="Calibri" panose="020F0502020204030204" pitchFamily="34" charset="0"/>
+                <a:ea typeface="Calibri" panose="020F0502020204030204" pitchFamily="34" charset="0"/>
+                <a:cs typeface="Arial" panose="020B0604020202020204" pitchFamily="34" charset="0"/>
+              </a:rPr>
+              <a:t> the following parameters:</a:t>
+            </a:r>
+          </a:p>
+          <a:p>
+            <a:pPr lvl="2">
+              <a:lnSpc>
+                <a:spcPct val="107000"/>
+              </a:lnSpc>
+              <a:spcBef>
+                <a:spcPts val="0"/>
+              </a:spcBef>
+              <a:spcAft>
+                <a:spcPts val="800"/>
+              </a:spcAft>
+            </a:pPr>
+            <a:r>
+              <a:rPr lang="en-US" dirty="0">
+                <a:effectLst/>
+                <a:latin typeface="Calibri" panose="020F0502020204030204" pitchFamily="34" charset="0"/>
+                <a:ea typeface="Calibri" panose="020F0502020204030204" pitchFamily="34" charset="0"/>
+                <a:cs typeface="Arial" panose="020B0604020202020204" pitchFamily="34" charset="0"/>
+              </a:rPr>
+              <a:t>point matrix.</a:t>
+            </a:r>
+          </a:p>
+          <a:p>
+            <a:pPr lvl="2">
+              <a:lnSpc>
+                <a:spcPct val="107000"/>
+              </a:lnSpc>
+              <a:spcBef>
+                <a:spcPts val="0"/>
+              </a:spcBef>
+              <a:spcAft>
+                <a:spcPts val="800"/>
+              </a:spcAft>
+            </a:pPr>
+            <a:r>
+              <a:rPr lang="en-US" dirty="0">
+                <a:effectLst/>
+                <a:latin typeface="Calibri" panose="020F0502020204030204" pitchFamily="34" charset="0"/>
+                <a:ea typeface="Calibri" panose="020F0502020204030204" pitchFamily="34" charset="0"/>
+                <a:cs typeface="Arial" panose="020B0604020202020204" pitchFamily="34" charset="0"/>
+              </a:rPr>
+              <a:t>“initial centroid matrix”</a:t>
+            </a:r>
+          </a:p>
+          <a:p>
+            <a:pPr lvl="2">
+              <a:lnSpc>
+                <a:spcPct val="107000"/>
+              </a:lnSpc>
+              <a:spcBef>
+                <a:spcPts val="0"/>
+              </a:spcBef>
+              <a:spcAft>
+                <a:spcPts val="800"/>
+              </a:spcAft>
+            </a:pPr>
+            <a:r>
+              <a:rPr lang="en-US" dirty="0">
+                <a:effectLst/>
+                <a:latin typeface="Calibri" panose="020F0502020204030204" pitchFamily="34" charset="0"/>
+                <a:ea typeface="Calibri" panose="020F0502020204030204" pitchFamily="34" charset="0"/>
+                <a:cs typeface="Arial" panose="020B0604020202020204" pitchFamily="34" charset="0"/>
+              </a:rPr>
+              <a:t>“Threshold”.</a:t>
+            </a:r>
+          </a:p>
+          <a:p>
+            <a:pPr lvl="2">
+              <a:lnSpc>
+                <a:spcPct val="107000"/>
+              </a:lnSpc>
+              <a:spcBef>
+                <a:spcPts val="0"/>
+              </a:spcBef>
+              <a:spcAft>
+                <a:spcPts val="800"/>
+              </a:spcAft>
+            </a:pPr>
+            <a:endParaRPr lang="en-US" dirty="0">
+              <a:effectLst/>
+              <a:latin typeface="Calibri" panose="020F0502020204030204" pitchFamily="34" charset="0"/>
+              <a:ea typeface="Calibri" panose="020F0502020204030204" pitchFamily="34" charset="0"/>
+              <a:cs typeface="Arial" panose="020B0604020202020204" pitchFamily="34" charset="0"/>
+            </a:endParaRPr>
+          </a:p>
+          <a:p>
+            <a:pPr>
+              <a:lnSpc>
+                <a:spcPct val="107000"/>
+              </a:lnSpc>
+              <a:spcBef>
+                <a:spcPts val="0"/>
+              </a:spcBef>
+              <a:spcAft>
+                <a:spcPts val="800"/>
+              </a:spcAft>
+            </a:pPr>
+            <a:r>
+              <a:rPr lang="en-US" sz="2200" dirty="0">
                 <a:effectLst/>
                 <a:latin typeface="Calibri" panose="020F0502020204030204" pitchFamily="34" charset="0"/>
                 <a:ea typeface="Calibri" panose="020F0502020204030204" pitchFamily="34" charset="0"/>
@@ -12715,14 +13462,66 @@
             <p:ph idx="1"/>
           </p:nvPr>
         </p:nvSpPr>
-        <p:spPr/>
+        <p:spPr>
+          <a:xfrm>
+            <a:off x="838200" y="2141537"/>
+            <a:ext cx="10515600" cy="4351338"/>
+          </a:xfrm>
+        </p:spPr>
         <p:txBody>
-          <a:bodyPr/>
+          <a:bodyPr>
+            <a:normAutofit/>
+          </a:bodyPr>
           <a:lstStyle/>
           <a:p>
-            <a:r>
-              <a:rPr lang="en-US" dirty="0"/>
-              <a:t>In order to verify the functionality of the communication with the DUT, an early test was done in which all registers of the DUT Reg File were written to and read from. This test was successful, leading to the conclusion that the communication protocol with the DUT works correctly. </a:t>
+            <a:pPr marL="0" indent="0">
+              <a:buNone/>
+            </a:pPr>
+            <a:r>
+              <a:rPr lang="en-US" sz="2000" u="sng" dirty="0"/>
+              <a:t>Purpose: </a:t>
+            </a:r>
+            <a:r>
+              <a:rPr lang="en-US" sz="2000" dirty="0"/>
+              <a:t>Verify the functionality of the communication with the DUT.</a:t>
+            </a:r>
+          </a:p>
+          <a:p>
+            <a:pPr marL="0" indent="0">
+              <a:buNone/>
+            </a:pPr>
+            <a:endParaRPr lang="en-US" sz="2000" dirty="0"/>
+          </a:p>
+          <a:p>
+            <a:r>
+              <a:rPr lang="en-US" sz="2000" dirty="0"/>
+              <a:t>an early test was done, </a:t>
+            </a:r>
+            <a:r>
+              <a:rPr lang="en-US" sz="2000" b="1" dirty="0"/>
+              <a:t>separately</a:t>
+            </a:r>
+            <a:r>
+              <a:rPr lang="en-US" sz="2000" dirty="0"/>
+              <a:t> from the following test plan.</a:t>
+            </a:r>
+          </a:p>
+          <a:p>
+            <a:endParaRPr lang="en-US" sz="2000" dirty="0"/>
+          </a:p>
+          <a:p>
+            <a:r>
+              <a:rPr lang="en-US" sz="2000" dirty="0"/>
+              <a:t>All registers of the DUT Reg File were written to and read from.</a:t>
+            </a:r>
+          </a:p>
+          <a:p>
+            <a:endParaRPr lang="en-US" sz="2000" dirty="0"/>
+          </a:p>
+          <a:p>
+            <a:r>
+              <a:rPr lang="en-US" sz="2000" dirty="0"/>
+              <a:t>This test was successful, leading to the conclusion that the communication protocol with the DUT works correctly.</a:t>
             </a:r>
           </a:p>
         </p:txBody>
@@ -12801,30 +13600,106 @@
             <p:ph idx="1"/>
           </p:nvPr>
         </p:nvSpPr>
-        <p:spPr/>
+        <p:spPr>
+          <a:xfrm>
+            <a:off x="838200" y="1690688"/>
+            <a:ext cx="10515600" cy="4620012"/>
+          </a:xfrm>
+        </p:spPr>
         <p:txBody>
-          <a:bodyPr/>
+          <a:bodyPr>
+            <a:normAutofit lnSpcReduction="10000"/>
+          </a:bodyPr>
           <a:lstStyle/>
           <a:p>
             <a:r>
-              <a:rPr lang="en-US" dirty="0"/>
-              <a:t>Each Test Scenario detail here was built and run. The purpose of these test lines is to test the main functionality of the DUT and not the communications protocol.</a:t>
-            </a:r>
-          </a:p>
-          <a:p>
-            <a:r>
-              <a:rPr lang="en-US" dirty="0"/>
-              <a:t>For each test, the pass/fail criteria is as described in the Scoreboard class.</a:t>
-            </a:r>
-          </a:p>
-          <a:p>
-            <a:r>
-              <a:rPr lang="en-US" dirty="0"/>
-              <a:t>In each test scenario, different parameters are set .These parameters are sent to the DUT and the REF Model. The outputs given by the DUT and the REF Model for the mentioned input are compared. They are considered equivalent if every output centroid presented by the DUT is also presented by the REF Model.</a:t>
-            </a:r>
-          </a:p>
-          <a:p>
-            <a:endParaRPr lang="en-US" dirty="0"/>
+              <a:rPr lang="en-US" sz="2000" dirty="0"/>
+              <a:t>In the following slides there would be a numerical order of different test scenarios.</a:t>
+            </a:r>
+          </a:p>
+          <a:p>
+            <a:endParaRPr lang="en-US" sz="2000" dirty="0"/>
+          </a:p>
+          <a:p>
+            <a:r>
+              <a:rPr lang="en-US" sz="2000" dirty="0"/>
+              <a:t>Each Test Scenario detail here was built and run.</a:t>
+            </a:r>
+          </a:p>
+          <a:p>
+            <a:endParaRPr lang="en-US" sz="2000" dirty="0"/>
+          </a:p>
+          <a:p>
+            <a:r>
+              <a:rPr lang="en-US" sz="2000" dirty="0"/>
+              <a:t>The </a:t>
+            </a:r>
+            <a:r>
+              <a:rPr lang="en-US" sz="2000" b="1" dirty="0"/>
+              <a:t>purpose</a:t>
+            </a:r>
+            <a:r>
+              <a:rPr lang="en-US" sz="2000" dirty="0"/>
+              <a:t> of these test lines is to test the </a:t>
+            </a:r>
+            <a:r>
+              <a:rPr lang="en-US" sz="2000" b="1" dirty="0"/>
+              <a:t>main functionality </a:t>
+            </a:r>
+            <a:r>
+              <a:rPr lang="en-US" sz="2000" dirty="0"/>
+              <a:t>of the DUT.</a:t>
+            </a:r>
+          </a:p>
+          <a:p>
+            <a:endParaRPr lang="en-US" sz="2000" dirty="0"/>
+          </a:p>
+          <a:p>
+            <a:r>
+              <a:rPr lang="en-US" sz="2000" dirty="0"/>
+              <a:t>The </a:t>
+            </a:r>
+            <a:r>
+              <a:rPr lang="en-US" sz="2000" dirty="0" err="1"/>
+              <a:t>criterias</a:t>
+            </a:r>
+            <a:r>
+              <a:rPr lang="en-US" sz="2000" dirty="0"/>
+              <a:t> of pass/fail criteria are handled by the scoreboard.</a:t>
+            </a:r>
+          </a:p>
+          <a:p>
+            <a:endParaRPr lang="en-US" sz="2000" dirty="0"/>
+          </a:p>
+          <a:p>
+            <a:r>
+              <a:rPr lang="en-US" sz="2000" dirty="0"/>
+              <a:t>In each test scenario, different parameters are set</a:t>
+            </a:r>
+          </a:p>
+          <a:p>
+            <a:pPr lvl="1"/>
+            <a:r>
+              <a:rPr lang="en-US" sz="1800" dirty="0"/>
+              <a:t>These parameters are sent to the DUT and the REF Model.</a:t>
+            </a:r>
+          </a:p>
+          <a:p>
+            <a:pPr lvl="1"/>
+            <a:r>
+              <a:rPr lang="en-US" sz="1800" dirty="0"/>
+              <a:t>The outputs from both are compared.</a:t>
+            </a:r>
+          </a:p>
+          <a:p>
+            <a:pPr lvl="1"/>
+            <a:r>
+              <a:rPr lang="en-US" sz="1800" dirty="0"/>
+              <a:t>They are considered equivalent if every output centroid from each set has a corresponding “close” centroid in the other set (up to threshold value).</a:t>
+            </a:r>
+          </a:p>
+          <a:p>
+            <a:endParaRPr lang="en-US" sz="2000" dirty="0"/>
           </a:p>
         </p:txBody>
       </p:sp>
@@ -15509,7 +16384,7 @@
           <a:p>
             <a:r>
               <a:rPr lang="en-US" dirty="0"/>
-              <a:t>Hardware Verification – Why?</a:t>
+              <a:t>Hardware Verification – Motivation</a:t>
             </a:r>
           </a:p>
         </p:txBody>
@@ -16702,7 +17577,7 @@
           <a:lstStyle/>
           <a:p>
             <a:r>
-              <a:rPr lang="en-US" dirty="0">
+              <a:rPr lang="en-US" sz="2400" dirty="0">
                 <a:effectLst/>
                 <a:latin typeface="Calibri" panose="020F0502020204030204" pitchFamily="34" charset="0"/>
                 <a:ea typeface="Calibri" panose="020F0502020204030204" pitchFamily="34" charset="0"/>
@@ -16717,7 +17592,7 @@
               <a:buAutoNum type="arabicPeriod"/>
             </a:pPr>
             <a:r>
-              <a:rPr lang="en-US" sz="2800" dirty="0">
+              <a:rPr lang="en-US" dirty="0">
                 <a:latin typeface="Calibri" panose="020F0502020204030204" pitchFamily="34" charset="0"/>
                 <a:cs typeface="Arial" panose="020B0604020202020204" pitchFamily="34" charset="0"/>
               </a:rPr>
@@ -16730,14 +17605,14 @@
               <a:buAutoNum type="arabicPeriod"/>
             </a:pPr>
             <a:r>
-              <a:rPr lang="en-US" sz="2800" dirty="0">
+              <a:rPr lang="en-US" dirty="0">
                 <a:latin typeface="Calibri" panose="020F0502020204030204" pitchFamily="34" charset="0"/>
                 <a:cs typeface="Arial" panose="020B0604020202020204" pitchFamily="34" charset="0"/>
               </a:rPr>
               <a:t>Fix 2's complement representation </a:t>
             </a:r>
             <a:r>
-              <a:rPr lang="en-US" sz="2800" dirty="0">
+              <a:rPr lang="en-US" dirty="0">
                 <a:effectLst/>
                 <a:latin typeface="Calibri" panose="020F0502020204030204" pitchFamily="34" charset="0"/>
                 <a:ea typeface="Calibri" panose="020F0502020204030204" pitchFamily="34" charset="0"/>
@@ -16745,7 +17620,7 @@
               </a:rPr>
               <a:t>of numbers</a:t>
             </a:r>
-            <a:endParaRPr lang="en-US" sz="3600" dirty="0"/>
+            <a:endParaRPr lang="en-US" sz="3200" dirty="0"/>
           </a:p>
         </p:txBody>
       </p:sp>
@@ -17233,10 +18108,227 @@
             <p:ph idx="1"/>
           </p:nvPr>
         </p:nvSpPr>
-        <p:spPr/>
+        <p:spPr>
+          <a:xfrm>
+            <a:off x="838200" y="1690688"/>
+            <a:ext cx="10515600" cy="4351338"/>
+          </a:xfrm>
+        </p:spPr>
         <p:txBody>
-          <a:bodyPr/>
+          <a:bodyPr>
+            <a:normAutofit/>
+          </a:bodyPr>
           <a:lstStyle/>
+          <a:p>
+            <a:pPr marL="0" indent="0">
+              <a:lnSpc>
+                <a:spcPct val="107000"/>
+              </a:lnSpc>
+              <a:spcBef>
+                <a:spcPts val="0"/>
+              </a:spcBef>
+              <a:spcAft>
+                <a:spcPts val="800"/>
+              </a:spcAft>
+              <a:buNone/>
+            </a:pPr>
+            <a:r>
+              <a:rPr lang="en-US" sz="1800" u="sng" dirty="0">
+                <a:effectLst/>
+                <a:latin typeface="Calibri" panose="020F0502020204030204" pitchFamily="34" charset="0"/>
+                <a:ea typeface="Calibri" panose="020F0502020204030204" pitchFamily="34" charset="0"/>
+                <a:cs typeface="Arial" panose="020B0604020202020204" pitchFamily="34" charset="0"/>
+              </a:rPr>
+              <a:t>Motivation:</a:t>
+            </a:r>
+          </a:p>
+          <a:p>
+            <a:pPr>
+              <a:lnSpc>
+                <a:spcPct val="107000"/>
+              </a:lnSpc>
+              <a:spcBef>
+                <a:spcPts val="0"/>
+              </a:spcBef>
+              <a:spcAft>
+                <a:spcPts val="800"/>
+              </a:spcAft>
+            </a:pPr>
+            <a:r>
+              <a:rPr lang="en-US" sz="1800" dirty="0">
+                <a:effectLst/>
+                <a:latin typeface="Calibri" panose="020F0502020204030204" pitchFamily="34" charset="0"/>
+                <a:ea typeface="Calibri" panose="020F0502020204030204" pitchFamily="34" charset="0"/>
+                <a:cs typeface="Arial" panose="020B0604020202020204" pitchFamily="34" charset="0"/>
+              </a:rPr>
+              <a:t>The testcase pass/fail results are used to </a:t>
+            </a:r>
+            <a:r>
+              <a:rPr lang="en-US" sz="1800" b="1" dirty="0">
+                <a:effectLst/>
+                <a:latin typeface="Calibri" panose="020F0502020204030204" pitchFamily="34" charset="0"/>
+                <a:ea typeface="Calibri" panose="020F0502020204030204" pitchFamily="34" charset="0"/>
+                <a:cs typeface="Arial" panose="020B0604020202020204" pitchFamily="34" charset="0"/>
+              </a:rPr>
+              <a:t>measure</a:t>
+            </a:r>
+            <a:r>
+              <a:rPr lang="en-US" sz="1800" dirty="0">
+                <a:effectLst/>
+                <a:latin typeface="Calibri" panose="020F0502020204030204" pitchFamily="34" charset="0"/>
+                <a:ea typeface="Calibri" panose="020F0502020204030204" pitchFamily="34" charset="0"/>
+                <a:cs typeface="Arial" panose="020B0604020202020204" pitchFamily="34" charset="0"/>
+              </a:rPr>
+              <a:t> the verification status.</a:t>
+            </a:r>
+          </a:p>
+          <a:p>
+            <a:pPr>
+              <a:lnSpc>
+                <a:spcPct val="107000"/>
+              </a:lnSpc>
+              <a:spcBef>
+                <a:spcPts val="0"/>
+              </a:spcBef>
+              <a:spcAft>
+                <a:spcPts val="800"/>
+              </a:spcAft>
+            </a:pPr>
+            <a:r>
+              <a:rPr lang="en-US" sz="1800" dirty="0">
+                <a:latin typeface="Calibri" panose="020F0502020204030204" pitchFamily="34" charset="0"/>
+                <a:ea typeface="Calibri" panose="020F0502020204030204" pitchFamily="34" charset="0"/>
+                <a:cs typeface="Arial" panose="020B0604020202020204" pitchFamily="34" charset="0"/>
+              </a:rPr>
+              <a:t>T</a:t>
+            </a:r>
+            <a:r>
+              <a:rPr lang="en-US" sz="1800" dirty="0">
+                <a:effectLst/>
+                <a:latin typeface="Calibri" panose="020F0502020204030204" pitchFamily="34" charset="0"/>
+                <a:ea typeface="Calibri" panose="020F0502020204030204" pitchFamily="34" charset="0"/>
+                <a:cs typeface="Arial" panose="020B0604020202020204" pitchFamily="34" charset="0"/>
+              </a:rPr>
+              <a:t>hey are </a:t>
+            </a:r>
+            <a:r>
+              <a:rPr lang="en-US" sz="1800" b="1" dirty="0">
+                <a:effectLst/>
+                <a:latin typeface="Calibri" panose="020F0502020204030204" pitchFamily="34" charset="0"/>
+                <a:ea typeface="Calibri" panose="020F0502020204030204" pitchFamily="34" charset="0"/>
+                <a:cs typeface="Arial" panose="020B0604020202020204" pitchFamily="34" charset="0"/>
+              </a:rPr>
+              <a:t>limited</a:t>
+            </a:r>
+            <a:r>
+              <a:rPr lang="en-US" sz="1800" dirty="0">
+                <a:effectLst/>
+                <a:latin typeface="Calibri" panose="020F0502020204030204" pitchFamily="34" charset="0"/>
+                <a:ea typeface="Calibri" panose="020F0502020204030204" pitchFamily="34" charset="0"/>
+                <a:cs typeface="Arial" panose="020B0604020202020204" pitchFamily="34" charset="0"/>
+              </a:rPr>
+              <a:t> in terms of randomness.</a:t>
+            </a:r>
+          </a:p>
+          <a:p>
+            <a:pPr>
+              <a:lnSpc>
+                <a:spcPct val="107000"/>
+              </a:lnSpc>
+              <a:spcBef>
+                <a:spcPts val="0"/>
+              </a:spcBef>
+              <a:spcAft>
+                <a:spcPts val="800"/>
+              </a:spcAft>
+            </a:pPr>
+            <a:r>
+              <a:rPr lang="en-US" sz="1800" dirty="0">
+                <a:latin typeface="Calibri" panose="020F0502020204030204" pitchFamily="34" charset="0"/>
+                <a:ea typeface="Calibri" panose="020F0502020204030204" pitchFamily="34" charset="0"/>
+                <a:cs typeface="Arial" panose="020B0604020202020204" pitchFamily="34" charset="0"/>
+              </a:rPr>
+              <a:t>The engineer should verify that the test </a:t>
+            </a:r>
+            <a:r>
+              <a:rPr lang="en-US" sz="1800" b="1" dirty="0">
+                <a:latin typeface="Calibri" panose="020F0502020204030204" pitchFamily="34" charset="0"/>
+                <a:ea typeface="Calibri" panose="020F0502020204030204" pitchFamily="34" charset="0"/>
+                <a:cs typeface="Arial" panose="020B0604020202020204" pitchFamily="34" charset="0"/>
+              </a:rPr>
+              <a:t>fully cover </a:t>
+            </a:r>
+            <a:r>
+              <a:rPr lang="en-US" sz="1800" dirty="0">
+                <a:latin typeface="Calibri" panose="020F0502020204030204" pitchFamily="34" charset="0"/>
+                <a:ea typeface="Calibri" panose="020F0502020204030204" pitchFamily="34" charset="0"/>
+                <a:cs typeface="Arial" panose="020B0604020202020204" pitchFamily="34" charset="0"/>
+              </a:rPr>
+              <a:t>the defined constrains.</a:t>
+            </a:r>
+            <a:endParaRPr lang="en-US" sz="1800" dirty="0">
+              <a:effectLst/>
+              <a:latin typeface="Calibri" panose="020F0502020204030204" pitchFamily="34" charset="0"/>
+              <a:ea typeface="Calibri" panose="020F0502020204030204" pitchFamily="34" charset="0"/>
+              <a:cs typeface="Arial" panose="020B0604020202020204" pitchFamily="34" charset="0"/>
+            </a:endParaRPr>
+          </a:p>
+          <a:p>
+            <a:pPr>
+              <a:lnSpc>
+                <a:spcPct val="107000"/>
+              </a:lnSpc>
+              <a:spcBef>
+                <a:spcPts val="0"/>
+              </a:spcBef>
+              <a:spcAft>
+                <a:spcPts val="800"/>
+              </a:spcAft>
+            </a:pPr>
+            <a:r>
+              <a:rPr lang="en-US" sz="1800" dirty="0">
+                <a:latin typeface="Calibri" panose="020F0502020204030204" pitchFamily="34" charset="0"/>
+                <a:ea typeface="Calibri" panose="020F0502020204030204" pitchFamily="34" charset="0"/>
+                <a:cs typeface="Arial" panose="020B0604020202020204" pitchFamily="34" charset="0"/>
+              </a:rPr>
+              <a:t>Therefore, test coverages are </a:t>
+            </a:r>
+            <a:r>
+              <a:rPr lang="en-US" sz="1800" b="1" dirty="0">
+                <a:latin typeface="Calibri" panose="020F0502020204030204" pitchFamily="34" charset="0"/>
+                <a:ea typeface="Calibri" panose="020F0502020204030204" pitchFamily="34" charset="0"/>
+                <a:cs typeface="Arial" panose="020B0604020202020204" pitchFamily="34" charset="0"/>
+              </a:rPr>
+              <a:t>defined</a:t>
+            </a:r>
+            <a:r>
+              <a:rPr lang="en-US" sz="1800" dirty="0">
+                <a:latin typeface="Calibri" panose="020F0502020204030204" pitchFamily="34" charset="0"/>
+                <a:ea typeface="Calibri" panose="020F0502020204030204" pitchFamily="34" charset="0"/>
+                <a:cs typeface="Arial" panose="020B0604020202020204" pitchFamily="34" charset="0"/>
+              </a:rPr>
+              <a:t>.</a:t>
+            </a:r>
+          </a:p>
+          <a:p>
+            <a:pPr>
+              <a:lnSpc>
+                <a:spcPct val="107000"/>
+              </a:lnSpc>
+              <a:spcBef>
+                <a:spcPts val="0"/>
+              </a:spcBef>
+              <a:spcAft>
+                <a:spcPts val="800"/>
+              </a:spcAft>
+            </a:pPr>
+            <a:endParaRPr lang="en-US" sz="1800" dirty="0">
+              <a:effectLst/>
+              <a:latin typeface="Calibri" panose="020F0502020204030204" pitchFamily="34" charset="0"/>
+              <a:ea typeface="Calibri" panose="020F0502020204030204" pitchFamily="34" charset="0"/>
+              <a:cs typeface="Arial" panose="020B0604020202020204" pitchFamily="34" charset="0"/>
+            </a:endParaRPr>
+          </a:p>
           <a:p>
             <a:pPr marL="0" marR="0" indent="0">
               <a:lnSpc>
@@ -17251,58 +18343,7 @@
               <a:buNone/>
             </a:pPr>
             <a:r>
-              <a:rPr lang="en-US" sz="1800" dirty="0">
-                <a:effectLst/>
-                <a:latin typeface="Calibri" panose="020F0502020204030204" pitchFamily="34" charset="0"/>
-                <a:ea typeface="Calibri" panose="020F0502020204030204" pitchFamily="34" charset="0"/>
-                <a:cs typeface="Arial" panose="020B0604020202020204" pitchFamily="34" charset="0"/>
-              </a:rPr>
-              <a:t>In traditional directed verification methodology, the testcase pass/fail results are used to measure the verification status (functional correctness) &amp;, but the test are limited in terms of randomness.</a:t>
-            </a:r>
-          </a:p>
-          <a:p>
-            <a:pPr marL="0" marR="0" indent="0">
-              <a:lnSpc>
-                <a:spcPct val="107000"/>
-              </a:lnSpc>
-              <a:spcBef>
-                <a:spcPts val="0"/>
-              </a:spcBef>
-              <a:spcAft>
-                <a:spcPts val="800"/>
-              </a:spcAft>
-              <a:buNone/>
-            </a:pPr>
-            <a:r>
-              <a:rPr lang="en-US" sz="1800" dirty="0">
-                <a:latin typeface="Calibri" panose="020F0502020204030204" pitchFamily="34" charset="0"/>
-                <a:ea typeface="Calibri" panose="020F0502020204030204" pitchFamily="34" charset="0"/>
-                <a:cs typeface="Arial" panose="020B0604020202020204" pitchFamily="34" charset="0"/>
-              </a:rPr>
-              <a:t>In the constrain random verification method, the engineer should verify that the test fully cover the defined constrains, therefore test coverages are defined.</a:t>
-            </a:r>
-            <a:endParaRPr lang="en-US" sz="1800" dirty="0">
-              <a:effectLst/>
-              <a:latin typeface="Calibri" panose="020F0502020204030204" pitchFamily="34" charset="0"/>
-              <a:ea typeface="Calibri" panose="020F0502020204030204" pitchFamily="34" charset="0"/>
-              <a:cs typeface="Arial" panose="020B0604020202020204" pitchFamily="34" charset="0"/>
-            </a:endParaRPr>
-          </a:p>
-          <a:p>
-            <a:pPr marL="0" marR="0" indent="0">
-              <a:lnSpc>
-                <a:spcPct val="107000"/>
-              </a:lnSpc>
-              <a:spcBef>
-                <a:spcPts val="0"/>
-              </a:spcBef>
-              <a:spcAft>
-                <a:spcPts val="800"/>
-              </a:spcAft>
-              <a:buNone/>
-            </a:pPr>
-            <a:r>
-              <a:rPr lang="en-US" sz="1800" dirty="0">
+              <a:rPr lang="en-US" sz="1800" u="sng" dirty="0">
                 <a:effectLst/>
                 <a:latin typeface="Calibri" panose="020F0502020204030204" pitchFamily="34" charset="0"/>
                 <a:ea typeface="Calibri" panose="020F0502020204030204" pitchFamily="34" charset="0"/>
@@ -17332,7 +18373,7 @@
                 <a:ea typeface="Calibri" panose="020F0502020204030204" pitchFamily="34" charset="0"/>
                 <a:cs typeface="Arial" panose="020B0604020202020204" pitchFamily="34" charset="0"/>
               </a:rPr>
-              <a:t>Code Coverage (which lines of code are executed)</a:t>
+              <a:t>Code Coverage.</a:t>
             </a:r>
           </a:p>
           <a:p>
@@ -17356,7 +18397,7 @@
                 <a:ea typeface="Calibri" panose="020F0502020204030204" pitchFamily="34" charset="0"/>
                 <a:cs typeface="Arial" panose="020B0604020202020204" pitchFamily="34" charset="0"/>
               </a:rPr>
-              <a:t>Condition Coverage (whether all branches of conditions have been exercised.)</a:t>
+              <a:t>Condition Coverage.</a:t>
             </a:r>
           </a:p>
           <a:p>
@@ -17380,7 +18421,7 @@
                 <a:ea typeface="Calibri" panose="020F0502020204030204" pitchFamily="34" charset="0"/>
                 <a:cs typeface="Arial" panose="020B0604020202020204" pitchFamily="34" charset="0"/>
               </a:rPr>
-              <a:t>Functional coverage (how much design functionality has been exercised/covered by the testbench or verification environment)</a:t>
+              <a:t>Functional Coverage. </a:t>
             </a:r>
           </a:p>
           <a:p>
@@ -17392,7 +18433,7 @@
                 <a:spcPts val="0"/>
               </a:spcBef>
               <a:spcAft>
-                <a:spcPts val="800"/>
+                <a:spcPts val="0"/>
               </a:spcAft>
               <a:buFont typeface="Symbol" panose="05050102010706020507" pitchFamily="18" charset="2"/>
               <a:buChar char=""/>
@@ -17404,10 +18445,8 @@
                 <a:ea typeface="Calibri" panose="020F0502020204030204" pitchFamily="34" charset="0"/>
                 <a:cs typeface="Arial" panose="020B0604020202020204" pitchFamily="34" charset="0"/>
               </a:rPr>
-              <a:t>FSM Coverage (which states and possible state transitions are exercised)</a:t>
-            </a:r>
-          </a:p>
-          <a:p>
+              <a:t>FSM Coverage.</a:t>
+            </a:r>
             <a:endParaRPr lang="en-US" dirty="0"/>
           </a:p>
         </p:txBody>
@@ -17488,8 +18527,8 @@
         </p:nvSpPr>
         <p:spPr>
           <a:xfrm>
-            <a:off x="838200" y="1825625"/>
-            <a:ext cx="5257800" cy="4351338"/>
+            <a:off x="838200" y="2278180"/>
+            <a:ext cx="5257800" cy="2967756"/>
           </a:xfrm>
         </p:spPr>
         <p:txBody>
@@ -17499,30 +18538,36 @@
           <a:lstStyle/>
           <a:p>
             <a:r>
-              <a:rPr lang="en-US" dirty="0"/>
-              <a:t>Coverage was performed for the test line called Robustness</a:t>
-            </a:r>
-            <a:r>
-              <a:rPr lang="he-IL"/>
-              <a:t> </a:t>
-            </a:r>
-            <a:r>
-              <a:rPr lang="en-US"/>
-              <a:t>because </a:t>
-            </a:r>
-            <a:r>
-              <a:rPr lang="en-US" dirty="0"/>
-              <a:t>it is the most “random” test line(every input for the DUT is randomly generated) and it has the biggest number of tests.</a:t>
-            </a:r>
-          </a:p>
-          <a:p>
-            <a:r>
-              <a:rPr lang="en-US" dirty="0"/>
+              <a:rPr lang="en-US" sz="2000" dirty="0"/>
+              <a:t>Coverage was performed to the test line called Robustness.</a:t>
+            </a:r>
+          </a:p>
+          <a:p>
+            <a:pPr lvl="1"/>
+            <a:r>
+              <a:rPr lang="en-US" sz="1600" dirty="0"/>
+              <a:t>It is the most “random” test line.</a:t>
+            </a:r>
+          </a:p>
+          <a:p>
+            <a:pPr lvl="1"/>
+            <a:r>
+              <a:rPr lang="en-US" sz="1600" dirty="0"/>
+              <a:t>It has the biggest number of tests.</a:t>
+            </a:r>
+          </a:p>
+          <a:p>
+            <a:pPr lvl="1"/>
+            <a:endParaRPr lang="en-US" sz="1600" dirty="0"/>
+          </a:p>
+          <a:p>
+            <a:r>
+              <a:rPr lang="en-US" sz="2000" dirty="0"/>
               <a:t> The total coverage results can be seen in the following figure:</a:t>
             </a:r>
           </a:p>
           <a:p>
-            <a:endParaRPr lang="en-US" dirty="0"/>
+            <a:endParaRPr lang="en-US" sz="2000" dirty="0"/>
           </a:p>
         </p:txBody>
       </p:sp>
@@ -17539,7 +18584,7 @@
           <p:nvPr/>
         </p:nvPicPr>
         <p:blipFill>
-          <a:blip r:embed="rId2"/>
+          <a:blip r:embed="rId3"/>
           <a:stretch>
             <a:fillRect/>
           </a:stretch>
@@ -17607,7 +18652,7 @@
           <a:p>
             <a:r>
               <a:rPr lang="en-US" dirty="0"/>
-              <a:t>Coverage results – Code Coverage</a:t>
+              <a:t>Code Coverage</a:t>
             </a:r>
           </a:p>
         </p:txBody>
@@ -17630,25 +18675,28 @@
         </p:nvSpPr>
         <p:spPr>
           <a:xfrm>
-            <a:off x="838200" y="1825625"/>
+            <a:off x="838200" y="2141537"/>
             <a:ext cx="3719732" cy="4351338"/>
           </a:xfrm>
         </p:spPr>
         <p:txBody>
-          <a:bodyPr/>
+          <a:bodyPr>
+            <a:normAutofit/>
+          </a:bodyPr>
           <a:lstStyle/>
           <a:p>
             <a:r>
-              <a:rPr lang="en-US" dirty="0"/>
-              <a:t>As can be seen from the attached </a:t>
-            </a:r>
-            <a:r>
-              <a:rPr lang="en-US" dirty="0" err="1"/>
-              <a:t>figure,the</a:t>
-            </a:r>
-            <a:r>
-              <a:rPr lang="en-US" dirty="0"/>
-              <a:t> total code coverage was 91.43%.The following figure details the code coverage from the DUT modules:</a:t>
+              <a:rPr lang="en-US" sz="2000" dirty="0"/>
+              <a:t>Total code coverage was 91.43%.</a:t>
+            </a:r>
+          </a:p>
+          <a:p>
+            <a:endParaRPr lang="en-US" sz="2000" dirty="0"/>
+          </a:p>
+          <a:p>
+            <a:r>
+              <a:rPr lang="en-US" sz="2000" dirty="0"/>
+              <a:t>The following figure details the code coverage from the DUT modules:</a:t>
             </a:r>
           </a:p>
         </p:txBody>
@@ -17734,7 +18782,7 @@
           <a:p>
             <a:r>
               <a:rPr lang="en-US" dirty="0"/>
-              <a:t>Coverage results – Conditional Coverage</a:t>
+              <a:t>Conditional Coverage</a:t>
             </a:r>
           </a:p>
         </p:txBody>
@@ -17752,14 +18800,14 @@
           <p:nvPr/>
         </p:nvPicPr>
         <p:blipFill>
-          <a:blip r:embed="rId2"/>
+          <a:blip r:embed="rId3"/>
           <a:stretch>
             <a:fillRect/>
           </a:stretch>
         </p:blipFill>
         <p:spPr>
           <a:xfrm>
-            <a:off x="7353300" y="1586389"/>
+            <a:off x="7531100" y="1493256"/>
             <a:ext cx="4000500" cy="4829810"/>
           </a:xfrm>
           <a:prstGeom prst="rect">
@@ -17785,8 +18833,8 @@
         </p:nvSpPr>
         <p:spPr bwMode="auto">
           <a:xfrm>
-            <a:off x="838200" y="2293135"/>
-            <a:ext cx="5085522" cy="3416320"/>
+            <a:off x="838200" y="2507920"/>
+            <a:ext cx="6587156" cy="2557623"/>
           </a:xfrm>
           <a:prstGeom prst="rect">
             <a:avLst/>
@@ -17961,6 +19009,50 @@
             </a:lvl9pPr>
           </a:lstStyle>
           <a:p>
+            <a:r>
+              <a:rPr lang="en-US" sz="1800" dirty="0"/>
+              <a:t>Total code coverage was 98.26%.</a:t>
+            </a:r>
+          </a:p>
+          <a:p>
+            <a:pPr>
+              <a:lnSpc>
+                <a:spcPct val="100000"/>
+              </a:lnSpc>
+            </a:pPr>
+            <a:endParaRPr kumimoji="0" lang="en-US" altLang="en-US" sz="1800" b="0" i="0" u="none" strike="noStrike" cap="none" normalizeH="0" baseline="0" dirty="0">
+              <a:ln>
+                <a:noFill/>
+              </a:ln>
+              <a:solidFill>
+                <a:schemeClr val="tx1"/>
+              </a:solidFill>
+              <a:effectLst/>
+              <a:latin typeface="+mn-lt"/>
+              <a:ea typeface="Calibri" panose="020F0502020204030204" pitchFamily="34" charset="0"/>
+              <a:cs typeface="Arial" panose="020B0604020202020204" pitchFamily="34" charset="0"/>
+            </a:endParaRPr>
+          </a:p>
+          <a:p>
+            <a:pPr>
+              <a:lnSpc>
+                <a:spcPct val="100000"/>
+              </a:lnSpc>
+            </a:pPr>
+            <a:endParaRPr kumimoji="0" lang="en-US" altLang="en-US" sz="1800" b="0" i="0" u="none" strike="noStrike" cap="none" normalizeH="0" baseline="0" dirty="0">
+              <a:ln>
+                <a:noFill/>
+              </a:ln>
+              <a:solidFill>
+                <a:schemeClr val="tx1"/>
+              </a:solidFill>
+              <a:effectLst/>
+              <a:latin typeface="+mn-lt"/>
+              <a:ea typeface="Calibri" panose="020F0502020204030204" pitchFamily="34" charset="0"/>
+              <a:cs typeface="Arial" panose="020B0604020202020204" pitchFamily="34" charset="0"/>
+            </a:endParaRPr>
+          </a:p>
+          <a:p>
             <a:pPr marL="0" marR="0" lvl="0" indent="0" algn="l" defTabSz="914400" rtl="0" eaLnBrk="0" fontAlgn="base" latinLnBrk="0" hangingPunct="0">
               <a:lnSpc>
                 <a:spcPct val="100000"/>
@@ -17978,7 +19070,15 @@
               <a:tabLst/>
             </a:pPr>
             <a:r>
-              <a:rPr kumimoji="0" lang="en-US" altLang="en-US" sz="2400" b="0" i="0" u="none" strike="noStrike" cap="none" normalizeH="0" baseline="0" dirty="0">
+              <a:rPr lang="en-US" altLang="en-US" sz="1800" dirty="0">
+                <a:latin typeface="+mn-lt"/>
+                <a:ea typeface="Calibri" panose="020F0502020204030204" pitchFamily="34" charset="0"/>
+                <a:cs typeface="Arial" panose="020B0604020202020204" pitchFamily="34" charset="0"/>
+              </a:rPr>
+              <a:t>U</a:t>
+            </a:r>
+            <a:r>
+              <a:rPr kumimoji="0" lang="en-US" altLang="en-US" sz="1800" b="0" i="0" u="none" strike="noStrike" cap="none" normalizeH="0" baseline="0" dirty="0">
                 <a:ln>
                   <a:noFill/>
                 </a:ln>
@@ -17990,110 +19090,9 @@
                 <a:ea typeface="Calibri" panose="020F0502020204030204" pitchFamily="34" charset="0"/>
                 <a:cs typeface="Arial" panose="020B0604020202020204" pitchFamily="34" charset="0"/>
               </a:rPr>
-              <a:t>The total conditional coverage was </a:t>
-            </a:r>
-            <a:r>
-              <a:rPr kumimoji="0" lang="he-IL" altLang="en-US" sz="2400" b="0" i="0" u="none" strike="noStrike" cap="none" normalizeH="0" baseline="0" dirty="0">
-                <a:ln>
-                  <a:noFill/>
-                </a:ln>
-                <a:solidFill>
-                  <a:schemeClr val="tx1"/>
-                </a:solidFill>
-                <a:effectLst/>
-                <a:latin typeface="+mn-lt"/>
-                <a:ea typeface="Calibri" panose="020F0502020204030204" pitchFamily="34" charset="0"/>
-                <a:cs typeface="Arial" panose="020B0604020202020204" pitchFamily="34" charset="0"/>
-              </a:rPr>
-              <a:t>98</a:t>
-            </a:r>
-            <a:r>
-              <a:rPr kumimoji="0" lang="en-US" altLang="en-US" sz="2400" b="0" i="0" u="none" strike="noStrike" cap="none" normalizeH="0" baseline="0" dirty="0">
-                <a:ln>
-                  <a:noFill/>
-                </a:ln>
-                <a:solidFill>
-                  <a:schemeClr val="tx1"/>
-                </a:solidFill>
-                <a:effectLst/>
-                <a:latin typeface="+mn-lt"/>
-                <a:ea typeface="Calibri" panose="020F0502020204030204" pitchFamily="34" charset="0"/>
-                <a:cs typeface="Arial" panose="020B0604020202020204" pitchFamily="34" charset="0"/>
-              </a:rPr>
-              <a:t>.</a:t>
-            </a:r>
-            <a:r>
-              <a:rPr kumimoji="0" lang="he-IL" altLang="en-US" sz="2400" b="0" i="0" u="none" strike="noStrike" cap="none" normalizeH="0" baseline="0" dirty="0">
-                <a:ln>
-                  <a:noFill/>
-                </a:ln>
-                <a:solidFill>
-                  <a:schemeClr val="tx1"/>
-                </a:solidFill>
-                <a:effectLst/>
-                <a:latin typeface="+mn-lt"/>
-                <a:ea typeface="Calibri" panose="020F0502020204030204" pitchFamily="34" charset="0"/>
-                <a:cs typeface="Arial" panose="020B0604020202020204" pitchFamily="34" charset="0"/>
-              </a:rPr>
-              <a:t>26</a:t>
-            </a:r>
-            <a:r>
-              <a:rPr kumimoji="0" lang="en-US" altLang="en-US" sz="2400" b="0" i="0" u="none" strike="noStrike" cap="none" normalizeH="0" baseline="0" dirty="0">
-                <a:ln>
-                  <a:noFill/>
-                </a:ln>
-                <a:solidFill>
-                  <a:schemeClr val="tx1"/>
-                </a:solidFill>
-                <a:effectLst/>
-                <a:latin typeface="+mn-lt"/>
-                <a:ea typeface="Calibri" panose="020F0502020204030204" pitchFamily="34" charset="0"/>
-                <a:cs typeface="Arial" panose="020B0604020202020204" pitchFamily="34" charset="0"/>
-              </a:rPr>
-              <a:t>%. </a:t>
-            </a:r>
-          </a:p>
-          <a:p>
-            <a:pPr marL="0" marR="0" lvl="0" indent="0" algn="l" defTabSz="914400" rtl="0" eaLnBrk="0" fontAlgn="base" latinLnBrk="0" hangingPunct="0">
-              <a:lnSpc>
-                <a:spcPct val="100000"/>
-              </a:lnSpc>
-              <a:spcBef>
-                <a:spcPct val="0"/>
-              </a:spcBef>
-              <a:spcAft>
-                <a:spcPct val="0"/>
-              </a:spcAft>
-              <a:buClrTx/>
-              <a:buSzTx/>
-              <a:buFontTx/>
-              <a:buNone/>
-              <a:tabLst/>
-            </a:pPr>
-            <a:r>
-              <a:rPr lang="en-US" altLang="en-US" sz="2400" dirty="0">
-                <a:latin typeface="+mn-lt"/>
-                <a:ea typeface="Calibri" panose="020F0502020204030204" pitchFamily="34" charset="0"/>
-                <a:cs typeface="Arial" panose="020B0604020202020204" pitchFamily="34" charset="0"/>
-              </a:rPr>
-              <a:t>U</a:t>
-            </a:r>
-            <a:r>
-              <a:rPr kumimoji="0" lang="en-US" altLang="en-US" sz="2400" b="0" i="0" u="none" strike="noStrike" cap="none" normalizeH="0" baseline="0" dirty="0">
-                <a:ln>
-                  <a:noFill/>
-                </a:ln>
-                <a:solidFill>
-                  <a:schemeClr val="tx1"/>
-                </a:solidFill>
-                <a:effectLst/>
-                <a:latin typeface="+mn-lt"/>
-                <a:ea typeface="Calibri" panose="020F0502020204030204" pitchFamily="34" charset="0"/>
-                <a:cs typeface="Arial" panose="020B0604020202020204" pitchFamily="34" charset="0"/>
-              </a:rPr>
               <a:t>ncovered conditionals come from the following modules:</a:t>
             </a:r>
-            <a:endParaRPr kumimoji="0" lang="en-US" altLang="en-US" sz="2400" b="0" i="0" u="none" strike="noStrike" cap="none" normalizeH="0" baseline="0" dirty="0">
+            <a:endParaRPr kumimoji="0" lang="en-US" altLang="en-US" sz="1800" b="0" i="0" u="none" strike="noStrike" cap="none" normalizeH="0" baseline="0" dirty="0">
               <a:ln>
                 <a:noFill/>
               </a:ln>
@@ -18105,24 +19104,13 @@
             </a:endParaRPr>
           </a:p>
           <a:p>
-            <a:pPr marL="0" marR="0" lvl="0" indent="0" algn="l" defTabSz="914400" rtl="0" eaLnBrk="0" fontAlgn="base" latinLnBrk="0" hangingPunct="0">
+            <a:pPr>
               <a:lnSpc>
                 <a:spcPct val="100000"/>
               </a:lnSpc>
-              <a:spcBef>
-                <a:spcPct val="0"/>
-              </a:spcBef>
-              <a:spcAft>
-                <a:spcPct val="0"/>
-              </a:spcAft>
-              <a:buClrTx/>
-              <a:buSzTx/>
-              <a:buFontTx/>
-              <a:buChar char="•"/>
-              <a:tabLst/>
             </a:pPr>
             <a:r>
-              <a:rPr kumimoji="0" lang="en-US" altLang="en-US" sz="2400" b="0" i="0" u="none" strike="noStrike" cap="none" normalizeH="0" baseline="0" dirty="0">
+              <a:rPr kumimoji="0" lang="en-US" altLang="en-US" sz="1800" b="0" i="0" u="none" strike="noStrike" cap="none" normalizeH="0" baseline="0" dirty="0">
                 <a:ln>
                   <a:noFill/>
                 </a:ln>
@@ -18136,7 +19124,7 @@
               </a:rPr>
               <a:t>Reg File</a:t>
             </a:r>
-            <a:endParaRPr kumimoji="0" lang="en-US" altLang="en-US" sz="2400" b="0" i="0" u="none" strike="noStrike" cap="none" normalizeH="0" baseline="0" dirty="0">
+            <a:endParaRPr kumimoji="0" lang="en-US" altLang="en-US" sz="1800" b="0" i="0" u="none" strike="noStrike" cap="none" normalizeH="0" baseline="0" dirty="0">
               <a:ln>
                 <a:noFill/>
               </a:ln>
@@ -18148,24 +19136,13 @@
             </a:endParaRPr>
           </a:p>
           <a:p>
-            <a:pPr marL="0" marR="0" lvl="0" indent="0" algn="l" defTabSz="914400" rtl="0" eaLnBrk="0" fontAlgn="base" latinLnBrk="0" hangingPunct="0">
+            <a:pPr>
               <a:lnSpc>
                 <a:spcPct val="100000"/>
               </a:lnSpc>
-              <a:spcBef>
-                <a:spcPct val="0"/>
-              </a:spcBef>
-              <a:spcAft>
-                <a:spcPct val="0"/>
-              </a:spcAft>
-              <a:buClrTx/>
-              <a:buSzTx/>
-              <a:buFontTx/>
-              <a:buChar char="•"/>
-              <a:tabLst/>
             </a:pPr>
             <a:r>
-              <a:rPr kumimoji="0" lang="en-US" altLang="en-US" sz="2400" b="0" i="0" u="none" strike="noStrike" cap="none" normalizeH="0" baseline="0" dirty="0">
+              <a:rPr kumimoji="0" lang="en-US" altLang="en-US" sz="1800" b="0" i="0" u="none" strike="noStrike" cap="none" normalizeH="0" baseline="0" dirty="0">
                 <a:ln>
                   <a:noFill/>
                 </a:ln>
@@ -18179,7 +19156,7 @@
               </a:rPr>
               <a:t>RAM</a:t>
             </a:r>
-            <a:endParaRPr kumimoji="0" lang="en-US" altLang="en-US" sz="2400" b="0" i="0" u="none" strike="noStrike" cap="none" normalizeH="0" baseline="0" dirty="0">
+            <a:endParaRPr kumimoji="0" lang="en-US" altLang="en-US" sz="1800" b="0" i="0" u="none" strike="noStrike" cap="none" normalizeH="0" baseline="0" dirty="0">
               <a:ln>
                 <a:noFill/>
               </a:ln>
@@ -18191,24 +19168,13 @@
             </a:endParaRPr>
           </a:p>
           <a:p>
-            <a:pPr marL="0" marR="0" lvl="0" indent="0" algn="l" defTabSz="914400" rtl="0" eaLnBrk="0" fontAlgn="base" latinLnBrk="0" hangingPunct="0">
+            <a:pPr>
               <a:lnSpc>
                 <a:spcPct val="100000"/>
               </a:lnSpc>
-              <a:spcBef>
-                <a:spcPct val="0"/>
-              </a:spcBef>
-              <a:spcAft>
-                <a:spcPct val="0"/>
-              </a:spcAft>
-              <a:buClrTx/>
-              <a:buSzTx/>
-              <a:buFontTx/>
-              <a:buChar char="•"/>
-              <a:tabLst/>
             </a:pPr>
             <a:r>
-              <a:rPr kumimoji="0" lang="en-US" altLang="en-US" sz="2400" b="0" i="0" u="none" strike="noStrike" cap="none" normalizeH="0" baseline="0" dirty="0">
+              <a:rPr kumimoji="0" lang="en-US" altLang="en-US" sz="1800" b="0" i="0" u="none" strike="noStrike" cap="none" normalizeH="0" baseline="0" dirty="0">
                 <a:ln>
                   <a:noFill/>
                 </a:ln>
@@ -18222,7 +19188,7 @@
               </a:rPr>
               <a:t>Classification block</a:t>
             </a:r>
-            <a:endParaRPr kumimoji="0" lang="en-US" altLang="en-US" sz="2400" b="0" i="0" u="none" strike="noStrike" cap="none" normalizeH="0" baseline="0" dirty="0">
+            <a:endParaRPr kumimoji="0" lang="en-US" altLang="en-US" sz="1800" b="0" i="0" u="none" strike="noStrike" cap="none" normalizeH="0" baseline="0" dirty="0">
               <a:ln>
                 <a:noFill/>
               </a:ln>
@@ -18234,24 +19200,13 @@
             </a:endParaRPr>
           </a:p>
           <a:p>
-            <a:pPr marL="0" marR="0" lvl="0" indent="0" algn="l" defTabSz="914400" rtl="0" eaLnBrk="0" fontAlgn="base" latinLnBrk="0" hangingPunct="0">
+            <a:pPr>
               <a:lnSpc>
                 <a:spcPct val="100000"/>
               </a:lnSpc>
-              <a:spcBef>
-                <a:spcPct val="0"/>
-              </a:spcBef>
-              <a:spcAft>
-                <a:spcPct val="0"/>
-              </a:spcAft>
-              <a:buClrTx/>
-              <a:buSzTx/>
-              <a:buFontTx/>
-              <a:buChar char="•"/>
-              <a:tabLst/>
             </a:pPr>
             <a:r>
-              <a:rPr kumimoji="0" lang="en-US" altLang="en-US" sz="2400" b="0" i="0" u="none" strike="noStrike" cap="none" normalizeH="0" baseline="0" dirty="0">
+              <a:rPr kumimoji="0" lang="en-US" altLang="en-US" sz="1800" b="0" i="0" u="none" strike="noStrike" cap="none" normalizeH="0" baseline="0" dirty="0">
                 <a:ln>
                   <a:noFill/>
                 </a:ln>
@@ -18265,7 +19220,7 @@
               </a:rPr>
               <a:t>Convergence check block</a:t>
             </a:r>
-            <a:endParaRPr kumimoji="0" lang="en-US" altLang="en-US" sz="2400" b="0" i="0" u="none" strike="noStrike" cap="none" normalizeH="0" baseline="0" dirty="0">
+            <a:endParaRPr kumimoji="0" lang="en-US" altLang="en-US" sz="1800" b="0" i="0" u="none" strike="noStrike" cap="none" normalizeH="0" baseline="0" dirty="0">
               <a:ln>
                 <a:noFill/>
               </a:ln>
@@ -18277,24 +19232,13 @@
             </a:endParaRPr>
           </a:p>
           <a:p>
-            <a:pPr marL="0" marR="0" lvl="0" indent="0" algn="l" defTabSz="914400" rtl="0" eaLnBrk="0" fontAlgn="base" latinLnBrk="0" hangingPunct="0">
+            <a:pPr>
               <a:lnSpc>
                 <a:spcPct val="100000"/>
               </a:lnSpc>
-              <a:spcBef>
-                <a:spcPct val="0"/>
-              </a:spcBef>
-              <a:spcAft>
-                <a:spcPct val="0"/>
-              </a:spcAft>
-              <a:buClrTx/>
-              <a:buSzTx/>
-              <a:buFontTx/>
-              <a:buChar char="•"/>
-              <a:tabLst/>
             </a:pPr>
             <a:r>
-              <a:rPr kumimoji="0" lang="en-US" altLang="en-US" sz="2400" b="0" i="0" u="none" strike="noStrike" cap="none" normalizeH="0" baseline="0" dirty="0">
+              <a:rPr kumimoji="0" lang="en-US" altLang="en-US" sz="1800" b="0" i="0" u="none" strike="noStrike" cap="none" normalizeH="0" baseline="0" dirty="0">
                 <a:ln>
                   <a:noFill/>
                 </a:ln>
@@ -18309,7 +19253,7 @@
               <a:t>New means calculation </a:t>
             </a:r>
             <a:r>
-              <a:rPr kumimoji="0" lang="en-US" altLang="en-US" sz="2400" b="0" i="0" u="none" strike="noStrike" cap="none" normalizeH="0" baseline="0" dirty="0" err="1">
+              <a:rPr kumimoji="0" lang="en-US" altLang="en-US" sz="1800" b="0" i="0" u="none" strike="noStrike" cap="none" normalizeH="0" baseline="0" dirty="0" err="1">
                 <a:ln>
                   <a:noFill/>
                 </a:ln>
@@ -18323,7 +19267,7 @@
               </a:rPr>
               <a:t>blockt</a:t>
             </a:r>
-            <a:endParaRPr kumimoji="0" lang="en-US" altLang="en-US" sz="4000" b="0" i="0" u="none" strike="noStrike" cap="none" normalizeH="0" baseline="0" dirty="0">
+            <a:endParaRPr kumimoji="0" lang="en-US" altLang="en-US" sz="3200" b="0" i="0" u="none" strike="noStrike" cap="none" normalizeH="0" baseline="0" dirty="0">
               <a:ln>
                 <a:noFill/>
               </a:ln>
@@ -18389,7 +19333,7 @@
           <a:p>
             <a:r>
               <a:rPr lang="en-US" dirty="0"/>
-              <a:t>Coverage results – Functional Coverage</a:t>
+              <a:t>Functional Coverage</a:t>
             </a:r>
           </a:p>
         </p:txBody>
@@ -18591,7 +19535,14 @@
           <a:p>
             <a:r>
               <a:rPr lang="en-US" dirty="0"/>
-              <a:t>Coverage results – Functional Coverage NUM_POINST</a:t>
+              <a:t>Functional Coverage</a:t>
+            </a:r>
+            <a:br>
+              <a:rPr lang="en-US" dirty="0"/>
+            </a:br>
+            <a:r>
+              <a:rPr lang="en-US" dirty="0"/>
+              <a:t>number of points</a:t>
             </a:r>
           </a:p>
         </p:txBody>
@@ -18614,8 +19565,8 @@
         </p:nvSpPr>
         <p:spPr>
           <a:xfrm>
-            <a:off x="838200" y="1825625"/>
-            <a:ext cx="2566182" cy="4351338"/>
+            <a:off x="838200" y="2294340"/>
+            <a:ext cx="2654300" cy="3495675"/>
           </a:xfrm>
         </p:spPr>
         <p:txBody>
@@ -18624,20 +19575,37 @@
           </a:bodyPr>
           <a:lstStyle/>
           <a:p>
-            <a:r>
-              <a:rPr lang="en-US" sz="2400" dirty="0">
-                <a:effectLst/>
-                <a:latin typeface="Calibri" panose="020F0502020204030204" pitchFamily="34" charset="0"/>
-                <a:ea typeface="Calibri" panose="020F0502020204030204" pitchFamily="34" charset="0"/>
-                <a:cs typeface="Arial" panose="020B0604020202020204" pitchFamily="34" charset="0"/>
-              </a:rPr>
-              <a:t>As</a:t>
-            </a:r>
-            <a:r>
-              <a:rPr lang="en-US" sz="2400" dirty="0">
-                <a:solidFill>
-                  <a:srgbClr val="FF0000"/>
-                </a:solidFill>
+            <a:pPr marL="0" indent="0">
+              <a:buNone/>
+            </a:pPr>
+            <a:r>
+              <a:rPr lang="en-US" sz="2000" dirty="0">
+                <a:latin typeface="Calibri" panose="020F0502020204030204" pitchFamily="34" charset="0"/>
+                <a:ea typeface="Calibri" panose="020F0502020204030204" pitchFamily="34" charset="0"/>
+                <a:cs typeface="Arial" panose="020B0604020202020204" pitchFamily="34" charset="0"/>
+              </a:rPr>
+              <a:t>T</a:t>
+            </a:r>
+            <a:r>
+              <a:rPr lang="en-US" sz="2000" dirty="0">
+                <a:effectLst/>
+                <a:latin typeface="Calibri" panose="020F0502020204030204" pitchFamily="34" charset="0"/>
+                <a:ea typeface="Calibri" panose="020F0502020204030204" pitchFamily="34" charset="0"/>
+                <a:cs typeface="Arial" panose="020B0604020202020204" pitchFamily="34" charset="0"/>
+              </a:rPr>
+              <a:t>he number of points in all the tests was approximately </a:t>
+            </a:r>
+            <a:r>
+              <a:rPr lang="en-US" sz="2000" b="1" dirty="0">
+                <a:effectLst/>
+                <a:latin typeface="Calibri" panose="020F0502020204030204" pitchFamily="34" charset="0"/>
+                <a:ea typeface="Calibri" panose="020F0502020204030204" pitchFamily="34" charset="0"/>
+                <a:cs typeface="Arial" panose="020B0604020202020204" pitchFamily="34" charset="0"/>
+              </a:rPr>
+              <a:t>uniformly</a:t>
+            </a:r>
+            <a:r>
+              <a:rPr lang="en-US" sz="2000" dirty="0">
                 <a:effectLst/>
                 <a:latin typeface="Calibri" panose="020F0502020204030204" pitchFamily="34" charset="0"/>
                 <a:ea typeface="Calibri" panose="020F0502020204030204" pitchFamily="34" charset="0"/>
@@ -18646,17 +19614,26 @@
               <a:t> </a:t>
             </a:r>
             <a:r>
-              <a:rPr lang="en-US" sz="2400" dirty="0">
-                <a:effectLst/>
-                <a:latin typeface="Calibri" panose="020F0502020204030204" pitchFamily="34" charset="0"/>
-                <a:ea typeface="Calibri" panose="020F0502020204030204" pitchFamily="34" charset="0"/>
-                <a:cs typeface="Arial" panose="020B0604020202020204" pitchFamily="34" charset="0"/>
-              </a:rPr>
-              <a:t>can be seen form the figures attached, the number of points in all the tests was uniformly distributed between 8 and 512.</a:t>
-            </a:r>
-          </a:p>
-          <a:p>
-            <a:endParaRPr lang="en-US" sz="3600" dirty="0"/>
+              <a:rPr lang="en-US" sz="2000" b="1" dirty="0">
+                <a:effectLst/>
+                <a:latin typeface="Calibri" panose="020F0502020204030204" pitchFamily="34" charset="0"/>
+                <a:ea typeface="Calibri" panose="020F0502020204030204" pitchFamily="34" charset="0"/>
+                <a:cs typeface="Arial" panose="020B0604020202020204" pitchFamily="34" charset="0"/>
+              </a:rPr>
+              <a:t>distributed</a:t>
+            </a:r>
+            <a:r>
+              <a:rPr lang="en-US" sz="2000" dirty="0">
+                <a:effectLst/>
+                <a:latin typeface="Calibri" panose="020F0502020204030204" pitchFamily="34" charset="0"/>
+                <a:ea typeface="Calibri" panose="020F0502020204030204" pitchFamily="34" charset="0"/>
+                <a:cs typeface="Arial" panose="020B0604020202020204" pitchFamily="34" charset="0"/>
+              </a:rPr>
+              <a:t> between 8 and 512.</a:t>
+            </a:r>
+          </a:p>
+          <a:p>
+            <a:endParaRPr lang="en-US" sz="3200" dirty="0"/>
           </a:p>
         </p:txBody>
       </p:sp>
@@ -18680,7 +19657,7 @@
         </p:blipFill>
         <p:spPr>
           <a:xfrm>
-            <a:off x="3896751" y="2073934"/>
+            <a:off x="4723228" y="1972334"/>
             <a:ext cx="6630572" cy="3707888"/>
           </a:xfrm>
           <a:prstGeom prst="rect">
@@ -18765,7 +19742,7 @@
         <p:spPr/>
         <p:txBody>
           <a:bodyPr>
-            <a:normAutofit fontScale="92500" lnSpcReduction="20000"/>
+            <a:normAutofit fontScale="77500" lnSpcReduction="20000"/>
           </a:bodyPr>
           <a:lstStyle/>
           <a:p>
@@ -19033,6 +20010,27 @@
                 <a:cs typeface="Arial" panose="020B0604020202020204" pitchFamily="34" charset="0"/>
               </a:rPr>
               <a:t> to instantiate, connect and build the test bench environment.</a:t>
+            </a:r>
+          </a:p>
+          <a:p>
+            <a:endParaRPr lang="en-US" sz="2400" dirty="0">
+              <a:latin typeface="Calibri" panose="020F0502020204030204" pitchFamily="34" charset="0"/>
+              <a:ea typeface="Calibri" panose="020F0502020204030204" pitchFamily="34" charset="0"/>
+              <a:cs typeface="Arial" panose="020B0604020202020204" pitchFamily="34" charset="0"/>
+            </a:endParaRPr>
+          </a:p>
+          <a:p>
+            <a:r>
+              <a:rPr lang="en-US" sz="2400" dirty="0">
+                <a:solidFill>
+                  <a:srgbClr val="FF0000"/>
+                </a:solidFill>
+                <a:effectLst/>
+                <a:latin typeface="Calibri" panose="020F0502020204030204" pitchFamily="34" charset="0"/>
+                <a:ea typeface="Calibri" panose="020F0502020204030204" pitchFamily="34" charset="0"/>
+                <a:cs typeface="Arial" panose="020B0604020202020204" pitchFamily="34" charset="0"/>
+              </a:rPr>
+              <a:t>TODO – ADD A WORD ON FACTORY, AND SAY SOMETHING AS WELL.</a:t>
             </a:r>
           </a:p>
           <a:p>
@@ -19107,7 +20105,14 @@
           <a:p>
             <a:r>
               <a:rPr lang="en-US" dirty="0"/>
-              <a:t>Coverage results – Functional Coverage DATA_VALUE</a:t>
+              <a:t>Functional Coverage</a:t>
+            </a:r>
+            <a:br>
+              <a:rPr lang="en-US" dirty="0"/>
+            </a:br>
+            <a:r>
+              <a:rPr lang="en-US" dirty="0"/>
+              <a:t>data points</a:t>
             </a:r>
           </a:p>
         </p:txBody>
@@ -19130,19 +20135,27 @@
         </p:nvSpPr>
         <p:spPr>
           <a:xfrm>
-            <a:off x="838200" y="1825625"/>
-            <a:ext cx="2566182" cy="4351338"/>
+            <a:off x="608397" y="2506662"/>
+            <a:ext cx="3437238" cy="4351338"/>
           </a:xfrm>
         </p:spPr>
         <p:txBody>
           <a:bodyPr>
-            <a:normAutofit fontScale="77500" lnSpcReduction="20000"/>
+            <a:normAutofit/>
           </a:bodyPr>
           <a:lstStyle/>
           <a:p>
             <a:r>
-              <a:rPr lang="en-US" sz="3600" dirty="0"/>
-              <a:t>As can be seen form the figures attached, for all data points, the values of their coordinates were normally distributed between all the possible values in all the tests.</a:t>
+              <a:rPr lang="en-US" sz="2000" dirty="0"/>
+              <a:t>For all data points, the values of their coordinates were </a:t>
+            </a:r>
+            <a:r>
+              <a:rPr lang="en-US" sz="2000" b="1" dirty="0"/>
+              <a:t>normally distributed </a:t>
+            </a:r>
+            <a:r>
+              <a:rPr lang="en-US" sz="2000" dirty="0"/>
+              <a:t>between all the possible values in all the tests.</a:t>
             </a:r>
           </a:p>
         </p:txBody>
@@ -19167,7 +20180,7 @@
         </p:blipFill>
         <p:spPr>
           <a:xfrm>
-            <a:off x="4149969" y="2044700"/>
+            <a:off x="4765431" y="1931988"/>
             <a:ext cx="6588369" cy="4351338"/>
           </a:xfrm>
           <a:prstGeom prst="rect">
@@ -19228,7 +20241,14 @@
           <a:p>
             <a:r>
               <a:rPr lang="en-US" dirty="0"/>
-              <a:t>Coverage results – Functional Coverage CENT_VALUE</a:t>
+              <a:t>Functional Coverage</a:t>
+            </a:r>
+            <a:br>
+              <a:rPr lang="en-US" dirty="0"/>
+            </a:br>
+            <a:r>
+              <a:rPr lang="en-US" dirty="0"/>
+              <a:t>centroids value</a:t>
             </a:r>
           </a:p>
         </p:txBody>
@@ -19251,19 +20271,40 @@
         </p:nvSpPr>
         <p:spPr>
           <a:xfrm>
-            <a:off x="838200" y="1825625"/>
+            <a:off x="838200" y="2141537"/>
             <a:ext cx="2566182" cy="4351338"/>
           </a:xfrm>
         </p:spPr>
         <p:txBody>
           <a:bodyPr>
-            <a:normAutofit fontScale="70000" lnSpcReduction="20000"/>
+            <a:normAutofit/>
           </a:bodyPr>
           <a:lstStyle/>
           <a:p>
             <a:r>
-              <a:rPr lang="en-US" sz="3600" dirty="0"/>
-              <a:t>As can be seen form the figure attached, for centroid 1 the values of its coordinates were normally distributed between all the possible values in all the tests. This also is correct for the other 7 centroids.</a:t>
+              <a:rPr lang="en-US" sz="2000" dirty="0"/>
+              <a:t>For centroid 1:</a:t>
+            </a:r>
+          </a:p>
+          <a:p>
+            <a:pPr marL="457200" lvl="1" indent="0">
+              <a:buNone/>
+            </a:pPr>
+            <a:r>
+              <a:rPr lang="en-US" sz="1600" dirty="0"/>
+              <a:t>The values of its coordinates were normally distributed between all the possible values in all the tests.</a:t>
+            </a:r>
+          </a:p>
+          <a:p>
+            <a:pPr marL="457200" lvl="1" indent="0">
+              <a:buNone/>
+            </a:pPr>
+            <a:endParaRPr lang="en-US" sz="1600" dirty="0"/>
+          </a:p>
+          <a:p>
+            <a:r>
+              <a:rPr lang="en-US" sz="2000" dirty="0"/>
+              <a:t>That is also correct for the other 7 centroids.</a:t>
             </a:r>
           </a:p>
         </p:txBody>
@@ -19288,7 +20329,7 @@
         </p:blipFill>
         <p:spPr>
           <a:xfrm>
-            <a:off x="4164037" y="1690687"/>
+            <a:off x="4312318" y="1690688"/>
             <a:ext cx="7189763" cy="4802187"/>
           </a:xfrm>
           <a:prstGeom prst="rect">
@@ -19372,18 +20413,18 @@
         </p:nvSpPr>
         <p:spPr>
           <a:xfrm>
-            <a:off x="838200" y="1825625"/>
+            <a:off x="838200" y="2141537"/>
             <a:ext cx="5070231" cy="4351338"/>
           </a:xfrm>
         </p:spPr>
         <p:txBody>
           <a:bodyPr>
-            <a:normAutofit lnSpcReduction="10000"/>
+            <a:normAutofit/>
           </a:bodyPr>
           <a:lstStyle/>
           <a:p>
             <a:r>
-              <a:rPr lang="en-US" sz="2400" dirty="0">
+              <a:rPr lang="en-US" sz="1800" dirty="0">
                 <a:latin typeface="Calibri" panose="020F0502020204030204" pitchFamily="34" charset="0"/>
                 <a:ea typeface="Calibri" panose="020F0502020204030204" pitchFamily="34" charset="0"/>
                 <a:cs typeface="Arial" panose="020B0604020202020204" pitchFamily="34" charset="0"/>
@@ -19391,7 +20432,7 @@
               <a:t>T</a:t>
             </a:r>
             <a:r>
-              <a:rPr lang="en-US" sz="2400" dirty="0">
+              <a:rPr lang="en-US" sz="1800" dirty="0">
                 <a:effectLst/>
                 <a:latin typeface="Calibri" panose="020F0502020204030204" pitchFamily="34" charset="0"/>
                 <a:ea typeface="Calibri" panose="020F0502020204030204" pitchFamily="34" charset="0"/>
@@ -19400,7 +20441,7 @@
               <a:t>he </a:t>
             </a:r>
             <a:r>
-              <a:rPr lang="en-US" sz="2400" dirty="0">
+              <a:rPr lang="en-US" sz="1800" dirty="0">
                 <a:latin typeface="Calibri" panose="020F0502020204030204" pitchFamily="34" charset="0"/>
                 <a:ea typeface="Calibri" panose="020F0502020204030204" pitchFamily="34" charset="0"/>
                 <a:cs typeface="Arial" panose="020B0604020202020204" pitchFamily="34" charset="0"/>
@@ -19408,67 +20449,185 @@
               <a:t>default</a:t>
             </a:r>
             <a:r>
-              <a:rPr lang="en-US" sz="2400" dirty="0">
-                <a:effectLst/>
-                <a:latin typeface="Calibri" panose="020F0502020204030204" pitchFamily="34" charset="0"/>
-                <a:ea typeface="Calibri" panose="020F0502020204030204" pitchFamily="34" charset="0"/>
-                <a:cs typeface="Arial" panose="020B0604020202020204" pitchFamily="34" charset="0"/>
-              </a:rPr>
-              <a:t> FSM coverage has a low result </a:t>
-            </a:r>
-            <a:r>
-              <a:rPr lang="en-US" sz="2400" dirty="0">
-                <a:latin typeface="Calibri" panose="020F0502020204030204" pitchFamily="34" charset="0"/>
-                <a:ea typeface="Calibri" panose="020F0502020204030204" pitchFamily="34" charset="0"/>
-                <a:cs typeface="Arial" panose="020B0604020202020204" pitchFamily="34" charset="0"/>
-              </a:rPr>
-              <a:t>because </a:t>
-            </a:r>
-            <a:r>
-              <a:rPr lang="en-US" sz="2400" dirty="0">
-                <a:effectLst/>
-                <a:latin typeface="Calibri" panose="020F0502020204030204" pitchFamily="34" charset="0"/>
-                <a:ea typeface="Calibri" panose="020F0502020204030204" pitchFamily="34" charset="0"/>
-                <a:cs typeface="Arial" panose="020B0604020202020204" pitchFamily="34" charset="0"/>
-              </a:rPr>
-              <a:t>it checks all transitions for the FSM, even the ones which are not legal. </a:t>
-            </a:r>
-          </a:p>
-          <a:p>
-            <a:r>
-              <a:rPr lang="en-US" sz="2400" dirty="0">
-                <a:effectLst/>
-                <a:latin typeface="Calibri" panose="020F0502020204030204" pitchFamily="34" charset="0"/>
-                <a:ea typeface="Calibri" panose="020F0502020204030204" pitchFamily="34" charset="0"/>
-                <a:cs typeface="Arial" panose="020B0604020202020204" pitchFamily="34" charset="0"/>
-              </a:rPr>
-              <a:t>Therefore, a cover group for the legal transitions was built. </a:t>
-            </a:r>
-          </a:p>
-          <a:p>
-            <a:r>
-              <a:rPr lang="en-US" sz="2400" dirty="0">
-                <a:effectLst/>
-                <a:latin typeface="Calibri" panose="020F0502020204030204" pitchFamily="34" charset="0"/>
-                <a:ea typeface="Calibri" panose="020F0502020204030204" pitchFamily="34" charset="0"/>
-                <a:cs typeface="Arial" panose="020B0604020202020204" pitchFamily="34" charset="0"/>
-              </a:rPr>
-              <a:t>The FSM present in the DUT is the one inside the controller module. </a:t>
-            </a:r>
-          </a:p>
-          <a:p>
-            <a:r>
-              <a:rPr lang="en-US" sz="2400" dirty="0">
-                <a:effectLst/>
-                <a:latin typeface="Calibri" panose="020F0502020204030204" pitchFamily="34" charset="0"/>
-                <a:ea typeface="Calibri" panose="020F0502020204030204" pitchFamily="34" charset="0"/>
-                <a:cs typeface="Arial" panose="020B0604020202020204" pitchFamily="34" charset="0"/>
-              </a:rPr>
-              <a:t>The cover group for the valid transitions was written according to the transitions and control signals in the following figure, which describes the K means controller FSM: </a:t>
-            </a:r>
-          </a:p>
-          <a:p>
-            <a:endParaRPr lang="en-US" dirty="0"/>
+              <a:rPr lang="en-US" sz="1800" dirty="0">
+                <a:effectLst/>
+                <a:latin typeface="Calibri" panose="020F0502020204030204" pitchFamily="34" charset="0"/>
+                <a:ea typeface="Calibri" panose="020F0502020204030204" pitchFamily="34" charset="0"/>
+                <a:cs typeface="Arial" panose="020B0604020202020204" pitchFamily="34" charset="0"/>
+              </a:rPr>
+              <a:t> FSM coverage has a low </a:t>
+            </a:r>
+            <a:r>
+              <a:rPr lang="en-US" sz="1800" dirty="0" err="1">
+                <a:effectLst/>
+                <a:latin typeface="Calibri" panose="020F0502020204030204" pitchFamily="34" charset="0"/>
+                <a:ea typeface="Calibri" panose="020F0502020204030204" pitchFamily="34" charset="0"/>
+                <a:cs typeface="Arial" panose="020B0604020202020204" pitchFamily="34" charset="0"/>
+              </a:rPr>
+              <a:t>resul</a:t>
+            </a:r>
+            <a:r>
+              <a:rPr lang="en-US" sz="1800" dirty="0">
+                <a:effectLst/>
+                <a:latin typeface="Calibri" panose="020F0502020204030204" pitchFamily="34" charset="0"/>
+                <a:ea typeface="Calibri" panose="020F0502020204030204" pitchFamily="34" charset="0"/>
+                <a:cs typeface="Arial" panose="020B0604020202020204" pitchFamily="34" charset="0"/>
+              </a:rPr>
+              <a:t>.</a:t>
+            </a:r>
+          </a:p>
+          <a:p>
+            <a:pPr marL="457200" lvl="1" indent="0">
+              <a:buNone/>
+            </a:pPr>
+            <a:r>
+              <a:rPr lang="en-US" sz="1400" dirty="0">
+                <a:effectLst/>
+                <a:latin typeface="Calibri" panose="020F0502020204030204" pitchFamily="34" charset="0"/>
+                <a:ea typeface="Calibri" panose="020F0502020204030204" pitchFamily="34" charset="0"/>
+                <a:cs typeface="Arial" panose="020B0604020202020204" pitchFamily="34" charset="0"/>
+              </a:rPr>
+              <a:t>It checks all transitions for the FSM, </a:t>
+            </a:r>
+            <a:r>
+              <a:rPr lang="en-US" sz="1400" b="1" dirty="0">
+                <a:effectLst/>
+                <a:latin typeface="Calibri" panose="020F0502020204030204" pitchFamily="34" charset="0"/>
+                <a:ea typeface="Calibri" panose="020F0502020204030204" pitchFamily="34" charset="0"/>
+                <a:cs typeface="Arial" panose="020B0604020202020204" pitchFamily="34" charset="0"/>
+              </a:rPr>
+              <a:t>illegal</a:t>
+            </a:r>
+            <a:r>
+              <a:rPr lang="en-US" sz="1400" b="1" dirty="0">
+                <a:latin typeface="Calibri" panose="020F0502020204030204" pitchFamily="34" charset="0"/>
+                <a:ea typeface="Calibri" panose="020F0502020204030204" pitchFamily="34" charset="0"/>
+                <a:cs typeface="Arial" panose="020B0604020202020204" pitchFamily="34" charset="0"/>
+              </a:rPr>
+              <a:t> </a:t>
+            </a:r>
+            <a:r>
+              <a:rPr lang="en-US" sz="1400" dirty="0">
+                <a:latin typeface="Calibri" panose="020F0502020204030204" pitchFamily="34" charset="0"/>
+                <a:ea typeface="Calibri" panose="020F0502020204030204" pitchFamily="34" charset="0"/>
+                <a:cs typeface="Arial" panose="020B0604020202020204" pitchFamily="34" charset="0"/>
+              </a:rPr>
+              <a:t>ones in particular.</a:t>
+            </a:r>
+            <a:endParaRPr lang="en-US" sz="1800" dirty="0">
+              <a:effectLst/>
+              <a:latin typeface="Calibri" panose="020F0502020204030204" pitchFamily="34" charset="0"/>
+              <a:ea typeface="Calibri" panose="020F0502020204030204" pitchFamily="34" charset="0"/>
+              <a:cs typeface="Arial" panose="020B0604020202020204" pitchFamily="34" charset="0"/>
+            </a:endParaRPr>
+          </a:p>
+          <a:p>
+            <a:r>
+              <a:rPr lang="en-US" sz="1800" dirty="0">
+                <a:effectLst/>
+                <a:latin typeface="Calibri" panose="020F0502020204030204" pitchFamily="34" charset="0"/>
+                <a:ea typeface="Calibri" panose="020F0502020204030204" pitchFamily="34" charset="0"/>
+                <a:cs typeface="Arial" panose="020B0604020202020204" pitchFamily="34" charset="0"/>
+              </a:rPr>
+              <a:t>Therefore, a </a:t>
+            </a:r>
+            <a:r>
+              <a:rPr lang="en-US" sz="1800" b="1" dirty="0">
+                <a:effectLst/>
+                <a:latin typeface="Calibri" panose="020F0502020204030204" pitchFamily="34" charset="0"/>
+                <a:ea typeface="Calibri" panose="020F0502020204030204" pitchFamily="34" charset="0"/>
+                <a:cs typeface="Arial" panose="020B0604020202020204" pitchFamily="34" charset="0"/>
+              </a:rPr>
+              <a:t>cover group </a:t>
+            </a:r>
+            <a:r>
+              <a:rPr lang="en-US" sz="1800" dirty="0">
+                <a:effectLst/>
+                <a:latin typeface="Calibri" panose="020F0502020204030204" pitchFamily="34" charset="0"/>
+                <a:ea typeface="Calibri" panose="020F0502020204030204" pitchFamily="34" charset="0"/>
+                <a:cs typeface="Arial" panose="020B0604020202020204" pitchFamily="34" charset="0"/>
+              </a:rPr>
+              <a:t>for the legal transitions was built. </a:t>
+            </a:r>
+          </a:p>
+          <a:p>
+            <a:r>
+              <a:rPr lang="en-US" sz="1800" dirty="0">
+                <a:effectLst/>
+                <a:latin typeface="Calibri" panose="020F0502020204030204" pitchFamily="34" charset="0"/>
+                <a:ea typeface="Calibri" panose="020F0502020204030204" pitchFamily="34" charset="0"/>
+                <a:cs typeface="Arial" panose="020B0604020202020204" pitchFamily="34" charset="0"/>
+              </a:rPr>
+              <a:t>The FSM presented in the DUT is the one inside the </a:t>
+            </a:r>
+            <a:r>
+              <a:rPr lang="en-US" sz="1800" b="1" dirty="0">
+                <a:effectLst/>
+                <a:latin typeface="Calibri" panose="020F0502020204030204" pitchFamily="34" charset="0"/>
+                <a:ea typeface="Calibri" panose="020F0502020204030204" pitchFamily="34" charset="0"/>
+                <a:cs typeface="Arial" panose="020B0604020202020204" pitchFamily="34" charset="0"/>
+              </a:rPr>
+              <a:t>controller</a:t>
+            </a:r>
+            <a:r>
+              <a:rPr lang="en-US" sz="1800" dirty="0">
+                <a:effectLst/>
+                <a:latin typeface="Calibri" panose="020F0502020204030204" pitchFamily="34" charset="0"/>
+                <a:ea typeface="Calibri" panose="020F0502020204030204" pitchFamily="34" charset="0"/>
+                <a:cs typeface="Arial" panose="020B0604020202020204" pitchFamily="34" charset="0"/>
+              </a:rPr>
+              <a:t> module. </a:t>
+            </a:r>
+          </a:p>
+          <a:p>
+            <a:r>
+              <a:rPr lang="en-US" sz="1800" dirty="0">
+                <a:effectLst/>
+                <a:latin typeface="Calibri" panose="020F0502020204030204" pitchFamily="34" charset="0"/>
+                <a:ea typeface="Calibri" panose="020F0502020204030204" pitchFamily="34" charset="0"/>
+                <a:cs typeface="Arial" panose="020B0604020202020204" pitchFamily="34" charset="0"/>
+              </a:rPr>
+              <a:t>The cover group for the valid transitions </a:t>
+            </a:r>
+            <a:r>
+              <a:rPr lang="en-US" sz="1800" b="1" dirty="0">
+                <a:effectLst/>
+                <a:latin typeface="Calibri" panose="020F0502020204030204" pitchFamily="34" charset="0"/>
+                <a:ea typeface="Calibri" panose="020F0502020204030204" pitchFamily="34" charset="0"/>
+                <a:cs typeface="Arial" panose="020B0604020202020204" pitchFamily="34" charset="0"/>
+              </a:rPr>
+              <a:t>was written</a:t>
+            </a:r>
+            <a:r>
+              <a:rPr lang="en-US" sz="1800" dirty="0">
+                <a:effectLst/>
+                <a:latin typeface="Calibri" panose="020F0502020204030204" pitchFamily="34" charset="0"/>
+                <a:ea typeface="Calibri" panose="020F0502020204030204" pitchFamily="34" charset="0"/>
+                <a:cs typeface="Arial" panose="020B0604020202020204" pitchFamily="34" charset="0"/>
+              </a:rPr>
+              <a:t> according to the transitions and control signals in the following </a:t>
+            </a:r>
+            <a:r>
+              <a:rPr lang="en-US" sz="1800" b="1" dirty="0">
+                <a:effectLst/>
+                <a:latin typeface="Calibri" panose="020F0502020204030204" pitchFamily="34" charset="0"/>
+                <a:ea typeface="Calibri" panose="020F0502020204030204" pitchFamily="34" charset="0"/>
+                <a:cs typeface="Arial" panose="020B0604020202020204" pitchFamily="34" charset="0"/>
+              </a:rPr>
+              <a:t>figure</a:t>
+            </a:r>
+            <a:r>
+              <a:rPr lang="en-US" sz="1800" dirty="0">
+                <a:effectLst/>
+                <a:latin typeface="Calibri" panose="020F0502020204030204" pitchFamily="34" charset="0"/>
+                <a:ea typeface="Calibri" panose="020F0502020204030204" pitchFamily="34" charset="0"/>
+                <a:cs typeface="Arial" panose="020B0604020202020204" pitchFamily="34" charset="0"/>
+              </a:rPr>
+              <a:t>, which describes the K means controller FSM: </a:t>
+            </a:r>
+          </a:p>
+          <a:p>
+            <a:endParaRPr lang="en-US" sz="2000" dirty="0"/>
           </a:p>
         </p:txBody>
       </p:sp>
@@ -19587,7 +20746,7 @@
         </p:nvSpPr>
         <p:spPr>
           <a:xfrm>
-            <a:off x="838200" y="1825625"/>
+            <a:off x="838200" y="1690688"/>
             <a:ext cx="9853246" cy="467409"/>
           </a:xfrm>
         </p:spPr>
@@ -19636,13 +20795,13 @@
           <p:nvPr>
             <p:extLst>
               <p:ext uri="{D42A27DB-BD31-4B8C-83A1-F6EECF244321}">
-                <p14:modId xmlns:p14="http://schemas.microsoft.com/office/powerpoint/2010/main" val="3327690795"/>
+                <p14:modId xmlns:p14="http://schemas.microsoft.com/office/powerpoint/2010/main" val="4193648913"/>
               </p:ext>
             </p:extLst>
           </p:nvPr>
         </p:nvGraphicFramePr>
         <p:xfrm>
-          <a:off x="1083214" y="2293034"/>
+          <a:off x="1273714" y="2293034"/>
           <a:ext cx="8187396" cy="4332454"/>
         </p:xfrm>
         <a:graphic>
@@ -20671,7 +21830,7 @@
         </p:nvSpPr>
         <p:spPr>
           <a:xfrm>
-            <a:off x="838200" y="1825625"/>
+            <a:off x="838200" y="1751880"/>
             <a:ext cx="10515600" cy="636221"/>
           </a:xfrm>
         </p:spPr>
@@ -20731,7 +21890,7 @@
           <p:nvPr/>
         </p:nvPicPr>
         <p:blipFill>
-          <a:blip r:embed="rId2"/>
+          <a:blip r:embed="rId3"/>
           <a:stretch>
             <a:fillRect/>
           </a:stretch>
@@ -20759,14 +21918,14 @@
           <p:nvPr/>
         </p:nvPicPr>
         <p:blipFill>
-          <a:blip r:embed="rId3"/>
+          <a:blip r:embed="rId4"/>
           <a:stretch>
             <a:fillRect/>
           </a:stretch>
         </p:blipFill>
         <p:spPr>
           <a:xfrm>
-            <a:off x="6250745" y="3085515"/>
+            <a:off x="6209112" y="3085515"/>
             <a:ext cx="5486400" cy="3173095"/>
           </a:xfrm>
           <a:prstGeom prst="rect">
@@ -20856,7 +22015,7 @@
         </p:spPr>
         <p:txBody>
           <a:bodyPr>
-            <a:normAutofit lnSpcReduction="10000"/>
+            <a:normAutofit/>
           </a:bodyPr>
           <a:lstStyle/>
           <a:p>
@@ -20874,17 +22033,223 @@
               <a:buChar char=""/>
             </a:pPr>
             <a:r>
-              <a:rPr lang="en-US" sz="2400" dirty="0">
-                <a:effectLst/>
-                <a:latin typeface="Calibri" panose="020F0502020204030204" pitchFamily="34" charset="0"/>
-                <a:ea typeface="Calibri" panose="020F0502020204030204" pitchFamily="34" charset="0"/>
-                <a:cs typeface="Arial" panose="020B0604020202020204" pitchFamily="34" charset="0"/>
-              </a:rPr>
-              <a:t>The tests results indicate that are still bugs in the DUT, which we were not able to find and fix. </a:t>
-            </a:r>
-          </a:p>
-          <a:p>
-            <a:pPr marL="342900" marR="0" lvl="0" indent="-342900" rtl="0">
+              <a:rPr lang="en-US" sz="2000" dirty="0">
+                <a:effectLst/>
+                <a:latin typeface="Calibri" panose="020F0502020204030204" pitchFamily="34" charset="0"/>
+                <a:ea typeface="Calibri" panose="020F0502020204030204" pitchFamily="34" charset="0"/>
+                <a:cs typeface="Arial" panose="020B0604020202020204" pitchFamily="34" charset="0"/>
+              </a:rPr>
+              <a:t>The tests results indicate that are </a:t>
+            </a:r>
+            <a:r>
+              <a:rPr lang="en-US" sz="2000" b="1" dirty="0">
+                <a:effectLst/>
+                <a:latin typeface="Calibri" panose="020F0502020204030204" pitchFamily="34" charset="0"/>
+                <a:ea typeface="Calibri" panose="020F0502020204030204" pitchFamily="34" charset="0"/>
+                <a:cs typeface="Arial" panose="020B0604020202020204" pitchFamily="34" charset="0"/>
+              </a:rPr>
+              <a:t>bugs</a:t>
+            </a:r>
+            <a:r>
+              <a:rPr lang="en-US" sz="2000" dirty="0">
+                <a:effectLst/>
+                <a:latin typeface="Calibri" panose="020F0502020204030204" pitchFamily="34" charset="0"/>
+                <a:ea typeface="Calibri" panose="020F0502020204030204" pitchFamily="34" charset="0"/>
+                <a:cs typeface="Arial" panose="020B0604020202020204" pitchFamily="34" charset="0"/>
+              </a:rPr>
+              <a:t> in the DUT</a:t>
+            </a:r>
+            <a:r>
+              <a:rPr lang="en-US" sz="2000" dirty="0">
+                <a:latin typeface="Calibri" panose="020F0502020204030204" pitchFamily="34" charset="0"/>
+                <a:ea typeface="Calibri" panose="020F0502020204030204" pitchFamily="34" charset="0"/>
+                <a:cs typeface="Arial" panose="020B0604020202020204" pitchFamily="34" charset="0"/>
+              </a:rPr>
+              <a:t>:</a:t>
+            </a:r>
+            <a:endParaRPr lang="en-US" sz="1600" dirty="0">
+              <a:latin typeface="Calibri" panose="020F0502020204030204" pitchFamily="34" charset="0"/>
+              <a:ea typeface="Calibri" panose="020F0502020204030204" pitchFamily="34" charset="0"/>
+              <a:cs typeface="Arial" panose="020B0604020202020204" pitchFamily="34" charset="0"/>
+            </a:endParaRPr>
+          </a:p>
+          <a:p>
+            <a:pPr lvl="1">
+              <a:lnSpc>
+                <a:spcPct val="107000"/>
+              </a:lnSpc>
+              <a:spcBef>
+                <a:spcPts val="0"/>
+              </a:spcBef>
+            </a:pPr>
+            <a:r>
+              <a:rPr lang="en-US" sz="1600" dirty="0">
+                <a:effectLst/>
+                <a:latin typeface="Calibri" panose="020F0502020204030204" pitchFamily="34" charset="0"/>
+                <a:ea typeface="Calibri" panose="020F0502020204030204" pitchFamily="34" charset="0"/>
+                <a:cs typeface="Arial" panose="020B0604020202020204" pitchFamily="34" charset="0"/>
+              </a:rPr>
+              <a:t>The high fail rate in test line 8 indicates that there is an </a:t>
+            </a:r>
+            <a:r>
+              <a:rPr lang="en-US" sz="1600" b="1" dirty="0">
+                <a:effectLst/>
+                <a:latin typeface="Calibri" panose="020F0502020204030204" pitchFamily="34" charset="0"/>
+                <a:ea typeface="Calibri" panose="020F0502020204030204" pitchFamily="34" charset="0"/>
+                <a:cs typeface="Arial" panose="020B0604020202020204" pitchFamily="34" charset="0"/>
+              </a:rPr>
+              <a:t>overflow bug </a:t>
+            </a:r>
+            <a:r>
+              <a:rPr lang="en-US" sz="1600" dirty="0">
+                <a:effectLst/>
+                <a:latin typeface="Calibri" panose="020F0502020204030204" pitchFamily="34" charset="0"/>
+                <a:ea typeface="Calibri" panose="020F0502020204030204" pitchFamily="34" charset="0"/>
+                <a:cs typeface="Arial" panose="020B0604020202020204" pitchFamily="34" charset="0"/>
+              </a:rPr>
+              <a:t>when trying to fill the RAMs.</a:t>
+            </a:r>
+          </a:p>
+          <a:p>
+            <a:pPr lvl="1">
+              <a:lnSpc>
+                <a:spcPct val="107000"/>
+              </a:lnSpc>
+              <a:spcBef>
+                <a:spcPts val="0"/>
+              </a:spcBef>
+            </a:pPr>
+            <a:r>
+              <a:rPr lang="en-US" sz="1600" dirty="0">
+                <a:effectLst/>
+                <a:latin typeface="Calibri" panose="020F0502020204030204" pitchFamily="34" charset="0"/>
+                <a:ea typeface="Calibri" panose="020F0502020204030204" pitchFamily="34" charset="0"/>
+                <a:cs typeface="Arial" panose="020B0604020202020204" pitchFamily="34" charset="0"/>
+              </a:rPr>
+              <a:t>Test line 3 and 4 indicate that as the number of data points increases so does the number of fails.</a:t>
+            </a:r>
+          </a:p>
+          <a:p>
+            <a:pPr marL="914400" lvl="2" indent="0">
+              <a:lnSpc>
+                <a:spcPct val="107000"/>
+              </a:lnSpc>
+              <a:spcBef>
+                <a:spcPts val="0"/>
+              </a:spcBef>
+              <a:buNone/>
+            </a:pPr>
+            <a:r>
+              <a:rPr lang="en-US" sz="1400" dirty="0">
+                <a:effectLst/>
+                <a:latin typeface="Calibri" panose="020F0502020204030204" pitchFamily="34" charset="0"/>
+                <a:ea typeface="Calibri" panose="020F0502020204030204" pitchFamily="34" charset="0"/>
+                <a:cs typeface="Arial" panose="020B0604020202020204" pitchFamily="34" charset="0"/>
+              </a:rPr>
+              <a:t>This could be </a:t>
+            </a:r>
+            <a:r>
+              <a:rPr lang="en-US" sz="1400" b="1" dirty="0">
+                <a:effectLst/>
+                <a:latin typeface="Calibri" panose="020F0502020204030204" pitchFamily="34" charset="0"/>
+                <a:ea typeface="Calibri" panose="020F0502020204030204" pitchFamily="34" charset="0"/>
+                <a:cs typeface="Arial" panose="020B0604020202020204" pitchFamily="34" charset="0"/>
+              </a:rPr>
+              <a:t>related to </a:t>
+            </a:r>
+            <a:r>
+              <a:rPr lang="en-US" sz="1400" dirty="0">
+                <a:effectLst/>
+                <a:latin typeface="Calibri" panose="020F0502020204030204" pitchFamily="34" charset="0"/>
+                <a:ea typeface="Calibri" panose="020F0502020204030204" pitchFamily="34" charset="0"/>
+                <a:cs typeface="Arial" panose="020B0604020202020204" pitchFamily="34" charset="0"/>
+              </a:rPr>
+              <a:t>bugs such as:</a:t>
+            </a:r>
+          </a:p>
+          <a:p>
+            <a:pPr lvl="2">
+              <a:lnSpc>
+                <a:spcPct val="107000"/>
+              </a:lnSpc>
+              <a:spcBef>
+                <a:spcPts val="0"/>
+              </a:spcBef>
+            </a:pPr>
+            <a:r>
+              <a:rPr lang="en-US" sz="1400" dirty="0">
+                <a:latin typeface="Calibri" panose="020F0502020204030204" pitchFamily="34" charset="0"/>
+                <a:ea typeface="Calibri" panose="020F0502020204030204" pitchFamily="34" charset="0"/>
+                <a:cs typeface="Arial" panose="020B0604020202020204" pitchFamily="34" charset="0"/>
+              </a:rPr>
+              <a:t>O</a:t>
+            </a:r>
+            <a:r>
+              <a:rPr lang="en-US" sz="1400" dirty="0">
+                <a:effectLst/>
+                <a:latin typeface="Calibri" panose="020F0502020204030204" pitchFamily="34" charset="0"/>
+                <a:ea typeface="Calibri" panose="020F0502020204030204" pitchFamily="34" charset="0"/>
+                <a:cs typeface="Arial" panose="020B0604020202020204" pitchFamily="34" charset="0"/>
+              </a:rPr>
+              <a:t>verflow</a:t>
+            </a:r>
+            <a:r>
+              <a:rPr lang="en-US" sz="1400" dirty="0">
+                <a:latin typeface="Calibri" panose="020F0502020204030204" pitchFamily="34" charset="0"/>
+                <a:ea typeface="Calibri" panose="020F0502020204030204" pitchFamily="34" charset="0"/>
+                <a:cs typeface="Arial" panose="020B0604020202020204" pitchFamily="34" charset="0"/>
+              </a:rPr>
+              <a:t>.</a:t>
+            </a:r>
+          </a:p>
+          <a:p>
+            <a:pPr lvl="2">
+              <a:lnSpc>
+                <a:spcPct val="107000"/>
+              </a:lnSpc>
+              <a:spcBef>
+                <a:spcPts val="0"/>
+              </a:spcBef>
+            </a:pPr>
+            <a:r>
+              <a:rPr lang="en-US" sz="1400" dirty="0">
+                <a:effectLst/>
+                <a:latin typeface="Calibri" panose="020F0502020204030204" pitchFamily="34" charset="0"/>
+                <a:ea typeface="Calibri" panose="020F0502020204030204" pitchFamily="34" charset="0"/>
+                <a:cs typeface="Arial" panose="020B0604020202020204" pitchFamily="34" charset="0"/>
+              </a:rPr>
+              <a:t>Wrong classification of close points.</a:t>
+            </a:r>
+          </a:p>
+          <a:p>
+            <a:pPr lvl="2">
+              <a:lnSpc>
+                <a:spcPct val="107000"/>
+              </a:lnSpc>
+              <a:spcBef>
+                <a:spcPts val="0"/>
+              </a:spcBef>
+            </a:pPr>
+            <a:r>
+              <a:rPr lang="en-US" sz="1400" dirty="0">
+                <a:latin typeface="Calibri" panose="020F0502020204030204" pitchFamily="34" charset="0"/>
+                <a:ea typeface="Calibri" panose="020F0502020204030204" pitchFamily="34" charset="0"/>
+                <a:cs typeface="Arial" panose="020B0604020202020204" pitchFamily="34" charset="0"/>
+              </a:rPr>
+              <a:t>W</a:t>
+            </a:r>
+            <a:r>
+              <a:rPr lang="en-US" sz="1400" dirty="0">
+                <a:effectLst/>
+                <a:latin typeface="Calibri" panose="020F0502020204030204" pitchFamily="34" charset="0"/>
+                <a:ea typeface="Calibri" panose="020F0502020204030204" pitchFamily="34" charset="0"/>
+                <a:cs typeface="Arial" panose="020B0604020202020204" pitchFamily="34" charset="0"/>
+              </a:rPr>
+              <a:t>rong calculations.</a:t>
+            </a:r>
+          </a:p>
+          <a:p>
+            <a:pPr marL="0" marR="0" lvl="0" indent="0">
               <a:lnSpc>
                 <a:spcPct val="107000"/>
               </a:lnSpc>
@@ -20894,18 +22259,14 @@
               <a:spcAft>
                 <a:spcPts val="0"/>
               </a:spcAft>
-              <a:buFont typeface="Symbol" panose="05050102010706020507" pitchFamily="18" charset="2"/>
-              <a:buChar char=""/>
+              <a:buNone/>
             </a:pPr>
-            <a:r>
-              <a:rPr lang="en-US" sz="2400" dirty="0">
-                <a:effectLst/>
-                <a:latin typeface="Calibri" panose="020F0502020204030204" pitchFamily="34" charset="0"/>
-                <a:ea typeface="Calibri" panose="020F0502020204030204" pitchFamily="34" charset="0"/>
-                <a:cs typeface="Arial" panose="020B0604020202020204" pitchFamily="34" charset="0"/>
-              </a:rPr>
-              <a:t>The high fail rate in test line 8 indicates that there is an overflow bug when trying to fill the RAMs.</a:t>
-            </a:r>
+            <a:endParaRPr lang="en-US" sz="2000" dirty="0">
+              <a:effectLst/>
+              <a:latin typeface="Calibri" panose="020F0502020204030204" pitchFamily="34" charset="0"/>
+              <a:ea typeface="Calibri" panose="020F0502020204030204" pitchFamily="34" charset="0"/>
+              <a:cs typeface="Arial" panose="020B0604020202020204" pitchFamily="34" charset="0"/>
+            </a:endParaRPr>
           </a:p>
           <a:p>
             <a:pPr marL="342900" marR="0" lvl="0" indent="-342900">
@@ -20922,17 +22283,91 @@
               <a:buChar char=""/>
             </a:pPr>
             <a:r>
-              <a:rPr lang="en-US" sz="2400" dirty="0">
-                <a:effectLst/>
-                <a:latin typeface="Calibri" panose="020F0502020204030204" pitchFamily="34" charset="0"/>
-                <a:ea typeface="Calibri" panose="020F0502020204030204" pitchFamily="34" charset="0"/>
-                <a:cs typeface="Arial" panose="020B0604020202020204" pitchFamily="34" charset="0"/>
-              </a:rPr>
-              <a:t>Test line 3 and 4 indicate that as the number of data points increases so does the number of fails.  This could be related to bugs such as overflow, wrong classification of close points, and/or wrong calculations.</a:t>
-            </a:r>
-          </a:p>
-          <a:p>
-            <a:pPr marL="342900" marR="0" lvl="0" indent="-342900">
+              <a:rPr lang="en-US" sz="2000" dirty="0">
+                <a:effectLst/>
+                <a:latin typeface="Calibri" panose="020F0502020204030204" pitchFamily="34" charset="0"/>
+                <a:ea typeface="Calibri" panose="020F0502020204030204" pitchFamily="34" charset="0"/>
+                <a:cs typeface="Arial" panose="020B0604020202020204" pitchFamily="34" charset="0"/>
+              </a:rPr>
+              <a:t>Even though many test benches </a:t>
+            </a:r>
+            <a:r>
+              <a:rPr lang="en-US" sz="2000" b="1" dirty="0">
+                <a:effectLst/>
+                <a:latin typeface="Calibri" panose="020F0502020204030204" pitchFamily="34" charset="0"/>
+                <a:ea typeface="Calibri" panose="020F0502020204030204" pitchFamily="34" charset="0"/>
+                <a:cs typeface="Arial" panose="020B0604020202020204" pitchFamily="34" charset="0"/>
+              </a:rPr>
+              <a:t>were run</a:t>
+            </a:r>
+            <a:r>
+              <a:rPr lang="en-US" sz="2000" dirty="0">
+                <a:effectLst/>
+                <a:latin typeface="Calibri" panose="020F0502020204030204" pitchFamily="34" charset="0"/>
+                <a:ea typeface="Calibri" panose="020F0502020204030204" pitchFamily="34" charset="0"/>
+                <a:cs typeface="Arial" panose="020B0604020202020204" pitchFamily="34" charset="0"/>
+              </a:rPr>
+              <a:t> on the DUT in its design phase, many tests have </a:t>
+            </a:r>
+            <a:r>
+              <a:rPr lang="en-US" sz="2000" b="1" dirty="0">
+                <a:effectLst/>
+                <a:latin typeface="Calibri" panose="020F0502020204030204" pitchFamily="34" charset="0"/>
+                <a:ea typeface="Calibri" panose="020F0502020204030204" pitchFamily="34" charset="0"/>
+                <a:cs typeface="Arial" panose="020B0604020202020204" pitchFamily="34" charset="0"/>
+              </a:rPr>
+              <a:t>failed</a:t>
+            </a:r>
+            <a:r>
+              <a:rPr lang="en-US" sz="2000" dirty="0">
+                <a:effectLst/>
+                <a:latin typeface="Calibri" panose="020F0502020204030204" pitchFamily="34" charset="0"/>
+                <a:ea typeface="Calibri" panose="020F0502020204030204" pitchFamily="34" charset="0"/>
+                <a:cs typeface="Arial" panose="020B0604020202020204" pitchFamily="34" charset="0"/>
+              </a:rPr>
+              <a:t>.</a:t>
+            </a:r>
+          </a:p>
+          <a:p>
+            <a:pPr marL="457200" lvl="1" indent="0">
+              <a:lnSpc>
+                <a:spcPct val="107000"/>
+              </a:lnSpc>
+              <a:spcBef>
+                <a:spcPts val="0"/>
+              </a:spcBef>
+              <a:buNone/>
+            </a:pPr>
+            <a:r>
+              <a:rPr lang="en-US" sz="1600" dirty="0">
+                <a:effectLst/>
+                <a:latin typeface="Calibri" panose="020F0502020204030204" pitchFamily="34" charset="0"/>
+                <a:ea typeface="Calibri" panose="020F0502020204030204" pitchFamily="34" charset="0"/>
+                <a:cs typeface="Arial" panose="020B0604020202020204" pitchFamily="34" charset="0"/>
+              </a:rPr>
+              <a:t>This emphasizes the need for an </a:t>
+            </a:r>
+            <a:r>
+              <a:rPr lang="en-US" sz="1600" b="1" dirty="0">
+                <a:effectLst/>
+                <a:latin typeface="Calibri" panose="020F0502020204030204" pitchFamily="34" charset="0"/>
+                <a:ea typeface="Calibri" panose="020F0502020204030204" pitchFamily="34" charset="0"/>
+                <a:cs typeface="Arial" panose="020B0604020202020204" pitchFamily="34" charset="0"/>
+              </a:rPr>
+              <a:t>efficient</a:t>
+            </a:r>
+            <a:r>
+              <a:rPr lang="en-US" sz="1600" dirty="0">
+                <a:effectLst/>
+                <a:latin typeface="Calibri" panose="020F0502020204030204" pitchFamily="34" charset="0"/>
+                <a:ea typeface="Calibri" panose="020F0502020204030204" pitchFamily="34" charset="0"/>
+                <a:cs typeface="Arial" panose="020B0604020202020204" pitchFamily="34" charset="0"/>
+              </a:rPr>
+              <a:t> verification environment, as UVM, parallel to the design process.</a:t>
+            </a:r>
+          </a:p>
+          <a:p>
+            <a:pPr marL="0" marR="0" lvl="0" indent="0">
               <a:lnSpc>
                 <a:spcPct val="107000"/>
               </a:lnSpc>
@@ -20942,18 +22377,14 @@
               <a:spcAft>
                 <a:spcPts val="0"/>
               </a:spcAft>
-              <a:buFont typeface="Symbol" panose="05050102010706020507" pitchFamily="18" charset="2"/>
-              <a:buChar char=""/>
+              <a:buNone/>
             </a:pPr>
-            <a:r>
-              <a:rPr lang="en-US" sz="2400" dirty="0">
-                <a:effectLst/>
-                <a:latin typeface="Calibri" panose="020F0502020204030204" pitchFamily="34" charset="0"/>
-                <a:ea typeface="Calibri" panose="020F0502020204030204" pitchFamily="34" charset="0"/>
-                <a:cs typeface="Arial" panose="020B0604020202020204" pitchFamily="34" charset="0"/>
-              </a:rPr>
-              <a:t>Even though many test benches were run on the DUT in its design phase, many tests have failed. This emphasizes the need for an efficient verification environment, as UVM, parallel to the design process.</a:t>
-            </a:r>
+            <a:endParaRPr lang="en-US" sz="2000" dirty="0">
+              <a:effectLst/>
+              <a:latin typeface="Calibri" panose="020F0502020204030204" pitchFamily="34" charset="0"/>
+              <a:ea typeface="Calibri" panose="020F0502020204030204" pitchFamily="34" charset="0"/>
+              <a:cs typeface="Arial" panose="020B0604020202020204" pitchFamily="34" charset="0"/>
+            </a:endParaRPr>
           </a:p>
           <a:p>
             <a:pPr marL="342900" marR="0" lvl="0" indent="-342900">
@@ -20970,7 +22401,7 @@
               <a:buChar char=""/>
             </a:pPr>
             <a:r>
-              <a:rPr lang="en-US" sz="2400" dirty="0">
+              <a:rPr lang="en-US" sz="2000" dirty="0">
                 <a:effectLst/>
                 <a:latin typeface="Calibri" panose="020F0502020204030204" pitchFamily="34" charset="0"/>
                 <a:ea typeface="Calibri" panose="020F0502020204030204" pitchFamily="34" charset="0"/>
@@ -20979,7 +22410,7 @@
               <a:t>UVM is</a:t>
             </a:r>
             <a:r>
-              <a:rPr lang="en-US" sz="2400" dirty="0">
+              <a:rPr lang="en-US" sz="2000" dirty="0">
                 <a:solidFill>
                   <a:srgbClr val="FF0000"/>
                 </a:solidFill>
@@ -20991,17 +22422,94 @@
               <a:t> </a:t>
             </a:r>
             <a:r>
-              <a:rPr lang="en-US" sz="2400" dirty="0">
-                <a:effectLst/>
-                <a:latin typeface="Calibri" panose="020F0502020204030204" pitchFamily="34" charset="0"/>
-                <a:ea typeface="Calibri" panose="020F0502020204030204" pitchFamily="34" charset="0"/>
-                <a:cs typeface="Arial" panose="020B0604020202020204" pitchFamily="34" charset="0"/>
-              </a:rPr>
-              <a:t>an effective tool. It is intuitive, with high level coding and easy to reuse, making the verification process simpler and faster.</a:t>
-            </a:r>
-          </a:p>
-          <a:p>
-            <a:endParaRPr lang="en-US" sz="3200" dirty="0"/>
+              <a:rPr lang="en-US" sz="2000" dirty="0">
+                <a:effectLst/>
+                <a:latin typeface="Calibri" panose="020F0502020204030204" pitchFamily="34" charset="0"/>
+                <a:ea typeface="Calibri" panose="020F0502020204030204" pitchFamily="34" charset="0"/>
+                <a:cs typeface="Arial" panose="020B0604020202020204" pitchFamily="34" charset="0"/>
+              </a:rPr>
+              <a:t>an effective tool.</a:t>
+            </a:r>
+          </a:p>
+          <a:p>
+            <a:pPr marL="457200" lvl="1" indent="0">
+              <a:lnSpc>
+                <a:spcPct val="107000"/>
+              </a:lnSpc>
+              <a:spcBef>
+                <a:spcPts val="0"/>
+              </a:spcBef>
+              <a:spcAft>
+                <a:spcPts val="800"/>
+              </a:spcAft>
+              <a:buNone/>
+            </a:pPr>
+            <a:r>
+              <a:rPr lang="en-US" sz="1600" dirty="0">
+                <a:effectLst/>
+                <a:latin typeface="Calibri" panose="020F0502020204030204" pitchFamily="34" charset="0"/>
+                <a:ea typeface="Calibri" panose="020F0502020204030204" pitchFamily="34" charset="0"/>
+                <a:cs typeface="Arial" panose="020B0604020202020204" pitchFamily="34" charset="0"/>
+              </a:rPr>
+              <a:t>It is </a:t>
+            </a:r>
+            <a:r>
+              <a:rPr lang="en-US" sz="1600" b="1" dirty="0">
+                <a:effectLst/>
+                <a:latin typeface="Calibri" panose="020F0502020204030204" pitchFamily="34" charset="0"/>
+                <a:ea typeface="Calibri" panose="020F0502020204030204" pitchFamily="34" charset="0"/>
+                <a:cs typeface="Arial" panose="020B0604020202020204" pitchFamily="34" charset="0"/>
+              </a:rPr>
+              <a:t>intuitive</a:t>
+            </a:r>
+            <a:r>
+              <a:rPr lang="en-US" sz="1600" dirty="0">
+                <a:effectLst/>
+                <a:latin typeface="Calibri" panose="020F0502020204030204" pitchFamily="34" charset="0"/>
+                <a:ea typeface="Calibri" panose="020F0502020204030204" pitchFamily="34" charset="0"/>
+                <a:cs typeface="Arial" panose="020B0604020202020204" pitchFamily="34" charset="0"/>
+              </a:rPr>
+              <a:t>, with high level coding and easy to </a:t>
+            </a:r>
+            <a:r>
+              <a:rPr lang="en-US" sz="1600" b="1" dirty="0">
+                <a:effectLst/>
+                <a:latin typeface="Calibri" panose="020F0502020204030204" pitchFamily="34" charset="0"/>
+                <a:ea typeface="Calibri" panose="020F0502020204030204" pitchFamily="34" charset="0"/>
+                <a:cs typeface="Arial" panose="020B0604020202020204" pitchFamily="34" charset="0"/>
+              </a:rPr>
+              <a:t>reuse</a:t>
+            </a:r>
+            <a:r>
+              <a:rPr lang="en-US" sz="1600" dirty="0">
+                <a:effectLst/>
+                <a:latin typeface="Calibri" panose="020F0502020204030204" pitchFamily="34" charset="0"/>
+                <a:ea typeface="Calibri" panose="020F0502020204030204" pitchFamily="34" charset="0"/>
+                <a:cs typeface="Arial" panose="020B0604020202020204" pitchFamily="34" charset="0"/>
+              </a:rPr>
+              <a:t>, making the verification process </a:t>
+            </a:r>
+            <a:r>
+              <a:rPr lang="en-US" sz="1600" b="1" dirty="0">
+                <a:effectLst/>
+                <a:latin typeface="Calibri" panose="020F0502020204030204" pitchFamily="34" charset="0"/>
+                <a:ea typeface="Calibri" panose="020F0502020204030204" pitchFamily="34" charset="0"/>
+                <a:cs typeface="Arial" panose="020B0604020202020204" pitchFamily="34" charset="0"/>
+              </a:rPr>
+              <a:t>simpler and faster</a:t>
+            </a:r>
+            <a:r>
+              <a:rPr lang="en-US" sz="1600" dirty="0">
+                <a:effectLst/>
+                <a:latin typeface="Calibri" panose="020F0502020204030204" pitchFamily="34" charset="0"/>
+                <a:ea typeface="Calibri" panose="020F0502020204030204" pitchFamily="34" charset="0"/>
+                <a:cs typeface="Arial" panose="020B0604020202020204" pitchFamily="34" charset="0"/>
+              </a:rPr>
+              <a:t>.</a:t>
+            </a:r>
+          </a:p>
+          <a:p>
+            <a:endParaRPr lang="en-US" dirty="0"/>
           </a:p>
         </p:txBody>
       </p:sp>
@@ -21927,61 +23435,53 @@
                 <a:ea typeface="Calibri" panose="020F0502020204030204" pitchFamily="34" charset="0"/>
                 <a:cs typeface="Arial" panose="020B0604020202020204" pitchFamily="34" charset="0"/>
               </a:rPr>
-              <a:t> blocks</a:t>
-            </a:r>
-            <a:endParaRPr lang="en-US" sz="2000" dirty="0">
-              <a:effectLst/>
-              <a:latin typeface="Calibri" panose="020F0502020204030204" pitchFamily="34" charset="0"/>
-              <a:ea typeface="Calibri" panose="020F0502020204030204" pitchFamily="34" charset="0"/>
-              <a:cs typeface="Arial" panose="020B0604020202020204" pitchFamily="34" charset="0"/>
-            </a:endParaRPr>
-          </a:p>
-          <a:p>
-            <a:pPr lvl="1">
+              <a:t> blocks:</a:t>
+            </a:r>
+          </a:p>
+          <a:p>
+            <a:pPr marL="914400" lvl="2" indent="0">
               <a:lnSpc>
                 <a:spcPct val="107000"/>
               </a:lnSpc>
               <a:spcBef>
                 <a:spcPts val="0"/>
               </a:spcBef>
-              <a:spcAft>
-                <a:spcPts val="800"/>
-              </a:spcAft>
+              <a:buNone/>
             </a:pPr>
             <a:r>
-              <a:rPr lang="en-US" sz="2000" dirty="0">
+              <a:rPr lang="en-US" sz="1600" dirty="0">
                 <a:latin typeface="Calibri" panose="020F0502020204030204" pitchFamily="34" charset="0"/>
                 <a:cs typeface="Arial" panose="020B0604020202020204" pitchFamily="34" charset="0"/>
               </a:rPr>
               <a:t>Connecting them here </a:t>
             </a:r>
             <a:r>
-              <a:rPr lang="en-US" sz="2000" dirty="0" err="1">
+              <a:rPr lang="en-US" sz="1600" dirty="0" err="1">
                 <a:latin typeface="Calibri" panose="020F0502020204030204" pitchFamily="34" charset="0"/>
                 <a:cs typeface="Arial" panose="020B0604020202020204" pitchFamily="34" charset="0"/>
               </a:rPr>
               <a:t>allowes</a:t>
             </a:r>
             <a:r>
-              <a:rPr lang="en-US" sz="2000" dirty="0">
-                <a:latin typeface="Calibri" panose="020F0502020204030204" pitchFamily="34" charset="0"/>
-                <a:cs typeface="Arial" panose="020B0604020202020204" pitchFamily="34" charset="0"/>
-              </a:rPr>
-              <a:t> easy manipulation of the way of data transformation from sequencer to DUT, </a:t>
-            </a:r>
-            <a:r>
-              <a:rPr lang="en-US" sz="2000" b="1" dirty="0">
+              <a:rPr lang="en-US" sz="1600" dirty="0">
+                <a:latin typeface="Calibri" panose="020F0502020204030204" pitchFamily="34" charset="0"/>
+                <a:cs typeface="Arial" panose="020B0604020202020204" pitchFamily="34" charset="0"/>
+              </a:rPr>
+              <a:t> easy manipulation of data transformation from sequencer to DUT, </a:t>
+            </a:r>
+            <a:r>
+              <a:rPr lang="en-US" sz="1600" b="1" dirty="0">
                 <a:latin typeface="Calibri" panose="020F0502020204030204" pitchFamily="34" charset="0"/>
                 <a:cs typeface="Arial" panose="020B0604020202020204" pitchFamily="34" charset="0"/>
               </a:rPr>
               <a:t>without</a:t>
             </a:r>
             <a:r>
-              <a:rPr lang="en-US" sz="2000" dirty="0">
-                <a:latin typeface="Calibri" panose="020F0502020204030204" pitchFamily="34" charset="0"/>
-                <a:cs typeface="Arial" panose="020B0604020202020204" pitchFamily="34" charset="0"/>
-              </a:rPr>
-              <a:t> any changes to be made at agent, sequence.</a:t>
+              <a:rPr lang="en-US" sz="1600" dirty="0">
+                <a:latin typeface="Calibri" panose="020F0502020204030204" pitchFamily="34" charset="0"/>
+                <a:cs typeface="Arial" panose="020B0604020202020204" pitchFamily="34" charset="0"/>
+              </a:rPr>
+              <a:t> any changes to be made at of agent’s code or sequence’s code.</a:t>
             </a:r>
           </a:p>
         </p:txBody>
@@ -22104,7 +23604,7 @@
         </p:nvSpPr>
         <p:spPr>
           <a:xfrm>
-            <a:off x="639762" y="1825625"/>
+            <a:off x="546628" y="2141537"/>
             <a:ext cx="4915486" cy="4351338"/>
           </a:xfrm>
         </p:spPr>
@@ -22267,7 +23767,7 @@
         </p:blipFill>
         <p:spPr bwMode="auto">
           <a:xfrm>
-            <a:off x="6636753" y="3839528"/>
+            <a:off x="6425086" y="3847995"/>
             <a:ext cx="5486400" cy="2235835"/>
           </a:xfrm>
           <a:prstGeom prst="rect">
@@ -22435,23 +23935,7 @@
                 <a:ea typeface="Calibri" panose="020F0502020204030204" pitchFamily="34" charset="0"/>
                 <a:cs typeface="Arial" panose="020B0604020202020204" pitchFamily="34" charset="0"/>
               </a:rPr>
-              <a:t> from data transfer to data processing regarding the </a:t>
-            </a:r>
-            <a:r>
-              <a:rPr lang="en-US" sz="2400" dirty="0" err="1">
-                <a:latin typeface="Calibri" panose="020F0502020204030204" pitchFamily="34" charset="0"/>
-                <a:ea typeface="Calibri" panose="020F0502020204030204" pitchFamily="34" charset="0"/>
-                <a:cs typeface="Arial" panose="020B0604020202020204" pitchFamily="34" charset="0"/>
-              </a:rPr>
-              <a:t>verficiation</a:t>
-            </a:r>
-            <a:r>
-              <a:rPr lang="en-US" sz="2400" dirty="0">
-                <a:latin typeface="Calibri" panose="020F0502020204030204" pitchFamily="34" charset="0"/>
-                <a:ea typeface="Calibri" panose="020F0502020204030204" pitchFamily="34" charset="0"/>
-                <a:cs typeface="Arial" panose="020B0604020202020204" pitchFamily="34" charset="0"/>
-              </a:rPr>
-              <a:t> process.</a:t>
+              <a:t> from data transfer to data processing regarding the verification process.</a:t>
             </a:r>
             <a:endParaRPr lang="en-US" sz="2400" dirty="0">
               <a:effectLst/>
@@ -22470,10 +23954,10 @@
       </p:sp>
       <p:pic>
         <p:nvPicPr>
-          <p:cNvPr id="6" name="תמונה 5">
+          <p:cNvPr id="5" name="תמונה 4">
             <a:extLst>
               <a:ext uri="{FF2B5EF4-FFF2-40B4-BE49-F238E27FC236}">
-                <a16:creationId xmlns:a16="http://schemas.microsoft.com/office/drawing/2014/main" id="{38E82125-35EA-4C28-A7FE-CBDC32BD3DCB}"/>
+                <a16:creationId xmlns:a16="http://schemas.microsoft.com/office/drawing/2014/main" id="{77F541EC-9EBD-47A2-B6F4-BF42332EBDF6}"/>
               </a:ext>
             </a:extLst>
           </p:cNvPr>
@@ -22490,7 +23974,7 @@
         </p:blipFill>
         <p:spPr>
           <a:xfrm>
-            <a:off x="6629404" y="2141537"/>
+            <a:off x="6096000" y="2141537"/>
             <a:ext cx="4724400" cy="2743200"/>
           </a:xfrm>
           <a:prstGeom prst="rect">

</xml_diff>

<commit_message>
little fixes to final ptt v3
</commit_message>
<xml_diff>
--- a/Final presentation 3.pptx
+++ b/Final presentation 3.pptx
@@ -254,7 +254,7 @@
           <a:p>
             <a:fld id="{B2E107C9-5FE0-4864-97C4-A8FF847E0675}" type="datetimeFigureOut">
               <a:rPr lang="en-US" smtClean="0"/>
-              <a:t>12/31/2020</a:t>
+              <a:t>1/1/2021</a:t>
             </a:fld>
             <a:endParaRPr lang="en-US"/>
           </a:p>
@@ -4132,7 +4132,7 @@
           <a:p>
             <a:fld id="{CD2AB640-041E-414A-8FDF-E33E6A90A0DD}" type="datetimeFigureOut">
               <a:rPr lang="en-US" smtClean="0"/>
-              <a:t>12/31/2020</a:t>
+              <a:t>1/1/2021</a:t>
             </a:fld>
             <a:endParaRPr lang="en-US"/>
           </a:p>
@@ -4330,7 +4330,7 @@
           <a:p>
             <a:fld id="{CD2AB640-041E-414A-8FDF-E33E6A90A0DD}" type="datetimeFigureOut">
               <a:rPr lang="en-US" smtClean="0"/>
-              <a:t>12/31/2020</a:t>
+              <a:t>1/1/2021</a:t>
             </a:fld>
             <a:endParaRPr lang="en-US"/>
           </a:p>
@@ -4538,7 +4538,7 @@
           <a:p>
             <a:fld id="{CD2AB640-041E-414A-8FDF-E33E6A90A0DD}" type="datetimeFigureOut">
               <a:rPr lang="en-US" smtClean="0"/>
-              <a:t>12/31/2020</a:t>
+              <a:t>1/1/2021</a:t>
             </a:fld>
             <a:endParaRPr lang="en-US"/>
           </a:p>
@@ -4736,7 +4736,7 @@
           <a:p>
             <a:fld id="{CD2AB640-041E-414A-8FDF-E33E6A90A0DD}" type="datetimeFigureOut">
               <a:rPr lang="en-US" smtClean="0"/>
-              <a:t>12/31/2020</a:t>
+              <a:t>1/1/2021</a:t>
             </a:fld>
             <a:endParaRPr lang="en-US"/>
           </a:p>
@@ -5011,7 +5011,7 @@
           <a:p>
             <a:fld id="{CD2AB640-041E-414A-8FDF-E33E6A90A0DD}" type="datetimeFigureOut">
               <a:rPr lang="en-US" smtClean="0"/>
-              <a:t>12/31/2020</a:t>
+              <a:t>1/1/2021</a:t>
             </a:fld>
             <a:endParaRPr lang="en-US"/>
           </a:p>
@@ -5276,7 +5276,7 @@
           <a:p>
             <a:fld id="{CD2AB640-041E-414A-8FDF-E33E6A90A0DD}" type="datetimeFigureOut">
               <a:rPr lang="en-US" smtClean="0"/>
-              <a:t>12/31/2020</a:t>
+              <a:t>1/1/2021</a:t>
             </a:fld>
             <a:endParaRPr lang="en-US"/>
           </a:p>
@@ -5688,7 +5688,7 @@
           <a:p>
             <a:fld id="{CD2AB640-041E-414A-8FDF-E33E6A90A0DD}" type="datetimeFigureOut">
               <a:rPr lang="en-US" smtClean="0"/>
-              <a:t>12/31/2020</a:t>
+              <a:t>1/1/2021</a:t>
             </a:fld>
             <a:endParaRPr lang="en-US"/>
           </a:p>
@@ -5829,7 +5829,7 @@
           <a:p>
             <a:fld id="{CD2AB640-041E-414A-8FDF-E33E6A90A0DD}" type="datetimeFigureOut">
               <a:rPr lang="en-US" smtClean="0"/>
-              <a:t>12/31/2020</a:t>
+              <a:t>1/1/2021</a:t>
             </a:fld>
             <a:endParaRPr lang="en-US"/>
           </a:p>
@@ -5942,7 +5942,7 @@
           <a:p>
             <a:fld id="{CD2AB640-041E-414A-8FDF-E33E6A90A0DD}" type="datetimeFigureOut">
               <a:rPr lang="en-US" smtClean="0"/>
-              <a:t>12/31/2020</a:t>
+              <a:t>1/1/2021</a:t>
             </a:fld>
             <a:endParaRPr lang="en-US"/>
           </a:p>
@@ -6253,7 +6253,7 @@
           <a:p>
             <a:fld id="{CD2AB640-041E-414A-8FDF-E33E6A90A0DD}" type="datetimeFigureOut">
               <a:rPr lang="en-US" smtClean="0"/>
-              <a:t>12/31/2020</a:t>
+              <a:t>1/1/2021</a:t>
             </a:fld>
             <a:endParaRPr lang="en-US"/>
           </a:p>
@@ -6541,7 +6541,7 @@
           <a:p>
             <a:fld id="{CD2AB640-041E-414A-8FDF-E33E6A90A0DD}" type="datetimeFigureOut">
               <a:rPr lang="en-US" smtClean="0"/>
-              <a:t>12/31/2020</a:t>
+              <a:t>1/1/2021</a:t>
             </a:fld>
             <a:endParaRPr lang="en-US"/>
           </a:p>
@@ -6782,7 +6782,7 @@
           <a:p>
             <a:fld id="{CD2AB640-041E-414A-8FDF-E33E6A90A0DD}" type="datetimeFigureOut">
               <a:rPr lang="en-US" smtClean="0"/>
-              <a:t>12/31/2020</a:t>
+              <a:t>1/1/2021</a:t>
             </a:fld>
             <a:endParaRPr lang="en-US"/>
           </a:p>
@@ -8357,7 +8357,7 @@
                 <a:latin typeface="Calibri" panose="020F0502020204030204" pitchFamily="34" charset="0"/>
                 <a:cs typeface="Arial" panose="020B0604020202020204" pitchFamily="34" charset="0"/>
               </a:rPr>
-              <a:t> for the monitors connection’s of external scoreboard through the agent’s ports.</a:t>
+              <a:t> for the monitors connections to the external scoreboard through the agent’s ports.</a:t>
             </a:r>
           </a:p>
           <a:p>
@@ -13656,16 +13656,12 @@
           </a:p>
           <a:p>
             <a:r>
+              <a:rPr lang="en-US" sz="2000"/>
+              <a:t>The pass</a:t>
+            </a:r>
+            <a:r>
               <a:rPr lang="en-US" sz="2000" dirty="0"/>
-              <a:t>The </a:t>
-            </a:r>
-            <a:r>
-              <a:rPr lang="en-US" sz="2000" dirty="0" err="1"/>
-              <a:t>criterias</a:t>
-            </a:r>
-            <a:r>
-              <a:rPr lang="en-US" sz="2000" dirty="0"/>
-              <a:t> of pass/fail criteria are handled by the scoreboard.</a:t>
+              <a:t>/fail criteria are handled by the scoreboard.</a:t>
             </a:r>
           </a:p>
           <a:p>
@@ -20320,7 +20316,7 @@
         </p:spPr>
         <p:txBody>
           <a:bodyPr>
-            <a:normAutofit fontScale="92500" lnSpcReduction="20000"/>
+            <a:normAutofit fontScale="85000" lnSpcReduction="20000"/>
           </a:bodyPr>
           <a:lstStyle/>
           <a:p>
@@ -20600,27 +20596,13 @@
           <a:p>
             <a:r>
               <a:rPr lang="en-US" sz="2000" dirty="0">
-                <a:solidFill>
-                  <a:srgbClr val="FF0000"/>
-                </a:solidFill>
-                <a:effectLst/>
-                <a:latin typeface="Calibri" panose="020F0502020204030204" pitchFamily="34" charset="0"/>
-                <a:ea typeface="Calibri" panose="020F0502020204030204" pitchFamily="34" charset="0"/>
-                <a:cs typeface="Arial" panose="020B0604020202020204" pitchFamily="34" charset="0"/>
-              </a:rPr>
-              <a:t>TODO – ADD A WORD ON FACTORY, AND SAY SOMETHING AS WELL.</a:t>
-            </a:r>
-          </a:p>
-          <a:p>
-            <a:pPr marL="0" indent="0">
-              <a:buNone/>
-            </a:pPr>
-            <a:endParaRPr lang="en-US" sz="2000" dirty="0">
-              <a:effectLst/>
-              <a:latin typeface="Calibri" panose="020F0502020204030204" pitchFamily="34" charset="0"/>
-              <a:ea typeface="Calibri" panose="020F0502020204030204" pitchFamily="34" charset="0"/>
-              <a:cs typeface="Arial" panose="020B0604020202020204" pitchFamily="34" charset="0"/>
-            </a:endParaRPr>
+                <a:effectLst/>
+                <a:latin typeface="Calibri" panose="020F0502020204030204" pitchFamily="34" charset="0"/>
+                <a:ea typeface="Calibri" panose="020F0502020204030204" pitchFamily="34" charset="0"/>
+                <a:cs typeface="Arial" panose="020B0604020202020204" pitchFamily="34" charset="0"/>
+              </a:rPr>
+              <a:t>UVM also provides a mechanism named Factory used to create instances which makes the class override operation simple and easy.</a:t>
+            </a:r>
           </a:p>
           <a:p>
             <a:pPr marL="0" indent="0">
@@ -24193,78 +24175,41 @@
           <a:lstStyle/>
           <a:p>
             <a:r>
-              <a:rPr lang="en-US" sz="2000" dirty="0">
-                <a:effectLst/>
-                <a:latin typeface="Calibri" panose="020F0502020204030204" pitchFamily="34" charset="0"/>
-                <a:ea typeface="Calibri" panose="020F0502020204030204" pitchFamily="34" charset="0"/>
-                <a:cs typeface="Arial" panose="020B0604020202020204" pitchFamily="34" charset="0"/>
-              </a:rPr>
-              <a:t>Sequences are an </a:t>
-            </a:r>
-            <a:r>
-              <a:rPr lang="en-US" sz="2000" b="1" dirty="0">
-                <a:effectLst/>
-                <a:latin typeface="Calibri" panose="020F0502020204030204" pitchFamily="34" charset="0"/>
-                <a:ea typeface="Calibri" panose="020F0502020204030204" pitchFamily="34" charset="0"/>
-                <a:cs typeface="Arial" panose="020B0604020202020204" pitchFamily="34" charset="0"/>
-              </a:rPr>
-              <a:t>ordered collection </a:t>
-            </a:r>
-            <a:r>
-              <a:rPr lang="en-US" sz="2000" dirty="0">
-                <a:effectLst/>
-                <a:latin typeface="Calibri" panose="020F0502020204030204" pitchFamily="34" charset="0"/>
-                <a:ea typeface="Calibri" panose="020F0502020204030204" pitchFamily="34" charset="0"/>
-                <a:cs typeface="Arial" panose="020B0604020202020204" pitchFamily="34" charset="0"/>
-              </a:rPr>
-              <a:t>of transactions, they shape and generate them to our needs.</a:t>
-            </a:r>
-          </a:p>
-          <a:p>
-            <a:pPr lvl="1"/>
-            <a:r>
-              <a:rPr lang="en-US" sz="2000" dirty="0">
-                <a:latin typeface="Calibri" panose="020F0502020204030204" pitchFamily="34" charset="0"/>
-                <a:cs typeface="Arial" panose="020B0604020202020204" pitchFamily="34" charset="0"/>
-              </a:rPr>
-              <a:t>A transaction is a class object which includes the </a:t>
-            </a:r>
-            <a:r>
-              <a:rPr lang="en-US" sz="2000" b="1" dirty="0">
-                <a:latin typeface="Calibri" panose="020F0502020204030204" pitchFamily="34" charset="0"/>
-                <a:cs typeface="Arial" panose="020B0604020202020204" pitchFamily="34" charset="0"/>
-              </a:rPr>
-              <a:t>information</a:t>
-            </a:r>
-            <a:r>
-              <a:rPr lang="en-US" sz="2000" dirty="0">
-                <a:latin typeface="Calibri" panose="020F0502020204030204" pitchFamily="34" charset="0"/>
-                <a:cs typeface="Arial" panose="020B0604020202020204" pitchFamily="34" charset="0"/>
-              </a:rPr>
-              <a:t> for communication between components.</a:t>
-            </a:r>
-          </a:p>
-          <a:p>
-            <a:pPr lvl="1"/>
-            <a:r>
-              <a:rPr lang="en-US" sz="2000" dirty="0">
-                <a:latin typeface="Calibri" panose="020F0502020204030204" pitchFamily="34" charset="0"/>
-                <a:ea typeface="Calibri" panose="020F0502020204030204" pitchFamily="34" charset="0"/>
-                <a:cs typeface="Arial" panose="020B0604020202020204" pitchFamily="34" charset="0"/>
-              </a:rPr>
-              <a:t>T</a:t>
-            </a:r>
-            <a:r>
-              <a:rPr lang="en-US" sz="2000" dirty="0">
-                <a:effectLst/>
-                <a:latin typeface="Calibri" panose="020F0502020204030204" pitchFamily="34" charset="0"/>
-                <a:ea typeface="Calibri" panose="020F0502020204030204" pitchFamily="34" charset="0"/>
-                <a:cs typeface="Arial" panose="020B0604020202020204" pitchFamily="34" charset="0"/>
-              </a:rPr>
-              <a:t>he sequencer</a:t>
-            </a:r>
-            <a:r>
-              <a:rPr lang="en-US" sz="2000" dirty="0">
+              <a:rPr lang="en-US" sz="2400" dirty="0">
+                <a:latin typeface="Calibri" panose="020F0502020204030204" pitchFamily="34" charset="0"/>
+                <a:cs typeface="Arial" panose="020B0604020202020204" pitchFamily="34" charset="0"/>
+              </a:rPr>
+              <a:t>A transaction is a class object which includes the information for communication between components.</a:t>
+            </a:r>
+          </a:p>
+          <a:p>
+            <a:r>
+              <a:rPr lang="en-US" sz="2400" dirty="0">
+                <a:latin typeface="Calibri" panose="020F0502020204030204" pitchFamily="34" charset="0"/>
+                <a:cs typeface="Arial" panose="020B0604020202020204" pitchFamily="34" charset="0"/>
+              </a:rPr>
+              <a:t>Sequences are an ordered collection of transactions, they shape and generate them to our needs.</a:t>
+            </a:r>
+          </a:p>
+          <a:p>
+            <a:r>
+              <a:rPr lang="en-US" sz="2400" dirty="0">
+                <a:latin typeface="Calibri" panose="020F0502020204030204" pitchFamily="34" charset="0"/>
+                <a:cs typeface="Arial" panose="020B0604020202020204" pitchFamily="34" charset="0"/>
+              </a:rPr>
+              <a:t>The sequencer transfers </a:t>
+            </a:r>
+            <a:r>
+              <a:rPr lang="en-US" sz="2400" dirty="0">
+                <a:effectLst/>
+                <a:latin typeface="Calibri" panose="020F0502020204030204" pitchFamily="34" charset="0"/>
+                <a:ea typeface="Calibri" panose="020F0502020204030204" pitchFamily="34" charset="0"/>
+                <a:cs typeface="Arial" panose="020B0604020202020204" pitchFamily="34" charset="0"/>
+              </a:rPr>
+              <a:t>one transaction at the time from the sequence</a:t>
+            </a:r>
+            <a:r>
+              <a:rPr lang="en-US" sz="2400" dirty="0">
                 <a:solidFill>
                   <a:srgbClr val="FF0000"/>
                 </a:solidFill>
@@ -24276,37 +24221,7 @@
               <a:t> </a:t>
             </a:r>
             <a:r>
-              <a:rPr lang="en-US" sz="2000" b="1" dirty="0">
-                <a:effectLst/>
-                <a:latin typeface="Calibri" panose="020F0502020204030204" pitchFamily="34" charset="0"/>
-                <a:ea typeface="Calibri" panose="020F0502020204030204" pitchFamily="34" charset="0"/>
-                <a:cs typeface="Arial" panose="020B0604020202020204" pitchFamily="34" charset="0"/>
-              </a:rPr>
-              <a:t>transfers</a:t>
-            </a:r>
-            <a:r>
-              <a:rPr lang="en-US" sz="2000" dirty="0">
-                <a:effectLst/>
-                <a:latin typeface="Calibri" panose="020F0502020204030204" pitchFamily="34" charset="0"/>
-                <a:ea typeface="Calibri" panose="020F0502020204030204" pitchFamily="34" charset="0"/>
-                <a:cs typeface="Arial" panose="020B0604020202020204" pitchFamily="34" charset="0"/>
-              </a:rPr>
-              <a:t> one transaction at the time from the sequence</a:t>
-            </a:r>
-            <a:r>
-              <a:rPr lang="en-US" sz="2000" dirty="0">
-                <a:solidFill>
-                  <a:srgbClr val="FF0000"/>
-                </a:solidFill>
-                <a:effectLst/>
-                <a:latin typeface="Calibri" panose="020F0502020204030204" pitchFamily="34" charset="0"/>
-                <a:ea typeface="Calibri" panose="020F0502020204030204" pitchFamily="34" charset="0"/>
-                <a:cs typeface="Arial" panose="020B0604020202020204" pitchFamily="34" charset="0"/>
-              </a:rPr>
-              <a:t> </a:t>
-            </a:r>
-            <a:r>
-              <a:rPr lang="en-US" sz="2000" dirty="0">
+              <a:rPr lang="en-US" sz="2400" dirty="0">
                 <a:effectLst/>
                 <a:latin typeface="Calibri" panose="020F0502020204030204" pitchFamily="34" charset="0"/>
                 <a:ea typeface="Calibri" panose="020F0502020204030204" pitchFamily="34" charset="0"/>
@@ -24314,7 +24229,7 @@
               </a:rPr>
               <a:t>to the driver.</a:t>
             </a:r>
-            <a:endParaRPr lang="en-US" sz="3200" dirty="0"/>
+            <a:endParaRPr lang="en-US" sz="3600" dirty="0"/>
           </a:p>
         </p:txBody>
       </p:sp>

</xml_diff>

<commit_message>
little changes to final ppt v3
</commit_message>
<xml_diff>
--- a/Final presentation 3.pptx
+++ b/Final presentation 3.pptx
@@ -20711,7 +20711,7 @@
             </a:r>
             <a:r>
               <a:rPr lang="en-US" sz="2000" b="1" dirty="0"/>
-              <a:t>normally distributed </a:t>
+              <a:t>uniformly distributed </a:t>
             </a:r>
             <a:r>
               <a:rPr lang="en-US" sz="2000" dirty="0"/>
@@ -20852,7 +20852,7 @@
             </a:pPr>
             <a:r>
               <a:rPr lang="en-US" sz="1600" dirty="0"/>
-              <a:t>The values of its coordinates were normally distributed between all the possible values in all the tests.</a:t>
+              <a:t>The values of its coordinates were uniformly distributed between all the possible values in all the tests.</a:t>
             </a:r>
           </a:p>
           <a:p>
@@ -21015,25 +21015,7 @@
                 <a:ea typeface="Calibri" panose="020F0502020204030204" pitchFamily="34" charset="0"/>
                 <a:cs typeface="Arial" panose="020B0604020202020204" pitchFamily="34" charset="0"/>
               </a:rPr>
-              <a:t> FSM coverage has a low </a:t>
-            </a:r>
-            <a:r>
-              <a:rPr lang="en-US" sz="1800" dirty="0" err="1">
-                <a:effectLst/>
-                <a:latin typeface="Calibri" panose="020F0502020204030204" pitchFamily="34" charset="0"/>
-                <a:ea typeface="Calibri" panose="020F0502020204030204" pitchFamily="34" charset="0"/>
-                <a:cs typeface="Arial" panose="020B0604020202020204" pitchFamily="34" charset="0"/>
-              </a:rPr>
-              <a:t>resul</a:t>
-            </a:r>
-            <a:r>
-              <a:rPr lang="en-US" sz="1800" dirty="0">
-                <a:effectLst/>
-                <a:latin typeface="Calibri" panose="020F0502020204030204" pitchFamily="34" charset="0"/>
-                <a:ea typeface="Calibri" panose="020F0502020204030204" pitchFamily="34" charset="0"/>
-                <a:cs typeface="Arial" panose="020B0604020202020204" pitchFamily="34" charset="0"/>
-              </a:rPr>
-              <a:t>.</a:t>
+              <a:t> FSM coverage has a low result.</a:t>
             </a:r>
           </a:p>
           <a:p>

</xml_diff>

<commit_message>
little fixes to final ptt3
</commit_message>
<xml_diff>
--- a/Final presentation 3.pptx
+++ b/Final presentation 3.pptx
@@ -255,7 +255,7 @@
           <a:p>
             <a:fld id="{B2E107C9-5FE0-4864-97C4-A8FF847E0675}" type="datetimeFigureOut">
               <a:rPr lang="en-US" smtClean="0"/>
-              <a:t>1/4/2021</a:t>
+              <a:t>1/5/2021</a:t>
             </a:fld>
             <a:endParaRPr lang="en-US"/>
           </a:p>
@@ -4346,7 +4346,7 @@
           <a:p>
             <a:fld id="{CD2AB640-041E-414A-8FDF-E33E6A90A0DD}" type="datetimeFigureOut">
               <a:rPr lang="en-US" smtClean="0"/>
-              <a:t>1/4/2021</a:t>
+              <a:t>1/5/2021</a:t>
             </a:fld>
             <a:endParaRPr lang="en-US"/>
           </a:p>
@@ -4544,7 +4544,7 @@
           <a:p>
             <a:fld id="{CD2AB640-041E-414A-8FDF-E33E6A90A0DD}" type="datetimeFigureOut">
               <a:rPr lang="en-US" smtClean="0"/>
-              <a:t>1/4/2021</a:t>
+              <a:t>1/5/2021</a:t>
             </a:fld>
             <a:endParaRPr lang="en-US"/>
           </a:p>
@@ -4752,7 +4752,7 @@
           <a:p>
             <a:fld id="{CD2AB640-041E-414A-8FDF-E33E6A90A0DD}" type="datetimeFigureOut">
               <a:rPr lang="en-US" smtClean="0"/>
-              <a:t>1/4/2021</a:t>
+              <a:t>1/5/2021</a:t>
             </a:fld>
             <a:endParaRPr lang="en-US"/>
           </a:p>
@@ -4950,7 +4950,7 @@
           <a:p>
             <a:fld id="{CD2AB640-041E-414A-8FDF-E33E6A90A0DD}" type="datetimeFigureOut">
               <a:rPr lang="en-US" smtClean="0"/>
-              <a:t>1/4/2021</a:t>
+              <a:t>1/5/2021</a:t>
             </a:fld>
             <a:endParaRPr lang="en-US"/>
           </a:p>
@@ -5225,7 +5225,7 @@
           <a:p>
             <a:fld id="{CD2AB640-041E-414A-8FDF-E33E6A90A0DD}" type="datetimeFigureOut">
               <a:rPr lang="en-US" smtClean="0"/>
-              <a:t>1/4/2021</a:t>
+              <a:t>1/5/2021</a:t>
             </a:fld>
             <a:endParaRPr lang="en-US"/>
           </a:p>
@@ -5490,7 +5490,7 @@
           <a:p>
             <a:fld id="{CD2AB640-041E-414A-8FDF-E33E6A90A0DD}" type="datetimeFigureOut">
               <a:rPr lang="en-US" smtClean="0"/>
-              <a:t>1/4/2021</a:t>
+              <a:t>1/5/2021</a:t>
             </a:fld>
             <a:endParaRPr lang="en-US"/>
           </a:p>
@@ -5902,7 +5902,7 @@
           <a:p>
             <a:fld id="{CD2AB640-041E-414A-8FDF-E33E6A90A0DD}" type="datetimeFigureOut">
               <a:rPr lang="en-US" smtClean="0"/>
-              <a:t>1/4/2021</a:t>
+              <a:t>1/5/2021</a:t>
             </a:fld>
             <a:endParaRPr lang="en-US"/>
           </a:p>
@@ -6043,7 +6043,7 @@
           <a:p>
             <a:fld id="{CD2AB640-041E-414A-8FDF-E33E6A90A0DD}" type="datetimeFigureOut">
               <a:rPr lang="en-US" smtClean="0"/>
-              <a:t>1/4/2021</a:t>
+              <a:t>1/5/2021</a:t>
             </a:fld>
             <a:endParaRPr lang="en-US"/>
           </a:p>
@@ -6156,7 +6156,7 @@
           <a:p>
             <a:fld id="{CD2AB640-041E-414A-8FDF-E33E6A90A0DD}" type="datetimeFigureOut">
               <a:rPr lang="en-US" smtClean="0"/>
-              <a:t>1/4/2021</a:t>
+              <a:t>1/5/2021</a:t>
             </a:fld>
             <a:endParaRPr lang="en-US"/>
           </a:p>
@@ -6467,7 +6467,7 @@
           <a:p>
             <a:fld id="{CD2AB640-041E-414A-8FDF-E33E6A90A0DD}" type="datetimeFigureOut">
               <a:rPr lang="en-US" smtClean="0"/>
-              <a:t>1/4/2021</a:t>
+              <a:t>1/5/2021</a:t>
             </a:fld>
             <a:endParaRPr lang="en-US"/>
           </a:p>
@@ -6755,7 +6755,7 @@
           <a:p>
             <a:fld id="{CD2AB640-041E-414A-8FDF-E33E6A90A0DD}" type="datetimeFigureOut">
               <a:rPr lang="en-US" smtClean="0"/>
-              <a:t>1/4/2021</a:t>
+              <a:t>1/5/2021</a:t>
             </a:fld>
             <a:endParaRPr lang="en-US"/>
           </a:p>
@@ -6996,7 +6996,7 @@
           <a:p>
             <a:fld id="{CD2AB640-041E-414A-8FDF-E33E6A90A0DD}" type="datetimeFigureOut">
               <a:rPr lang="en-US" smtClean="0"/>
-              <a:t>1/4/2021</a:t>
+              <a:t>1/5/2021</a:t>
             </a:fld>
             <a:endParaRPr lang="en-US"/>
           </a:p>
@@ -8000,7 +8000,7 @@
                 <a:ea typeface="Calibri" panose="020F0502020204030204" pitchFamily="34" charset="0"/>
                 <a:cs typeface="Arial" panose="020B0604020202020204" pitchFamily="34" charset="0"/>
               </a:rPr>
-              <a:t>its purpose is to </a:t>
+              <a:t>Its purpose is to </a:t>
             </a:r>
             <a:r>
               <a:rPr lang="en-US" sz="1700" b="1" dirty="0">
@@ -8118,12 +8118,20 @@
             </a:pPr>
             <a:r>
               <a:rPr lang="en-US" sz="1700" dirty="0">
-                <a:effectLst/>
-                <a:latin typeface="Calibri" panose="020F0502020204030204" pitchFamily="34" charset="0"/>
-                <a:ea typeface="Calibri" panose="020F0502020204030204" pitchFamily="34" charset="0"/>
-                <a:cs typeface="Arial" panose="020B0604020202020204" pitchFamily="34" charset="0"/>
-              </a:rPr>
-              <a:t>it can have </a:t>
+                <a:latin typeface="Calibri" panose="020F0502020204030204" pitchFamily="34" charset="0"/>
+                <a:ea typeface="Calibri" panose="020F0502020204030204" pitchFamily="34" charset="0"/>
+                <a:cs typeface="Arial" panose="020B0604020202020204" pitchFamily="34" charset="0"/>
+              </a:rPr>
+              <a:t>I</a:t>
+            </a:r>
+            <a:r>
+              <a:rPr lang="en-US" sz="1700" dirty="0">
+                <a:effectLst/>
+                <a:latin typeface="Calibri" panose="020F0502020204030204" pitchFamily="34" charset="0"/>
+                <a:ea typeface="Calibri" panose="020F0502020204030204" pitchFamily="34" charset="0"/>
+                <a:cs typeface="Arial" panose="020B0604020202020204" pitchFamily="34" charset="0"/>
+              </a:rPr>
+              <a:t>t can have </a:t>
             </a:r>
             <a:r>
               <a:rPr lang="en-US" sz="1700" b="1" dirty="0">
@@ -8981,12 +8989,20 @@
             </a:pPr>
             <a:r>
               <a:rPr lang="en-US" sz="1000" b="1" dirty="0">
-                <a:effectLst/>
-                <a:latin typeface="Calibri" panose="020F0502020204030204" pitchFamily="34" charset="0"/>
-                <a:ea typeface="Calibri" panose="020F0502020204030204" pitchFamily="34" charset="0"/>
-                <a:cs typeface="Arial" panose="020B0604020202020204" pitchFamily="34" charset="0"/>
-              </a:rPr>
-              <a:t>used to </a:t>
+                <a:latin typeface="Calibri" panose="020F0502020204030204" pitchFamily="34" charset="0"/>
+                <a:ea typeface="Calibri" panose="020F0502020204030204" pitchFamily="34" charset="0"/>
+                <a:cs typeface="Arial" panose="020B0604020202020204" pitchFamily="34" charset="0"/>
+              </a:rPr>
+              <a:t>U</a:t>
+            </a:r>
+            <a:r>
+              <a:rPr lang="en-US" sz="1000" b="1" dirty="0">
+                <a:effectLst/>
+                <a:latin typeface="Calibri" panose="020F0502020204030204" pitchFamily="34" charset="0"/>
+                <a:ea typeface="Calibri" panose="020F0502020204030204" pitchFamily="34" charset="0"/>
+                <a:cs typeface="Arial" panose="020B0604020202020204" pitchFamily="34" charset="0"/>
+              </a:rPr>
+              <a:t>sed to </a:t>
             </a:r>
             <a:r>
               <a:rPr lang="en-US" sz="1000" dirty="0">
@@ -11274,7 +11290,7 @@
           <a:p>
             <a:r>
               <a:rPr lang="en-US" sz="2000" dirty="0"/>
-              <a:t>consists the following variables and constraints:</a:t>
+              <a:t>Consists the following variables and constraints:</a:t>
             </a:r>
           </a:p>
           <a:p>
@@ -13886,7 +13902,7 @@
           <a:p>
             <a:r>
               <a:rPr lang="en-US" sz="2000" dirty="0"/>
-              <a:t>an early test was done, </a:t>
+              <a:t>An early test was done, </a:t>
             </a:r>
             <a:r>
               <a:rPr lang="en-US" sz="2000" b="1" dirty="0"/>
@@ -14164,7 +14180,7 @@
             <p:ph idx="1"/>
             <p:extLst>
               <p:ext uri="{D42A27DB-BD31-4B8C-83A1-F6EECF244321}">
-                <p14:modId xmlns:p14="http://schemas.microsoft.com/office/powerpoint/2010/main" val="3101398780"/>
+                <p14:modId xmlns:p14="http://schemas.microsoft.com/office/powerpoint/2010/main" val="14429510"/>
               </p:ext>
             </p:extLst>
           </p:nvPr>
@@ -14472,31 +14488,7 @@
                           <a:ea typeface="+mn-ea"/>
                           <a:cs typeface="+mn-cs"/>
                         </a:rPr>
-                        <a:t>First only one data point will be </a:t>
-                      </a:r>
-                      <a:r>
-                        <a:rPr lang="en-US" sz="1600" kern="1200" dirty="0" err="1">
-                          <a:solidFill>
-                            <a:schemeClr val="dk1"/>
-                          </a:solidFill>
-                          <a:effectLst/>
-                          <a:latin typeface="+mn-lt"/>
-                          <a:ea typeface="+mn-ea"/>
-                          <a:cs typeface="+mn-cs"/>
-                        </a:rPr>
-                        <a:t>random.At</a:t>
-                      </a:r>
-                      <a:r>
-                        <a:rPr lang="en-US" sz="1600" kern="1200" dirty="0">
-                          <a:solidFill>
-                            <a:schemeClr val="dk1"/>
-                          </a:solidFill>
-                          <a:effectLst/>
-                          <a:latin typeface="+mn-lt"/>
-                          <a:ea typeface="+mn-ea"/>
-                          <a:cs typeface="+mn-cs"/>
-                        </a:rPr>
-                        <a:t> each iteration, one more data point will be randomly generated. </a:t>
+                        <a:t>First only one data point will be random. At each iteration, one more data point will be randomly generated. </a:t>
                       </a:r>
                     </a:p>
                     <a:p>
@@ -18845,7 +18837,7 @@
                 <a:latin typeface="Calibri" panose="020F0502020204030204" pitchFamily="34" charset="0"/>
                 <a:cs typeface="Arial" panose="020B0604020202020204" pitchFamily="34" charset="0"/>
               </a:rPr>
-              <a:t>it was in the 2</a:t>
+              <a:t>It was in the 2</a:t>
             </a:r>
             <a:r>
               <a:rPr lang="en-US" sz="1600" baseline="30000" dirty="0">
@@ -19747,34 +19739,6 @@
           </a:p>
         </p:txBody>
       </p:sp>
-      <p:pic>
-        <p:nvPicPr>
-          <p:cNvPr id="4" name="Picture 3">
-            <a:extLst>
-              <a:ext uri="{FF2B5EF4-FFF2-40B4-BE49-F238E27FC236}">
-                <a16:creationId xmlns:a16="http://schemas.microsoft.com/office/drawing/2014/main" id="{D315DA4D-93CD-4AAB-98F7-5B5091A7F160}"/>
-              </a:ext>
-            </a:extLst>
-          </p:cNvPr>
-          <p:cNvPicPr/>
-          <p:nvPr/>
-        </p:nvPicPr>
-        <p:blipFill>
-          <a:blip r:embed="rId3"/>
-          <a:stretch>
-            <a:fillRect/>
-          </a:stretch>
-        </p:blipFill>
-        <p:spPr>
-          <a:xfrm>
-            <a:off x="7531100" y="1493256"/>
-            <a:ext cx="4000500" cy="4829810"/>
-          </a:xfrm>
-          <a:prstGeom prst="rect">
-            <a:avLst/>
-          </a:prstGeom>
-        </p:spPr>
-      </p:pic>
       <p:sp>
         <p:nvSpPr>
           <p:cNvPr id="5" name="Rectangle 1">
@@ -20210,22 +20174,7 @@
                 <a:ea typeface="Calibri" panose="020F0502020204030204" pitchFamily="34" charset="0"/>
                 <a:cs typeface="Arial" panose="020B0604020202020204" pitchFamily="34" charset="0"/>
               </a:rPr>
-              <a:t>New means calculation </a:t>
-            </a:r>
-            <a:r>
-              <a:rPr kumimoji="0" lang="en-US" altLang="en-US" sz="1800" b="0" i="0" u="none" strike="noStrike" cap="none" normalizeH="0" baseline="0" dirty="0" err="1">
-                <a:ln>
-                  <a:noFill/>
-                </a:ln>
-                <a:solidFill>
-                  <a:schemeClr val="tx1"/>
-                </a:solidFill>
-                <a:effectLst/>
-                <a:latin typeface="+mn-lt"/>
-                <a:ea typeface="Calibri" panose="020F0502020204030204" pitchFamily="34" charset="0"/>
-                <a:cs typeface="Arial" panose="020B0604020202020204" pitchFamily="34" charset="0"/>
-              </a:rPr>
-              <a:t>blockt</a:t>
+              <a:t>New means calculation block</a:t>
             </a:r>
             <a:endParaRPr kumimoji="0" lang="en-US" altLang="en-US" sz="3200" b="0" i="0" u="none" strike="noStrike" cap="none" normalizeH="0" baseline="0" dirty="0">
               <a:ln>
@@ -20240,6 +20189,34 @@
           </a:p>
         </p:txBody>
       </p:sp>
+      <p:pic>
+        <p:nvPicPr>
+          <p:cNvPr id="6" name="Picture 5">
+            <a:extLst>
+              <a:ext uri="{FF2B5EF4-FFF2-40B4-BE49-F238E27FC236}">
+                <a16:creationId xmlns:a16="http://schemas.microsoft.com/office/drawing/2014/main" id="{44DC7C7D-40A2-44A0-95B4-13F243CB0837}"/>
+              </a:ext>
+            </a:extLst>
+          </p:cNvPr>
+          <p:cNvPicPr/>
+          <p:nvPr/>
+        </p:nvPicPr>
+        <p:blipFill>
+          <a:blip r:embed="rId3"/>
+          <a:stretch>
+            <a:fillRect/>
+          </a:stretch>
+        </p:blipFill>
+        <p:spPr>
+          <a:xfrm>
+            <a:off x="6519889" y="1965551"/>
+            <a:ext cx="5486400" cy="3642360"/>
+          </a:xfrm>
+          <a:prstGeom prst="rect">
+            <a:avLst/>
+          </a:prstGeom>
+        </p:spPr>
+      </p:pic>
     </p:spTree>
     <p:extLst>
       <p:ext uri="{BB962C8B-B14F-4D97-AF65-F5344CB8AC3E}">
@@ -24561,7 +24538,7 @@
                 <a:latin typeface="Calibri" panose="020F0502020204030204" pitchFamily="34" charset="0"/>
                 <a:cs typeface="Arial" panose="020B0604020202020204" pitchFamily="34" charset="0"/>
               </a:rPr>
-              <a:t>Sequences are an ordered collection of transactions, they shape and generate them to our needs.</a:t>
+              <a:t>Sequences are an ordered collection of transactions; they shape and generate them to our needs.</a:t>
             </a:r>
           </a:p>
           <a:p>

</xml_diff>

<commit_message>
grammar fixefinal ptt 3
</commit_message>
<xml_diff>
--- a/Final presentation 3.pptx
+++ b/Final presentation 3.pptx
@@ -255,7 +255,7 @@
           <a:p>
             <a:fld id="{B2E107C9-5FE0-4864-97C4-A8FF847E0675}" type="datetimeFigureOut">
               <a:rPr lang="en-US" smtClean="0"/>
-              <a:t>1/5/2021</a:t>
+              <a:t>1/6/2021</a:t>
             </a:fld>
             <a:endParaRPr lang="en-US"/>
           </a:p>
@@ -4430,7 +4430,7 @@
           <a:p>
             <a:fld id="{CD2AB640-041E-414A-8FDF-E33E6A90A0DD}" type="datetimeFigureOut">
               <a:rPr lang="en-US" smtClean="0"/>
-              <a:t>1/5/2021</a:t>
+              <a:t>1/6/2021</a:t>
             </a:fld>
             <a:endParaRPr lang="en-US"/>
           </a:p>
@@ -4628,7 +4628,7 @@
           <a:p>
             <a:fld id="{CD2AB640-041E-414A-8FDF-E33E6A90A0DD}" type="datetimeFigureOut">
               <a:rPr lang="en-US" smtClean="0"/>
-              <a:t>1/5/2021</a:t>
+              <a:t>1/6/2021</a:t>
             </a:fld>
             <a:endParaRPr lang="en-US"/>
           </a:p>
@@ -4836,7 +4836,7 @@
           <a:p>
             <a:fld id="{CD2AB640-041E-414A-8FDF-E33E6A90A0DD}" type="datetimeFigureOut">
               <a:rPr lang="en-US" smtClean="0"/>
-              <a:t>1/5/2021</a:t>
+              <a:t>1/6/2021</a:t>
             </a:fld>
             <a:endParaRPr lang="en-US"/>
           </a:p>
@@ -5034,7 +5034,7 @@
           <a:p>
             <a:fld id="{CD2AB640-041E-414A-8FDF-E33E6A90A0DD}" type="datetimeFigureOut">
               <a:rPr lang="en-US" smtClean="0"/>
-              <a:t>1/5/2021</a:t>
+              <a:t>1/6/2021</a:t>
             </a:fld>
             <a:endParaRPr lang="en-US"/>
           </a:p>
@@ -5309,7 +5309,7 @@
           <a:p>
             <a:fld id="{CD2AB640-041E-414A-8FDF-E33E6A90A0DD}" type="datetimeFigureOut">
               <a:rPr lang="en-US" smtClean="0"/>
-              <a:t>1/5/2021</a:t>
+              <a:t>1/6/2021</a:t>
             </a:fld>
             <a:endParaRPr lang="en-US"/>
           </a:p>
@@ -5574,7 +5574,7 @@
           <a:p>
             <a:fld id="{CD2AB640-041E-414A-8FDF-E33E6A90A0DD}" type="datetimeFigureOut">
               <a:rPr lang="en-US" smtClean="0"/>
-              <a:t>1/5/2021</a:t>
+              <a:t>1/6/2021</a:t>
             </a:fld>
             <a:endParaRPr lang="en-US"/>
           </a:p>
@@ -5986,7 +5986,7 @@
           <a:p>
             <a:fld id="{CD2AB640-041E-414A-8FDF-E33E6A90A0DD}" type="datetimeFigureOut">
               <a:rPr lang="en-US" smtClean="0"/>
-              <a:t>1/5/2021</a:t>
+              <a:t>1/6/2021</a:t>
             </a:fld>
             <a:endParaRPr lang="en-US"/>
           </a:p>
@@ -6127,7 +6127,7 @@
           <a:p>
             <a:fld id="{CD2AB640-041E-414A-8FDF-E33E6A90A0DD}" type="datetimeFigureOut">
               <a:rPr lang="en-US" smtClean="0"/>
-              <a:t>1/5/2021</a:t>
+              <a:t>1/6/2021</a:t>
             </a:fld>
             <a:endParaRPr lang="en-US"/>
           </a:p>
@@ -6240,7 +6240,7 @@
           <a:p>
             <a:fld id="{CD2AB640-041E-414A-8FDF-E33E6A90A0DD}" type="datetimeFigureOut">
               <a:rPr lang="en-US" smtClean="0"/>
-              <a:t>1/5/2021</a:t>
+              <a:t>1/6/2021</a:t>
             </a:fld>
             <a:endParaRPr lang="en-US"/>
           </a:p>
@@ -6551,7 +6551,7 @@
           <a:p>
             <a:fld id="{CD2AB640-041E-414A-8FDF-E33E6A90A0DD}" type="datetimeFigureOut">
               <a:rPr lang="en-US" smtClean="0"/>
-              <a:t>1/5/2021</a:t>
+              <a:t>1/6/2021</a:t>
             </a:fld>
             <a:endParaRPr lang="en-US"/>
           </a:p>
@@ -6839,7 +6839,7 @@
           <a:p>
             <a:fld id="{CD2AB640-041E-414A-8FDF-E33E6A90A0DD}" type="datetimeFigureOut">
               <a:rPr lang="en-US" smtClean="0"/>
-              <a:t>1/5/2021</a:t>
+              <a:t>1/6/2021</a:t>
             </a:fld>
             <a:endParaRPr lang="en-US"/>
           </a:p>
@@ -7080,7 +7080,7 @@
           <a:p>
             <a:fld id="{CD2AB640-041E-414A-8FDF-E33E6A90A0DD}" type="datetimeFigureOut">
               <a:rPr lang="en-US" smtClean="0"/>
-              <a:t>1/5/2021</a:t>
+              <a:t>1/6/2021</a:t>
             </a:fld>
             <a:endParaRPr lang="en-US"/>
           </a:p>
@@ -10493,7 +10493,21 @@
                 <a:latin typeface="Calibri" panose="020F0502020204030204" pitchFamily="34" charset="0"/>
                 <a:cs typeface="Arial" panose="020B0604020202020204" pitchFamily="34" charset="0"/>
               </a:rPr>
-              <a:t>centroids value:</a:t>
+              <a:t>C</a:t>
+            </a:r>
+            <a:r>
+              <a:rPr lang="en-US" sz="2000">
+                <a:latin typeface="Calibri" panose="020F0502020204030204" pitchFamily="34" charset="0"/>
+                <a:cs typeface="Arial" panose="020B0604020202020204" pitchFamily="34" charset="0"/>
+              </a:rPr>
+              <a:t>entroids </a:t>
+            </a:r>
+            <a:r>
+              <a:rPr lang="en-US" sz="2000" dirty="0">
+                <a:latin typeface="Calibri" panose="020F0502020204030204" pitchFamily="34" charset="0"/>
+                <a:cs typeface="Arial" panose="020B0604020202020204" pitchFamily="34" charset="0"/>
+              </a:rPr>
+              <a:t>value:</a:t>
             </a:r>
           </a:p>
           <a:p>

</xml_diff>